<commit_message>
Add command case, add dailies, add reference and add figures.
사용자가 command를 입력할 때 대문자로 넣을 수 있어서 이를 포함하여 실행할 수 있도록 만들었다. 또한 일지의 내용을 수정했다. 그리고 참고한 자료의 주소를 더했으며 개념도의 데이터베이스 좀 더 구체적으로 만들었다.
</commit_message>
<xml_diff>
--- a/개념도.pptx
+++ b/개념도.pptx
@@ -6,6 +6,7 @@
   </p:sldMasterIdLst>
   <p:sldIdLst>
     <p:sldId id="256" r:id="rId2"/>
+    <p:sldId id="257" r:id="rId3"/>
   </p:sldIdLst>
   <p:sldSz cx="12192000" cy="6858000"/>
   <p:notesSz cx="6858000" cy="9144000"/>
@@ -259,7 +260,7 @@
           <a:p>
             <a:fld id="{6DC8BE78-1FFE-42AC-A0CC-C275443512B9}" type="datetimeFigureOut">
               <a:rPr lang="ko-KR" altLang="en-US" smtClean="0"/>
-              <a:t>2022-02-21</a:t>
+              <a:t>2022-02-24</a:t>
             </a:fld>
             <a:endParaRPr lang="ko-KR" altLang="en-US"/>
           </a:p>
@@ -457,7 +458,7 @@
           <a:p>
             <a:fld id="{6DC8BE78-1FFE-42AC-A0CC-C275443512B9}" type="datetimeFigureOut">
               <a:rPr lang="ko-KR" altLang="en-US" smtClean="0"/>
-              <a:t>2022-02-21</a:t>
+              <a:t>2022-02-24</a:t>
             </a:fld>
             <a:endParaRPr lang="ko-KR" altLang="en-US"/>
           </a:p>
@@ -665,7 +666,7 @@
           <a:p>
             <a:fld id="{6DC8BE78-1FFE-42AC-A0CC-C275443512B9}" type="datetimeFigureOut">
               <a:rPr lang="ko-KR" altLang="en-US" smtClean="0"/>
-              <a:t>2022-02-21</a:t>
+              <a:t>2022-02-24</a:t>
             </a:fld>
             <a:endParaRPr lang="ko-KR" altLang="en-US"/>
           </a:p>
@@ -863,7 +864,7 @@
           <a:p>
             <a:fld id="{6DC8BE78-1FFE-42AC-A0CC-C275443512B9}" type="datetimeFigureOut">
               <a:rPr lang="ko-KR" altLang="en-US" smtClean="0"/>
-              <a:t>2022-02-21</a:t>
+              <a:t>2022-02-24</a:t>
             </a:fld>
             <a:endParaRPr lang="ko-KR" altLang="en-US"/>
           </a:p>
@@ -1138,7 +1139,7 @@
           <a:p>
             <a:fld id="{6DC8BE78-1FFE-42AC-A0CC-C275443512B9}" type="datetimeFigureOut">
               <a:rPr lang="ko-KR" altLang="en-US" smtClean="0"/>
-              <a:t>2022-02-21</a:t>
+              <a:t>2022-02-24</a:t>
             </a:fld>
             <a:endParaRPr lang="ko-KR" altLang="en-US"/>
           </a:p>
@@ -1403,7 +1404,7 @@
           <a:p>
             <a:fld id="{6DC8BE78-1FFE-42AC-A0CC-C275443512B9}" type="datetimeFigureOut">
               <a:rPr lang="ko-KR" altLang="en-US" smtClean="0"/>
-              <a:t>2022-02-21</a:t>
+              <a:t>2022-02-24</a:t>
             </a:fld>
             <a:endParaRPr lang="ko-KR" altLang="en-US"/>
           </a:p>
@@ -1815,7 +1816,7 @@
           <a:p>
             <a:fld id="{6DC8BE78-1FFE-42AC-A0CC-C275443512B9}" type="datetimeFigureOut">
               <a:rPr lang="ko-KR" altLang="en-US" smtClean="0"/>
-              <a:t>2022-02-21</a:t>
+              <a:t>2022-02-24</a:t>
             </a:fld>
             <a:endParaRPr lang="ko-KR" altLang="en-US"/>
           </a:p>
@@ -1956,7 +1957,7 @@
           <a:p>
             <a:fld id="{6DC8BE78-1FFE-42AC-A0CC-C275443512B9}" type="datetimeFigureOut">
               <a:rPr lang="ko-KR" altLang="en-US" smtClean="0"/>
-              <a:t>2022-02-21</a:t>
+              <a:t>2022-02-24</a:t>
             </a:fld>
             <a:endParaRPr lang="ko-KR" altLang="en-US"/>
           </a:p>
@@ -2069,7 +2070,7 @@
           <a:p>
             <a:fld id="{6DC8BE78-1FFE-42AC-A0CC-C275443512B9}" type="datetimeFigureOut">
               <a:rPr lang="ko-KR" altLang="en-US" smtClean="0"/>
-              <a:t>2022-02-21</a:t>
+              <a:t>2022-02-24</a:t>
             </a:fld>
             <a:endParaRPr lang="ko-KR" altLang="en-US"/>
           </a:p>
@@ -2380,7 +2381,7 @@
           <a:p>
             <a:fld id="{6DC8BE78-1FFE-42AC-A0CC-C275443512B9}" type="datetimeFigureOut">
               <a:rPr lang="ko-KR" altLang="en-US" smtClean="0"/>
-              <a:t>2022-02-21</a:t>
+              <a:t>2022-02-24</a:t>
             </a:fld>
             <a:endParaRPr lang="ko-KR" altLang="en-US"/>
           </a:p>
@@ -2668,7 +2669,7 @@
           <a:p>
             <a:fld id="{6DC8BE78-1FFE-42AC-A0CC-C275443512B9}" type="datetimeFigureOut">
               <a:rPr lang="ko-KR" altLang="en-US" smtClean="0"/>
-              <a:t>2022-02-21</a:t>
+              <a:t>2022-02-24</a:t>
             </a:fld>
             <a:endParaRPr lang="ko-KR" altLang="en-US"/>
           </a:p>
@@ -2909,7 +2910,7 @@
           <a:p>
             <a:fld id="{6DC8BE78-1FFE-42AC-A0CC-C275443512B9}" type="datetimeFigureOut">
               <a:rPr lang="ko-KR" altLang="en-US" smtClean="0"/>
-              <a:t>2022-02-21</a:t>
+              <a:t>2022-02-24</a:t>
             </a:fld>
             <a:endParaRPr lang="ko-KR" altLang="en-US"/>
           </a:p>
@@ -3340,7 +3341,7 @@
         </p:nvSpPr>
         <p:spPr>
           <a:xfrm>
-            <a:off x="1921079" y="100668"/>
+            <a:off x="1912690" y="442842"/>
             <a:ext cx="2525086" cy="2306973"/>
           </a:xfrm>
           <a:prstGeom prst="rect">
@@ -3404,7 +3405,7 @@
         </p:nvSpPr>
         <p:spPr>
           <a:xfrm>
-            <a:off x="7794771" y="100668"/>
+            <a:off x="7786382" y="442842"/>
             <a:ext cx="4167915" cy="3913464"/>
           </a:xfrm>
           <a:prstGeom prst="rect">
@@ -3495,7 +3496,7 @@
         </p:nvSpPr>
         <p:spPr>
           <a:xfrm>
-            <a:off x="9160778" y="2684478"/>
+            <a:off x="9185945" y="3112477"/>
             <a:ext cx="2694955" cy="1192636"/>
           </a:xfrm>
           <a:prstGeom prst="rect">
@@ -3545,6 +3546,14 @@
           </a:p>
           <a:p>
             <a:pPr algn="ctr"/>
+            <a:r>
+              <a:rPr lang="ko-KR" altLang="en-US" dirty="0">
+                <a:solidFill>
+                  <a:sysClr val="windowText" lastClr="000000"/>
+                </a:solidFill>
+              </a:rPr>
+              <a:t>내부 테이블은 다음장에</a:t>
+            </a:r>
             <a:endParaRPr lang="en-US" altLang="ko-KR" dirty="0">
               <a:solidFill>
                 <a:sysClr val="windowText" lastClr="000000"/>
@@ -3567,7 +3576,7 @@
         </p:nvSpPr>
         <p:spPr>
           <a:xfrm>
-            <a:off x="2274815" y="2601987"/>
+            <a:off x="2266426" y="3708795"/>
             <a:ext cx="1768678" cy="854278"/>
           </a:xfrm>
           <a:prstGeom prst="rect">
@@ -3661,13 +3670,15 @@
               </a:ext>
             </a:extLst>
           </p:cNvPr>
-          <p:cNvCxnSpPr/>
+          <p:cNvCxnSpPr>
+            <a:cxnSpLocks/>
+          </p:cNvCxnSpPr>
           <p:nvPr/>
         </p:nvCxnSpPr>
         <p:spPr>
           <a:xfrm flipV="1">
-            <a:off x="2902591" y="2407641"/>
-            <a:ext cx="0" cy="194346"/>
+            <a:off x="2894202" y="2749815"/>
+            <a:ext cx="0" cy="958980"/>
           </a:xfrm>
           <a:prstGeom prst="straightConnector1">
             <a:avLst/>
@@ -3707,8 +3718,8 @@
         </p:nvCxnSpPr>
         <p:spPr>
           <a:xfrm>
-            <a:off x="3598877" y="2407641"/>
-            <a:ext cx="0" cy="194346"/>
+            <a:off x="3590488" y="2749815"/>
+            <a:ext cx="0" cy="958980"/>
           </a:xfrm>
           <a:prstGeom prst="straightConnector1">
             <a:avLst/>
@@ -3748,7 +3759,7 @@
         </p:nvCxnSpPr>
         <p:spPr>
           <a:xfrm>
-            <a:off x="4446165" y="989901"/>
+            <a:off x="4437776" y="1332075"/>
             <a:ext cx="3348607" cy="0"/>
           </a:xfrm>
           <a:prstGeom prst="straightConnector1">
@@ -3789,7 +3800,7 @@
         </p:nvCxnSpPr>
         <p:spPr>
           <a:xfrm flipH="1">
-            <a:off x="4446165" y="1535186"/>
+            <a:off x="4437776" y="1877360"/>
             <a:ext cx="3348607" cy="0"/>
           </a:xfrm>
           <a:prstGeom prst="straightConnector1">
@@ -3828,7 +3839,7 @@
         </p:nvSpPr>
         <p:spPr>
           <a:xfrm>
-            <a:off x="405468" y="4297962"/>
+            <a:off x="397079" y="5404770"/>
             <a:ext cx="1768678" cy="854278"/>
           </a:xfrm>
           <a:prstGeom prst="rect">
@@ -3924,7 +3935,7 @@
         </p:nvSpPr>
         <p:spPr>
           <a:xfrm>
-            <a:off x="2902591" y="4297962"/>
+            <a:off x="2894202" y="5404770"/>
             <a:ext cx="1768678" cy="854278"/>
           </a:xfrm>
           <a:prstGeom prst="rect">
@@ -3992,7 +4003,7 @@
         </p:nvCxnSpPr>
         <p:spPr>
           <a:xfrm>
-            <a:off x="2174146" y="4725101"/>
+            <a:off x="2165757" y="5831909"/>
             <a:ext cx="728445" cy="0"/>
           </a:xfrm>
           <a:prstGeom prst="straightConnector1">
@@ -4033,7 +4044,7 @@
         </p:nvCxnSpPr>
         <p:spPr>
           <a:xfrm flipH="1" flipV="1">
-            <a:off x="3322040" y="3456265"/>
+            <a:off x="3313651" y="4563073"/>
             <a:ext cx="212521" cy="841697"/>
           </a:xfrm>
           <a:prstGeom prst="straightConnector1">
@@ -4072,7 +4083,7 @@
         </p:nvSpPr>
         <p:spPr>
           <a:xfrm>
-            <a:off x="757463" y="5180096"/>
+            <a:off x="749074" y="6286904"/>
             <a:ext cx="3913806" cy="369332"/>
           </a:xfrm>
           <a:prstGeom prst="rect">
@@ -4126,53 +4137,307 @@
           </a:p>
         </p:txBody>
       </p:sp>
-      <p:cxnSp>
-        <p:nvCxnSpPr>
-          <p:cNvPr id="15" name="직선 화살표 연결선 14">
-            <a:extLst>
-              <a:ext uri="{FF2B5EF4-FFF2-40B4-BE49-F238E27FC236}">
-                <a16:creationId xmlns:a16="http://schemas.microsoft.com/office/drawing/2014/main" id="{0BB150A2-604E-449F-8C5E-85663F1791BB}"/>
-              </a:ext>
-            </a:extLst>
-          </p:cNvPr>
-          <p:cNvCxnSpPr>
-            <a:cxnSpLocks/>
-          </p:cNvCxnSpPr>
+      <p:sp>
+        <p:nvSpPr>
+          <p:cNvPr id="2" name="TextBox 1">
+            <a:extLst>
+              <a:ext uri="{FF2B5EF4-FFF2-40B4-BE49-F238E27FC236}">
+                <a16:creationId xmlns:a16="http://schemas.microsoft.com/office/drawing/2014/main" id="{CCEBFF70-16E9-40A9-9E6C-9B9E9D8D4581}"/>
+              </a:ext>
+            </a:extLst>
+          </p:cNvPr>
+          <p:cNvSpPr txBox="1"/>
           <p:nvPr/>
-        </p:nvCxnSpPr>
+        </p:nvSpPr>
         <p:spPr>
           <a:xfrm>
-            <a:off x="4043493" y="2745299"/>
-            <a:ext cx="3751278" cy="29360"/>
+            <a:off x="1743511" y="4654466"/>
+            <a:ext cx="2919369" cy="646331"/>
           </a:xfrm>
-          <a:prstGeom prst="straightConnector1">
+          <a:prstGeom prst="rect">
             <a:avLst/>
           </a:prstGeom>
-          <a:ln>
-            <a:tailEnd type="triangle"/>
-          </a:ln>
+          <a:noFill/>
         </p:spPr>
-        <p:style>
-          <a:lnRef idx="1">
-            <a:schemeClr val="accent1"/>
-          </a:lnRef>
-          <a:fillRef idx="0">
-            <a:schemeClr val="accent1"/>
-          </a:fillRef>
-          <a:effectRef idx="0">
-            <a:schemeClr val="accent1"/>
-          </a:effectRef>
-          <a:fontRef idx="minor">
-            <a:schemeClr val="tx1"/>
-          </a:fontRef>
-        </p:style>
-      </p:cxnSp>
+        <p:txBody>
+          <a:bodyPr wrap="square" rtlCol="0">
+            <a:spAutoFit/>
+          </a:bodyPr>
+          <a:lstStyle/>
+          <a:p>
+            <a:r>
+              <a:rPr lang="en-US" altLang="ko-KR" dirty="0"/>
+              <a:t>Import</a:t>
+            </a:r>
+          </a:p>
+          <a:p>
+            <a:r>
+              <a:rPr lang="ko-KR" altLang="en-US" dirty="0"/>
+              <a:t>해서 </a:t>
+            </a:r>
+            <a:r>
+              <a:rPr lang="en-US" altLang="ko-KR" dirty="0" err="1"/>
+              <a:t>lua</a:t>
+            </a:r>
+            <a:r>
+              <a:rPr lang="en-US" altLang="ko-KR" dirty="0"/>
+              <a:t> </a:t>
+            </a:r>
+            <a:r>
+              <a:rPr lang="ko-KR" altLang="en-US" dirty="0"/>
+              <a:t>테이블 정보</a:t>
+            </a:r>
+          </a:p>
+        </p:txBody>
+      </p:sp>
+      <p:sp>
+        <p:nvSpPr>
+          <p:cNvPr id="23" name="TextBox 22">
+            <a:extLst>
+              <a:ext uri="{FF2B5EF4-FFF2-40B4-BE49-F238E27FC236}">
+                <a16:creationId xmlns:a16="http://schemas.microsoft.com/office/drawing/2014/main" id="{CAEF9346-096F-4614-AC29-8164CA07A993}"/>
+              </a:ext>
+            </a:extLst>
+          </p:cNvPr>
+          <p:cNvSpPr txBox="1"/>
+          <p:nvPr/>
+        </p:nvSpPr>
+        <p:spPr>
+          <a:xfrm>
+            <a:off x="4662880" y="902514"/>
+            <a:ext cx="2919369" cy="369332"/>
+          </a:xfrm>
+          <a:prstGeom prst="rect">
+            <a:avLst/>
+          </a:prstGeom>
+          <a:noFill/>
+        </p:spPr>
+        <p:txBody>
+          <a:bodyPr wrap="square" rtlCol="0">
+            <a:spAutoFit/>
+          </a:bodyPr>
+          <a:lstStyle/>
+          <a:p>
+            <a:r>
+              <a:rPr lang="en-US" altLang="ko-KR" dirty="0"/>
+              <a:t>ID PW </a:t>
+            </a:r>
+            <a:r>
+              <a:rPr lang="ko-KR" altLang="en-US" dirty="0"/>
+              <a:t>더해서 정보 </a:t>
+            </a:r>
+            <a:r>
+              <a:rPr lang="ko-KR" altLang="en-US" dirty="0" err="1"/>
+              <a:t>뭐다</a:t>
+            </a:r>
+            <a:endParaRPr lang="ko-KR" altLang="en-US" dirty="0"/>
+          </a:p>
+        </p:txBody>
+      </p:sp>
+      <p:sp>
+        <p:nvSpPr>
+          <p:cNvPr id="26" name="TextBox 25">
+            <a:extLst>
+              <a:ext uri="{FF2B5EF4-FFF2-40B4-BE49-F238E27FC236}">
+                <a16:creationId xmlns:a16="http://schemas.microsoft.com/office/drawing/2014/main" id="{131B0B18-3356-4B2F-94D4-9C92F312E6BA}"/>
+              </a:ext>
+            </a:extLst>
+          </p:cNvPr>
+          <p:cNvSpPr txBox="1"/>
+          <p:nvPr/>
+        </p:nvSpPr>
+        <p:spPr>
+          <a:xfrm>
+            <a:off x="100668" y="2958491"/>
+            <a:ext cx="2919369" cy="923330"/>
+          </a:xfrm>
+          <a:prstGeom prst="rect">
+            <a:avLst/>
+          </a:prstGeom>
+          <a:noFill/>
+        </p:spPr>
+        <p:txBody>
+          <a:bodyPr wrap="square" rtlCol="0">
+            <a:spAutoFit/>
+          </a:bodyPr>
+          <a:lstStyle/>
+          <a:p>
+            <a:r>
+              <a:rPr lang="en-US" altLang="ko-KR" dirty="0" err="1"/>
+              <a:t>USPF.lua</a:t>
+            </a:r>
+            <a:r>
+              <a:rPr lang="en-US" altLang="ko-KR" dirty="0"/>
+              <a:t> </a:t>
+            </a:r>
+            <a:r>
+              <a:rPr lang="ko-KR" altLang="en-US" dirty="0"/>
+              <a:t>저장 변수에서 얻어낸 정보는 </a:t>
+            </a:r>
+            <a:r>
+              <a:rPr lang="ko-KR" altLang="en-US" dirty="0" err="1"/>
+              <a:t>이겁니다유</a:t>
+            </a:r>
+            <a:endParaRPr lang="en-US" altLang="ko-KR" dirty="0"/>
+          </a:p>
+          <a:p>
+            <a:r>
+              <a:rPr lang="en-US" altLang="ko-KR" dirty="0"/>
+              <a:t>With csv </a:t>
+            </a:r>
+            <a:r>
+              <a:rPr lang="ko-KR" altLang="en-US" dirty="0"/>
+              <a:t>파일</a:t>
+            </a:r>
+          </a:p>
+        </p:txBody>
+      </p:sp>
+      <p:sp>
+        <p:nvSpPr>
+          <p:cNvPr id="25" name="TextBox 24">
+            <a:extLst>
+              <a:ext uri="{FF2B5EF4-FFF2-40B4-BE49-F238E27FC236}">
+                <a16:creationId xmlns:a16="http://schemas.microsoft.com/office/drawing/2014/main" id="{2CE66240-4F39-4FB3-82F0-83A3EEDD003F}"/>
+              </a:ext>
+            </a:extLst>
+          </p:cNvPr>
+          <p:cNvSpPr txBox="1"/>
+          <p:nvPr/>
+        </p:nvSpPr>
+        <p:spPr>
+          <a:xfrm>
+            <a:off x="7013196" y="1925217"/>
+            <a:ext cx="643156" cy="369332"/>
+          </a:xfrm>
+          <a:prstGeom prst="rect">
+            <a:avLst/>
+          </a:prstGeom>
+          <a:noFill/>
+        </p:spPr>
+        <p:txBody>
+          <a:bodyPr wrap="square" rtlCol="0">
+            <a:spAutoFit/>
+          </a:bodyPr>
+          <a:lstStyle/>
+          <a:p>
+            <a:r>
+              <a:rPr lang="en-US" altLang="ko-KR" dirty="0"/>
+              <a:t>OK</a:t>
+            </a:r>
+            <a:endParaRPr lang="ko-KR" altLang="en-US" dirty="0"/>
+          </a:p>
+        </p:txBody>
+      </p:sp>
+      <p:sp>
+        <p:nvSpPr>
+          <p:cNvPr id="28" name="TextBox 27">
+            <a:extLst>
+              <a:ext uri="{FF2B5EF4-FFF2-40B4-BE49-F238E27FC236}">
+                <a16:creationId xmlns:a16="http://schemas.microsoft.com/office/drawing/2014/main" id="{8A89D627-A82A-4479-8EEA-D9E4AAC01521}"/>
+              </a:ext>
+            </a:extLst>
+          </p:cNvPr>
+          <p:cNvSpPr txBox="1"/>
+          <p:nvPr/>
+        </p:nvSpPr>
+        <p:spPr>
+          <a:xfrm>
+            <a:off x="3590487" y="3050824"/>
+            <a:ext cx="2919369" cy="369332"/>
+          </a:xfrm>
+          <a:prstGeom prst="rect">
+            <a:avLst/>
+          </a:prstGeom>
+          <a:noFill/>
+        </p:spPr>
+        <p:txBody>
+          <a:bodyPr wrap="square" rtlCol="0">
+            <a:spAutoFit/>
+          </a:bodyPr>
+          <a:lstStyle/>
+          <a:p>
+            <a:r>
+              <a:rPr lang="ko-KR" altLang="en-US" dirty="0"/>
+              <a:t>어떤 것들을 실행하라</a:t>
+            </a:r>
+          </a:p>
+        </p:txBody>
+      </p:sp>
+    </p:spTree>
+    <p:extLst>
+      <p:ext uri="{BB962C8B-B14F-4D97-AF65-F5344CB8AC3E}">
+        <p14:creationId xmlns:p14="http://schemas.microsoft.com/office/powerpoint/2010/main" val="3300344118"/>
+      </p:ext>
+    </p:extLst>
+  </p:cSld>
+  <p:clrMapOvr>
+    <a:masterClrMapping/>
+  </p:clrMapOvr>
+</p:sld>
+</file>
+
+<file path=ppt/slides/slide2.xml><?xml version="1.0" encoding="utf-8"?>
+<p:sld xmlns:a="http://schemas.openxmlformats.org/drawingml/2006/main" xmlns:r="http://schemas.openxmlformats.org/officeDocument/2006/relationships" xmlns:p="http://schemas.openxmlformats.org/presentationml/2006/main">
+  <p:cSld>
+    <p:spTree>
+      <p:nvGrpSpPr>
+        <p:cNvPr id="1" name=""/>
+        <p:cNvGrpSpPr/>
+        <p:nvPr/>
+      </p:nvGrpSpPr>
+      <p:grpSpPr>
+        <a:xfrm>
+          <a:off x="0" y="0"/>
+          <a:ext cx="0" cy="0"/>
+          <a:chOff x="0" y="0"/>
+          <a:chExt cx="0" cy="0"/>
+        </a:xfrm>
+      </p:grpSpPr>
+      <p:sp>
+        <p:nvSpPr>
+          <p:cNvPr id="5" name="TextBox 4">
+            <a:extLst>
+              <a:ext uri="{FF2B5EF4-FFF2-40B4-BE49-F238E27FC236}">
+                <a16:creationId xmlns:a16="http://schemas.microsoft.com/office/drawing/2014/main" id="{34E00205-1378-4AB2-B052-ED50B152B194}"/>
+              </a:ext>
+            </a:extLst>
+          </p:cNvPr>
+          <p:cNvSpPr txBox="1"/>
+          <p:nvPr/>
+        </p:nvSpPr>
+        <p:spPr>
+          <a:xfrm>
+            <a:off x="721453" y="419450"/>
+            <a:ext cx="5452844" cy="369332"/>
+          </a:xfrm>
+          <a:prstGeom prst="rect">
+            <a:avLst/>
+          </a:prstGeom>
+          <a:noFill/>
+        </p:spPr>
+        <p:txBody>
+          <a:bodyPr wrap="square" rtlCol="0">
+            <a:spAutoFit/>
+          </a:bodyPr>
+          <a:lstStyle/>
+          <a:p>
+            <a:r>
+              <a:rPr lang="ko-KR" altLang="en-US" b="1" dirty="0"/>
+              <a:t>데이터베이스</a:t>
+            </a:r>
+            <a:r>
+              <a:rPr lang="en-US" altLang="ko-KR" b="1" dirty="0"/>
+              <a:t>.</a:t>
+            </a:r>
+          </a:p>
+        </p:txBody>
+      </p:sp>
       <p:graphicFrame>
         <p:nvGraphicFramePr>
-          <p:cNvPr id="12" name="표 13">
-            <a:extLst>
-              <a:ext uri="{FF2B5EF4-FFF2-40B4-BE49-F238E27FC236}">
-                <a16:creationId xmlns:a16="http://schemas.microsoft.com/office/drawing/2014/main" id="{B7DB9E88-D04F-4DAA-8F03-6F16F2982F51}"/>
+          <p:cNvPr id="2" name="표 1">
+            <a:extLst>
+              <a:ext uri="{FF2B5EF4-FFF2-40B4-BE49-F238E27FC236}">
+                <a16:creationId xmlns:a16="http://schemas.microsoft.com/office/drawing/2014/main" id="{BE8228DB-B6E2-46DE-AC94-AF0DFE9E5FF7}"/>
               </a:ext>
             </a:extLst>
           </p:cNvPr>
@@ -4182,14 +4447,14 @@
           <p:nvPr>
             <p:extLst>
               <p:ext uri="{D42A27DB-BD31-4B8C-83A1-F6EECF244321}">
-                <p14:modId xmlns:p14="http://schemas.microsoft.com/office/powerpoint/2010/main" val="1150297225"/>
+                <p14:modId xmlns:p14="http://schemas.microsoft.com/office/powerpoint/2010/main" val="3984066495"/>
               </p:ext>
             </p:extLst>
           </p:nvPr>
         </p:nvGraphicFramePr>
         <p:xfrm>
-          <a:off x="3686270" y="3525883"/>
-          <a:ext cx="4050204" cy="2148897"/>
+          <a:off x="427139" y="1087394"/>
+          <a:ext cx="3707802" cy="1519400"/>
         </p:xfrm>
         <a:graphic>
           <a:graphicData uri="http://schemas.openxmlformats.org/drawingml/2006/table">
@@ -4198,42 +4463,437 @@
                 <a:tableStyleId>{5C22544A-7EE6-4342-B048-85BDC9FD1C3A}</a:tableStyleId>
               </a:tblPr>
               <a:tblGrid>
-                <a:gridCol w="1012551">
+                <a:gridCol w="1235934">
+                  <a:extLst>
+                    <a:ext uri="{9D8B030D-6E8A-4147-A177-3AD203B41FA5}">
+                      <a16:colId xmlns:a16="http://schemas.microsoft.com/office/drawing/2014/main" val="857292873"/>
+                    </a:ext>
+                  </a:extLst>
+                </a:gridCol>
+                <a:gridCol w="1235934">
+                  <a:extLst>
+                    <a:ext uri="{9D8B030D-6E8A-4147-A177-3AD203B41FA5}">
+                      <a16:colId xmlns:a16="http://schemas.microsoft.com/office/drawing/2014/main" val="201994473"/>
+                    </a:ext>
+                  </a:extLst>
+                </a:gridCol>
+                <a:gridCol w="1235934">
+                  <a:extLst>
+                    <a:ext uri="{9D8B030D-6E8A-4147-A177-3AD203B41FA5}">
+                      <a16:colId xmlns:a16="http://schemas.microsoft.com/office/drawing/2014/main" val="767223019"/>
+                    </a:ext>
+                  </a:extLst>
+                </a:gridCol>
+              </a:tblGrid>
+              <a:tr h="677801">
+                <a:tc>
+                  <a:txBody>
+                    <a:bodyPr/>
+                    <a:lstStyle/>
+                    <a:p>
+                      <a:pPr algn="ctr" latinLnBrk="1"/>
+                      <a:r>
+                        <a:rPr lang="en-US" altLang="ko-KR" dirty="0"/>
+                        <a:t>Primary</a:t>
+                      </a:r>
+                      <a:r>
+                        <a:rPr lang="ko-KR" altLang="en-US" dirty="0"/>
+                        <a:t> </a:t>
+                      </a:r>
+                      <a:r>
+                        <a:rPr lang="en-US" altLang="ko-KR" dirty="0"/>
+                        <a:t>Key</a:t>
+                      </a:r>
+                      <a:endParaRPr lang="ko-KR" altLang="en-US" dirty="0"/>
+                    </a:p>
+                  </a:txBody>
+                  <a:tcPr/>
+                </a:tc>
+                <a:tc>
+                  <a:txBody>
+                    <a:bodyPr/>
+                    <a:lstStyle/>
+                    <a:p>
+                      <a:pPr algn="ctr" latinLnBrk="1"/>
+                      <a:r>
+                        <a:rPr lang="en-US" altLang="ko-KR" dirty="0"/>
+                        <a:t>ID</a:t>
+                      </a:r>
+                      <a:endParaRPr lang="ko-KR" altLang="en-US" dirty="0"/>
+                    </a:p>
+                  </a:txBody>
+                  <a:tcPr/>
+                </a:tc>
+                <a:tc>
+                  <a:txBody>
+                    <a:bodyPr/>
+                    <a:lstStyle/>
+                    <a:p>
+                      <a:pPr algn="ctr" latinLnBrk="1"/>
+                      <a:r>
+                        <a:rPr lang="en-US" altLang="ko-KR" dirty="0"/>
+                        <a:t>PW</a:t>
+                      </a:r>
+                      <a:endParaRPr lang="ko-KR" altLang="en-US" dirty="0"/>
+                    </a:p>
+                  </a:txBody>
+                  <a:tcPr/>
+                </a:tc>
+                <a:extLst>
+                  <a:ext uri="{0D108BD9-81ED-4DB2-BD59-A6C34878D82A}">
+                    <a16:rowId xmlns:a16="http://schemas.microsoft.com/office/drawing/2014/main" val="922794740"/>
+                  </a:ext>
+                </a:extLst>
+              </a:tr>
+              <a:tr h="280533">
+                <a:tc>
+                  <a:txBody>
+                    <a:bodyPr/>
+                    <a:lstStyle/>
+                    <a:p>
+                      <a:pPr algn="ctr" latinLnBrk="1"/>
+                      <a:r>
+                        <a:rPr lang="en-US" altLang="ko-KR" sz="1100" dirty="0"/>
+                        <a:t>12416134</a:t>
+                      </a:r>
+                      <a:endParaRPr lang="ko-KR" altLang="en-US" sz="1100" dirty="0"/>
+                    </a:p>
+                  </a:txBody>
+                  <a:tcPr/>
+                </a:tc>
+                <a:tc>
+                  <a:txBody>
+                    <a:bodyPr/>
+                    <a:lstStyle/>
+                    <a:p>
+                      <a:pPr algn="ctr" latinLnBrk="1"/>
+                      <a:r>
+                        <a:rPr lang="en-US" altLang="ko-KR" sz="1100" dirty="0"/>
+                        <a:t>Asrhgy0125</a:t>
+                      </a:r>
+                      <a:endParaRPr lang="ko-KR" altLang="en-US" sz="1100" dirty="0"/>
+                    </a:p>
+                  </a:txBody>
+                  <a:tcPr/>
+                </a:tc>
+                <a:tc>
+                  <a:txBody>
+                    <a:bodyPr/>
+                    <a:lstStyle/>
+                    <a:p>
+                      <a:pPr algn="ctr" latinLnBrk="1"/>
+                      <a:r>
+                        <a:rPr lang="ko-KR" altLang="en-US" sz="1100" dirty="0" err="1"/>
+                        <a:t>디푼디푼</a:t>
+                      </a:r>
+                      <a:endParaRPr lang="ko-KR" altLang="en-US" sz="1100" dirty="0"/>
+                    </a:p>
+                  </a:txBody>
+                  <a:tcPr/>
+                </a:tc>
+                <a:extLst>
+                  <a:ext uri="{0D108BD9-81ED-4DB2-BD59-A6C34878D82A}">
+                    <a16:rowId xmlns:a16="http://schemas.microsoft.com/office/drawing/2014/main" val="4233234213"/>
+                  </a:ext>
+                </a:extLst>
+              </a:tr>
+              <a:tr h="280533">
+                <a:tc>
+                  <a:txBody>
+                    <a:bodyPr/>
+                    <a:lstStyle/>
+                    <a:p>
+                      <a:pPr algn="ctr" latinLnBrk="1"/>
+                      <a:endParaRPr lang="ko-KR" altLang="en-US" sz="1100" dirty="0"/>
+                    </a:p>
+                  </a:txBody>
+                  <a:tcPr/>
+                </a:tc>
+                <a:tc>
+                  <a:txBody>
+                    <a:bodyPr/>
+                    <a:lstStyle/>
+                    <a:p>
+                      <a:pPr algn="ctr" latinLnBrk="1"/>
+                      <a:r>
+                        <a:rPr lang="en-US" altLang="ko-KR" sz="1100" dirty="0"/>
+                        <a:t>Asrhgy0125</a:t>
+                      </a:r>
+                      <a:endParaRPr lang="ko-KR" altLang="en-US" sz="1100" dirty="0"/>
+                    </a:p>
+                  </a:txBody>
+                  <a:tcPr/>
+                </a:tc>
+                <a:tc>
+                  <a:txBody>
+                    <a:bodyPr/>
+                    <a:lstStyle/>
+                    <a:p>
+                      <a:pPr algn="ctr" latinLnBrk="1"/>
+                      <a:r>
+                        <a:rPr lang="ko-KR" altLang="en-US" sz="1100" dirty="0" err="1"/>
+                        <a:t>디푼디푼</a:t>
+                      </a:r>
+                      <a:endParaRPr lang="ko-KR" altLang="en-US" sz="1100" dirty="0"/>
+                    </a:p>
+                  </a:txBody>
+                  <a:tcPr/>
+                </a:tc>
+                <a:extLst>
+                  <a:ext uri="{0D108BD9-81ED-4DB2-BD59-A6C34878D82A}">
+                    <a16:rowId xmlns:a16="http://schemas.microsoft.com/office/drawing/2014/main" val="1280700828"/>
+                  </a:ext>
+                </a:extLst>
+              </a:tr>
+              <a:tr h="280533">
+                <a:tc>
+                  <a:txBody>
+                    <a:bodyPr/>
+                    <a:lstStyle/>
+                    <a:p>
+                      <a:pPr algn="ctr" latinLnBrk="1"/>
+                      <a:r>
+                        <a:rPr lang="en-US" altLang="ko-KR" sz="1100" dirty="0"/>
+                        <a:t>12652135</a:t>
+                      </a:r>
+                      <a:endParaRPr lang="ko-KR" altLang="en-US" sz="1100" dirty="0"/>
+                    </a:p>
+                  </a:txBody>
+                  <a:tcPr/>
+                </a:tc>
+                <a:tc>
+                  <a:txBody>
+                    <a:bodyPr/>
+                    <a:lstStyle/>
+                    <a:p>
+                      <a:pPr algn="ctr" latinLnBrk="1"/>
+                      <a:r>
+                        <a:rPr lang="en-US" altLang="ko-KR" sz="1100" dirty="0"/>
+                        <a:t>asdf54</a:t>
+                      </a:r>
+                      <a:endParaRPr lang="ko-KR" altLang="en-US" sz="1100" dirty="0"/>
+                    </a:p>
+                  </a:txBody>
+                  <a:tcPr/>
+                </a:tc>
+                <a:tc>
+                  <a:txBody>
+                    <a:bodyPr/>
+                    <a:lstStyle/>
+                    <a:p>
+                      <a:pPr algn="ctr" latinLnBrk="1"/>
+                      <a:r>
+                        <a:rPr lang="ko-KR" altLang="en-US" sz="1100" dirty="0"/>
+                        <a:t>당신이 만든 </a:t>
+                      </a:r>
+                      <a:r>
+                        <a:rPr lang="en-US" altLang="ko-KR" sz="1100" dirty="0"/>
+                        <a:t>PW</a:t>
+                      </a:r>
+                      <a:endParaRPr lang="ko-KR" altLang="en-US" sz="1100" dirty="0"/>
+                    </a:p>
+                  </a:txBody>
+                  <a:tcPr/>
+                </a:tc>
+                <a:extLst>
+                  <a:ext uri="{0D108BD9-81ED-4DB2-BD59-A6C34878D82A}">
+                    <a16:rowId xmlns:a16="http://schemas.microsoft.com/office/drawing/2014/main" val="3039029445"/>
+                  </a:ext>
+                </a:extLst>
+              </a:tr>
+            </a:tbl>
+          </a:graphicData>
+        </a:graphic>
+      </p:graphicFrame>
+      <p:sp>
+        <p:nvSpPr>
+          <p:cNvPr id="6" name="TextBox 5">
+            <a:extLst>
+              <a:ext uri="{FF2B5EF4-FFF2-40B4-BE49-F238E27FC236}">
+                <a16:creationId xmlns:a16="http://schemas.microsoft.com/office/drawing/2014/main" id="{AABB224A-72A1-4E4F-A9D0-AC0220BCB9E4}"/>
+              </a:ext>
+            </a:extLst>
+          </p:cNvPr>
+          <p:cNvSpPr txBox="1"/>
+          <p:nvPr/>
+        </p:nvSpPr>
+        <p:spPr>
+          <a:xfrm>
+            <a:off x="513126" y="767205"/>
+            <a:ext cx="5452844" cy="369332"/>
+          </a:xfrm>
+          <a:prstGeom prst="rect">
+            <a:avLst/>
+          </a:prstGeom>
+          <a:noFill/>
+        </p:spPr>
+        <p:txBody>
+          <a:bodyPr wrap="square" rtlCol="0">
+            <a:spAutoFit/>
+          </a:bodyPr>
+          <a:lstStyle/>
+          <a:p>
+            <a:r>
+              <a:rPr lang="ko-KR" altLang="en-US"/>
+              <a:t>로그인 할 때 확인할 용도의 테이블</a:t>
+            </a:r>
+            <a:endParaRPr lang="en-US" altLang="ko-KR" dirty="0"/>
+          </a:p>
+        </p:txBody>
+      </p:sp>
+      <p:sp>
+        <p:nvSpPr>
+          <p:cNvPr id="7" name="TextBox 6">
+            <a:extLst>
+              <a:ext uri="{FF2B5EF4-FFF2-40B4-BE49-F238E27FC236}">
+                <a16:creationId xmlns:a16="http://schemas.microsoft.com/office/drawing/2014/main" id="{1626B8B2-0B32-46E5-B63B-C401C6350475}"/>
+              </a:ext>
+            </a:extLst>
+          </p:cNvPr>
+          <p:cNvSpPr txBox="1"/>
+          <p:nvPr/>
+        </p:nvSpPr>
+        <p:spPr>
+          <a:xfrm>
+            <a:off x="7360200" y="234784"/>
+            <a:ext cx="5452844" cy="369332"/>
+          </a:xfrm>
+          <a:prstGeom prst="rect">
+            <a:avLst/>
+          </a:prstGeom>
+          <a:noFill/>
+        </p:spPr>
+        <p:txBody>
+          <a:bodyPr wrap="square" rtlCol="0">
+            <a:spAutoFit/>
+          </a:bodyPr>
+          <a:lstStyle/>
+          <a:p>
+            <a:r>
+              <a:rPr lang="en-US" altLang="ko-KR" dirty="0"/>
+              <a:t>Account Information</a:t>
+            </a:r>
+          </a:p>
+        </p:txBody>
+      </p:sp>
+      <p:sp>
+        <p:nvSpPr>
+          <p:cNvPr id="8" name="TextBox 7">
+            <a:extLst>
+              <a:ext uri="{FF2B5EF4-FFF2-40B4-BE49-F238E27FC236}">
+                <a16:creationId xmlns:a16="http://schemas.microsoft.com/office/drawing/2014/main" id="{AE4A04F0-7ED3-40A0-BED4-D9AD12595699}"/>
+              </a:ext>
+            </a:extLst>
+          </p:cNvPr>
+          <p:cNvSpPr txBox="1"/>
+          <p:nvPr/>
+        </p:nvSpPr>
+        <p:spPr>
+          <a:xfrm>
+            <a:off x="606803" y="3381023"/>
+            <a:ext cx="5452844" cy="369332"/>
+          </a:xfrm>
+          <a:prstGeom prst="rect">
+            <a:avLst/>
+          </a:prstGeom>
+          <a:noFill/>
+        </p:spPr>
+        <p:txBody>
+          <a:bodyPr wrap="square" rtlCol="0">
+            <a:spAutoFit/>
+          </a:bodyPr>
+          <a:lstStyle/>
+          <a:p>
+            <a:r>
+              <a:rPr lang="ko-KR" altLang="en-US" dirty="0"/>
+              <a:t>로그인 할 때 확인할 용도의 테이블</a:t>
+            </a:r>
+            <a:endParaRPr lang="en-US" altLang="ko-KR" dirty="0"/>
+          </a:p>
+        </p:txBody>
+      </p:sp>
+      <p:graphicFrame>
+        <p:nvGraphicFramePr>
+          <p:cNvPr id="10" name="표 13">
+            <a:extLst>
+              <a:ext uri="{FF2B5EF4-FFF2-40B4-BE49-F238E27FC236}">
+                <a16:creationId xmlns:a16="http://schemas.microsoft.com/office/drawing/2014/main" id="{F435584B-A83E-4C3F-A225-A383F9D53F6C}"/>
+              </a:ext>
+            </a:extLst>
+          </p:cNvPr>
+          <p:cNvGraphicFramePr>
+            <a:graphicFrameLocks noGrp="1"/>
+          </p:cNvGraphicFramePr>
+          <p:nvPr>
+            <p:extLst>
+              <p:ext uri="{D42A27DB-BD31-4B8C-83A1-F6EECF244321}">
+                <p14:modId xmlns:p14="http://schemas.microsoft.com/office/powerpoint/2010/main" val="3299007254"/>
+              </p:ext>
+            </p:extLst>
+          </p:nvPr>
+        </p:nvGraphicFramePr>
+        <p:xfrm>
+          <a:off x="6859551" y="653259"/>
+          <a:ext cx="4943735" cy="3426771"/>
+        </p:xfrm>
+        <a:graphic>
+          <a:graphicData uri="http://schemas.openxmlformats.org/drawingml/2006/table">
+            <a:tbl>
+              <a:tblPr firstRow="1" bandRow="1">
+                <a:tableStyleId>{5C22544A-7EE6-4342-B048-85BDC9FD1C3A}</a:tableStyleId>
+              </a:tblPr>
+              <a:tblGrid>
+                <a:gridCol w="988747">
                   <a:extLst>
                     <a:ext uri="{9D8B030D-6E8A-4147-A177-3AD203B41FA5}">
                       <a16:colId xmlns:a16="http://schemas.microsoft.com/office/drawing/2014/main" val="4214423747"/>
                     </a:ext>
                   </a:extLst>
                 </a:gridCol>
-                <a:gridCol w="1012551">
+                <a:gridCol w="988747">
                   <a:extLst>
                     <a:ext uri="{9D8B030D-6E8A-4147-A177-3AD203B41FA5}">
                       <a16:colId xmlns:a16="http://schemas.microsoft.com/office/drawing/2014/main" val="498503476"/>
                     </a:ext>
                   </a:extLst>
                 </a:gridCol>
-                <a:gridCol w="1012551">
-                  <a:extLst>
-                    <a:ext uri="{9D8B030D-6E8A-4147-A177-3AD203B41FA5}">
-                      <a16:colId xmlns:a16="http://schemas.microsoft.com/office/drawing/2014/main" val="3718852409"/>
-                    </a:ext>
-                  </a:extLst>
-                </a:gridCol>
-                <a:gridCol w="1012551">
+                <a:gridCol w="988747">
                   <a:extLst>
                     <a:ext uri="{9D8B030D-6E8A-4147-A177-3AD203B41FA5}">
                       <a16:colId xmlns:a16="http://schemas.microsoft.com/office/drawing/2014/main" val="1068844153"/>
                     </a:ext>
                   </a:extLst>
                 </a:gridCol>
+                <a:gridCol w="988747">
+                  <a:extLst>
+                    <a:ext uri="{9D8B030D-6E8A-4147-A177-3AD203B41FA5}">
+                      <a16:colId xmlns:a16="http://schemas.microsoft.com/office/drawing/2014/main" val="1899356460"/>
+                    </a:ext>
+                  </a:extLst>
+                </a:gridCol>
+                <a:gridCol w="988747">
+                  <a:extLst>
+                    <a:ext uri="{9D8B030D-6E8A-4147-A177-3AD203B41FA5}">
+                      <a16:colId xmlns:a16="http://schemas.microsoft.com/office/drawing/2014/main" val="3452354355"/>
+                    </a:ext>
+                  </a:extLst>
+                </a:gridCol>
               </a:tblGrid>
-              <a:tr h="594417">
-                <a:tc>
-                  <a:txBody>
-                    <a:bodyPr/>
-                    <a:lstStyle/>
-                    <a:p>
-                      <a:pPr algn="ctr" latinLnBrk="1"/>
+              <a:tr h="677801">
+                <a:tc>
+                  <a:txBody>
+                    <a:bodyPr/>
+                    <a:lstStyle/>
+                    <a:p>
+                      <a:pPr algn="ctr" latinLnBrk="1"/>
+                      <a:r>
+                        <a:rPr lang="en-US" altLang="ko-KR" dirty="0"/>
+                        <a:t>Primary</a:t>
+                      </a:r>
+                      <a:r>
+                        <a:rPr lang="ko-KR" altLang="en-US" dirty="0"/>
+                        <a:t> </a:t>
+                      </a:r>
                       <a:r>
                         <a:rPr lang="en-US" altLang="ko-KR" dirty="0"/>
                         <a:t>Key</a:t>
@@ -4265,8 +4925,8 @@
                     <a:p>
                       <a:pPr algn="ctr" latinLnBrk="1"/>
                       <a:r>
-                        <a:rPr lang="en-US" altLang="ko-KR" dirty="0"/>
-                        <a:t>PW</a:t>
+                        <a:rPr lang="en-US" altLang="ko-KR" dirty="0" err="1"/>
+                        <a:t>AccountName</a:t>
                       </a:r>
                       <a:endParaRPr lang="ko-KR" altLang="en-US" dirty="0"/>
                     </a:p>
@@ -4281,7 +4941,29 @@
                       <a:pPr algn="ctr" latinLnBrk="1"/>
                       <a:r>
                         <a:rPr lang="ko-KR" altLang="en-US" dirty="0" err="1"/>
-                        <a:t>계정명</a:t>
+                        <a:t>드래곤가드</a:t>
+                      </a:r>
+                      <a:r>
+                        <a:rPr lang="ko-KR" altLang="en-US" dirty="0"/>
+                        <a:t> 상자 먹었는지 여부</a:t>
+                      </a:r>
+                    </a:p>
+                  </a:txBody>
+                  <a:tcPr/>
+                </a:tc>
+                <a:tc>
+                  <a:txBody>
+                    <a:bodyPr/>
+                    <a:lstStyle/>
+                    <a:p>
+                      <a:pPr algn="ctr" latinLnBrk="1"/>
+                      <a:r>
+                        <a:rPr lang="en-US" altLang="ko-KR" dirty="0" err="1"/>
+                        <a:t>Accountwide</a:t>
+                      </a:r>
+                      <a:r>
+                        <a:rPr lang="en-US" altLang="ko-KR" dirty="0"/>
+                        <a:t> Achievement</a:t>
                       </a:r>
                       <a:endParaRPr lang="ko-KR" altLang="en-US" dirty="0"/>
                     </a:p>
@@ -4294,7 +4976,7 @@
                   </a:ext>
                 </a:extLst>
               </a:tr>
-              <a:tr h="594417">
+              <a:tr h="280533">
                 <a:tc>
                   <a:txBody>
                     <a:bodyPr/>
@@ -4302,10 +4984,10 @@
                     <a:p>
                       <a:pPr algn="ctr" latinLnBrk="1"/>
                       <a:r>
-                        <a:rPr lang="en-US" altLang="ko-KR" dirty="0"/>
+                        <a:rPr lang="en-US" altLang="ko-KR" sz="1100" dirty="0"/>
                         <a:t>12416134</a:t>
                       </a:r>
-                      <a:endParaRPr lang="ko-KR" altLang="en-US" dirty="0"/>
+                      <a:endParaRPr lang="ko-KR" altLang="en-US" sz="1100" dirty="0"/>
                     </a:p>
                   </a:txBody>
                   <a:tcPr/>
@@ -4317,10 +4999,10 @@
                     <a:p>
                       <a:pPr algn="ctr" latinLnBrk="1"/>
                       <a:r>
-                        <a:rPr lang="en-US" altLang="ko-KR" dirty="0"/>
+                        <a:rPr lang="en-US" altLang="ko-KR" sz="1100" dirty="0"/>
                         <a:t>Asrhgy0125</a:t>
                       </a:r>
-                      <a:endParaRPr lang="ko-KR" altLang="en-US" dirty="0"/>
+                      <a:endParaRPr lang="ko-KR" altLang="en-US" sz="1100" dirty="0"/>
                     </a:p>
                   </a:txBody>
                   <a:tcPr/>
@@ -4332,25 +5014,32 @@
                     <a:p>
                       <a:pPr algn="ctr" latinLnBrk="1"/>
                       <a:r>
-                        <a:rPr lang="ko-KR" altLang="en-US" dirty="0" err="1"/>
-                        <a:t>디푼디푼</a:t>
-                      </a:r>
-                      <a:endParaRPr lang="ko-KR" altLang="en-US" dirty="0"/>
-                    </a:p>
-                  </a:txBody>
-                  <a:tcPr/>
-                </a:tc>
-                <a:tc>
-                  <a:txBody>
-                    <a:bodyPr/>
-                    <a:lstStyle/>
-                    <a:p>
-                      <a:pPr algn="ctr" latinLnBrk="1"/>
-                      <a:r>
-                        <a:rPr lang="en-US" altLang="ko-KR" dirty="0"/>
+                        <a:rPr lang="en-US" altLang="ko-KR" sz="1100" dirty="0"/>
                         <a:t>@Dipoon</a:t>
                       </a:r>
-                      <a:endParaRPr lang="ko-KR" altLang="en-US" dirty="0"/>
+                      <a:endParaRPr lang="ko-KR" altLang="en-US" sz="1100" dirty="0"/>
+                    </a:p>
+                  </a:txBody>
+                  <a:tcPr/>
+                </a:tc>
+                <a:tc>
+                  <a:txBody>
+                    <a:bodyPr/>
+                    <a:lstStyle/>
+                    <a:p>
+                      <a:pPr algn="ctr" latinLnBrk="1"/>
+                      <a:endParaRPr lang="ko-KR" altLang="en-US" sz="1100" dirty="0"/>
+                    </a:p>
+                  </a:txBody>
+                  <a:tcPr/>
+                </a:tc>
+                <a:tc>
+                  <a:txBody>
+                    <a:bodyPr/>
+                    <a:lstStyle/>
+                    <a:p>
+                      <a:pPr algn="ctr" latinLnBrk="1"/>
+                      <a:endParaRPr lang="ko-KR" altLang="en-US" sz="1100" dirty="0"/>
                     </a:p>
                   </a:txBody>
                   <a:tcPr/>
@@ -4361,7 +5050,18 @@
                   </a:ext>
                 </a:extLst>
               </a:tr>
-              <a:tr h="594417">
+              <a:tr h="280533">
+                <a:tc>
+                  <a:txBody>
+                    <a:bodyPr/>
+                    <a:lstStyle/>
+                    <a:p>
+                      <a:pPr algn="ctr" latinLnBrk="1"/>
+                      <a:endParaRPr lang="ko-KR" altLang="en-US" sz="1100" dirty="0"/>
+                    </a:p>
+                  </a:txBody>
+                  <a:tcPr/>
+                </a:tc>
                 <a:tc>
                   <a:txBody>
                     <a:bodyPr/>
@@ -4369,10 +5069,369 @@
                     <a:p>
                       <a:pPr algn="ctr" latinLnBrk="1"/>
                       <a:r>
-                        <a:rPr lang="en-US" altLang="ko-KR" dirty="0"/>
+                        <a:rPr lang="en-US" altLang="ko-KR" sz="1100" dirty="0"/>
+                        <a:t>Asrhgy0125</a:t>
+                      </a:r>
+                      <a:endParaRPr lang="ko-KR" altLang="en-US" sz="1100" dirty="0"/>
+                    </a:p>
+                  </a:txBody>
+                  <a:tcPr/>
+                </a:tc>
+                <a:tc>
+                  <a:txBody>
+                    <a:bodyPr/>
+                    <a:lstStyle/>
+                    <a:p>
+                      <a:pPr marL="0" marR="0" lvl="0" indent="0" algn="ctr" defTabSz="914400" rtl="0" eaLnBrk="1" fontAlgn="auto" latinLnBrk="1" hangingPunct="1">
+                        <a:lnSpc>
+                          <a:spcPct val="100000"/>
+                        </a:lnSpc>
+                        <a:spcBef>
+                          <a:spcPts val="0"/>
+                        </a:spcBef>
+                        <a:spcAft>
+                          <a:spcPts val="0"/>
+                        </a:spcAft>
+                        <a:buClrTx/>
+                        <a:buSzTx/>
+                        <a:buFontTx/>
+                        <a:buNone/>
+                        <a:tabLst/>
+                        <a:defRPr/>
+                      </a:pPr>
+                      <a:r>
+                        <a:rPr lang="en-US" altLang="ko-KR" sz="1100" dirty="0"/>
+                        <a:t>@Dipoon</a:t>
+                      </a:r>
+                      <a:endParaRPr lang="ko-KR" altLang="en-US" sz="1100" dirty="0"/>
+                    </a:p>
+                  </a:txBody>
+                  <a:tcPr/>
+                </a:tc>
+                <a:tc>
+                  <a:txBody>
+                    <a:bodyPr/>
+                    <a:lstStyle/>
+                    <a:p>
+                      <a:pPr algn="ctr" latinLnBrk="1"/>
+                      <a:endParaRPr lang="ko-KR" altLang="en-US" sz="1100" dirty="0"/>
+                    </a:p>
+                  </a:txBody>
+                  <a:tcPr/>
+                </a:tc>
+                <a:tc>
+                  <a:txBody>
+                    <a:bodyPr/>
+                    <a:lstStyle/>
+                    <a:p>
+                      <a:pPr algn="ctr" latinLnBrk="1"/>
+                      <a:endParaRPr lang="ko-KR" altLang="en-US" sz="1100" dirty="0"/>
+                    </a:p>
+                  </a:txBody>
+                  <a:tcPr/>
+                </a:tc>
+                <a:extLst>
+                  <a:ext uri="{0D108BD9-81ED-4DB2-BD59-A6C34878D82A}">
+                    <a16:rowId xmlns:a16="http://schemas.microsoft.com/office/drawing/2014/main" val="4057124187"/>
+                  </a:ext>
+                </a:extLst>
+              </a:tr>
+              <a:tr h="280533">
+                <a:tc>
+                  <a:txBody>
+                    <a:bodyPr/>
+                    <a:lstStyle/>
+                    <a:p>
+                      <a:pPr algn="ctr" latinLnBrk="1"/>
+                      <a:endParaRPr lang="ko-KR" altLang="en-US" sz="1100" dirty="0"/>
+                    </a:p>
+                  </a:txBody>
+                  <a:tcPr/>
+                </a:tc>
+                <a:tc>
+                  <a:txBody>
+                    <a:bodyPr/>
+                    <a:lstStyle/>
+                    <a:p>
+                      <a:pPr algn="ctr" latinLnBrk="1"/>
+                      <a:r>
+                        <a:rPr lang="en-US" altLang="ko-KR" sz="1100" dirty="0"/>
+                        <a:t>Asrhgy0125</a:t>
+                      </a:r>
+                      <a:endParaRPr lang="ko-KR" altLang="en-US" sz="1100" dirty="0"/>
+                    </a:p>
+                  </a:txBody>
+                  <a:tcPr/>
+                </a:tc>
+                <a:tc>
+                  <a:txBody>
+                    <a:bodyPr/>
+                    <a:lstStyle/>
+                    <a:p>
+                      <a:pPr algn="ctr" latinLnBrk="1"/>
+                      <a:endParaRPr lang="ko-KR" altLang="en-US" sz="1100" dirty="0"/>
+                    </a:p>
+                  </a:txBody>
+                  <a:tcPr/>
+                </a:tc>
+                <a:tc>
+                  <a:txBody>
+                    <a:bodyPr/>
+                    <a:lstStyle/>
+                    <a:p>
+                      <a:pPr algn="ctr" latinLnBrk="1"/>
+                      <a:endParaRPr lang="ko-KR" altLang="en-US" sz="1100" dirty="0"/>
+                    </a:p>
+                  </a:txBody>
+                  <a:tcPr/>
+                </a:tc>
+                <a:tc>
+                  <a:txBody>
+                    <a:bodyPr/>
+                    <a:lstStyle/>
+                    <a:p>
+                      <a:pPr algn="ctr" latinLnBrk="1"/>
+                      <a:endParaRPr lang="ko-KR" altLang="en-US" sz="1100" dirty="0"/>
+                    </a:p>
+                  </a:txBody>
+                  <a:tcPr/>
+                </a:tc>
+                <a:extLst>
+                  <a:ext uri="{0D108BD9-81ED-4DB2-BD59-A6C34878D82A}">
+                    <a16:rowId xmlns:a16="http://schemas.microsoft.com/office/drawing/2014/main" val="2928266608"/>
+                  </a:ext>
+                </a:extLst>
+              </a:tr>
+              <a:tr h="280533">
+                <a:tc>
+                  <a:txBody>
+                    <a:bodyPr/>
+                    <a:lstStyle/>
+                    <a:p>
+                      <a:pPr algn="ctr" latinLnBrk="1"/>
+                      <a:endParaRPr lang="ko-KR" altLang="en-US" sz="1100" dirty="0"/>
+                    </a:p>
+                  </a:txBody>
+                  <a:tcPr/>
+                </a:tc>
+                <a:tc>
+                  <a:txBody>
+                    <a:bodyPr/>
+                    <a:lstStyle/>
+                    <a:p>
+                      <a:pPr algn="ctr" latinLnBrk="1"/>
+                      <a:r>
+                        <a:rPr lang="en-US" altLang="ko-KR" sz="1100" dirty="0"/>
+                        <a:t>Asrhgy0125</a:t>
+                      </a:r>
+                      <a:endParaRPr lang="ko-KR" altLang="en-US" sz="1100" dirty="0"/>
+                    </a:p>
+                  </a:txBody>
+                  <a:tcPr/>
+                </a:tc>
+                <a:tc>
+                  <a:txBody>
+                    <a:bodyPr/>
+                    <a:lstStyle/>
+                    <a:p>
+                      <a:pPr marL="0" marR="0" lvl="0" indent="0" algn="ctr" defTabSz="914400" rtl="0" eaLnBrk="1" fontAlgn="auto" latinLnBrk="1" hangingPunct="1">
+                        <a:lnSpc>
+                          <a:spcPct val="100000"/>
+                        </a:lnSpc>
+                        <a:spcBef>
+                          <a:spcPts val="0"/>
+                        </a:spcBef>
+                        <a:spcAft>
+                          <a:spcPts val="0"/>
+                        </a:spcAft>
+                        <a:buClrTx/>
+                        <a:buSzTx/>
+                        <a:buFontTx/>
+                        <a:buNone/>
+                        <a:tabLst/>
+                        <a:defRPr/>
+                      </a:pPr>
+                      <a:r>
+                        <a:rPr lang="en-US" altLang="ko-KR" sz="1100" dirty="0"/>
+                        <a:t>@Chead</a:t>
+                      </a:r>
+                      <a:endParaRPr lang="ko-KR" altLang="en-US" sz="1100" dirty="0"/>
+                    </a:p>
+                  </a:txBody>
+                  <a:tcPr/>
+                </a:tc>
+                <a:tc>
+                  <a:txBody>
+                    <a:bodyPr/>
+                    <a:lstStyle/>
+                    <a:p>
+                      <a:pPr algn="ctr" latinLnBrk="1"/>
+                      <a:endParaRPr lang="ko-KR" altLang="en-US" sz="1100" dirty="0"/>
+                    </a:p>
+                  </a:txBody>
+                  <a:tcPr/>
+                </a:tc>
+                <a:tc>
+                  <a:txBody>
+                    <a:bodyPr/>
+                    <a:lstStyle/>
+                    <a:p>
+                      <a:pPr algn="ctr" latinLnBrk="1"/>
+                      <a:endParaRPr lang="ko-KR" altLang="en-US" sz="1100" dirty="0"/>
+                    </a:p>
+                  </a:txBody>
+                  <a:tcPr/>
+                </a:tc>
+                <a:extLst>
+                  <a:ext uri="{0D108BD9-81ED-4DB2-BD59-A6C34878D82A}">
+                    <a16:rowId xmlns:a16="http://schemas.microsoft.com/office/drawing/2014/main" val="1510154849"/>
+                  </a:ext>
+                </a:extLst>
+              </a:tr>
+              <a:tr h="280533">
+                <a:tc>
+                  <a:txBody>
+                    <a:bodyPr/>
+                    <a:lstStyle/>
+                    <a:p>
+                      <a:pPr algn="ctr" latinLnBrk="1"/>
+                      <a:endParaRPr lang="ko-KR" altLang="en-US" sz="1100" dirty="0"/>
+                    </a:p>
+                  </a:txBody>
+                  <a:tcPr/>
+                </a:tc>
+                <a:tc>
+                  <a:txBody>
+                    <a:bodyPr/>
+                    <a:lstStyle/>
+                    <a:p>
+                      <a:pPr algn="ctr" latinLnBrk="1"/>
+                      <a:r>
+                        <a:rPr lang="en-US" altLang="ko-KR" sz="1100" dirty="0"/>
+                        <a:t>Asrhgy0125</a:t>
+                      </a:r>
+                      <a:endParaRPr lang="ko-KR" altLang="en-US" sz="1100" dirty="0"/>
+                    </a:p>
+                  </a:txBody>
+                  <a:tcPr/>
+                </a:tc>
+                <a:tc>
+                  <a:txBody>
+                    <a:bodyPr/>
+                    <a:lstStyle/>
+                    <a:p>
+                      <a:pPr algn="ctr" latinLnBrk="1"/>
+                      <a:endParaRPr lang="ko-KR" altLang="en-US" sz="1100" dirty="0"/>
+                    </a:p>
+                  </a:txBody>
+                  <a:tcPr/>
+                </a:tc>
+                <a:tc>
+                  <a:txBody>
+                    <a:bodyPr/>
+                    <a:lstStyle/>
+                    <a:p>
+                      <a:pPr algn="ctr" latinLnBrk="1"/>
+                      <a:endParaRPr lang="ko-KR" altLang="en-US" sz="1100" dirty="0"/>
+                    </a:p>
+                  </a:txBody>
+                  <a:tcPr/>
+                </a:tc>
+                <a:tc>
+                  <a:txBody>
+                    <a:bodyPr/>
+                    <a:lstStyle/>
+                    <a:p>
+                      <a:pPr algn="ctr" latinLnBrk="1"/>
+                      <a:endParaRPr lang="ko-KR" altLang="en-US" sz="1100" dirty="0"/>
+                    </a:p>
+                  </a:txBody>
+                  <a:tcPr/>
+                </a:tc>
+                <a:extLst>
+                  <a:ext uri="{0D108BD9-81ED-4DB2-BD59-A6C34878D82A}">
+                    <a16:rowId xmlns:a16="http://schemas.microsoft.com/office/drawing/2014/main" val="386608902"/>
+                  </a:ext>
+                </a:extLst>
+              </a:tr>
+              <a:tr h="280533">
+                <a:tc>
+                  <a:txBody>
+                    <a:bodyPr/>
+                    <a:lstStyle/>
+                    <a:p>
+                      <a:pPr algn="ctr" latinLnBrk="1"/>
+                      <a:endParaRPr lang="ko-KR" altLang="en-US" sz="1100" dirty="0"/>
+                    </a:p>
+                  </a:txBody>
+                  <a:tcPr/>
+                </a:tc>
+                <a:tc>
+                  <a:txBody>
+                    <a:bodyPr/>
+                    <a:lstStyle/>
+                    <a:p>
+                      <a:pPr algn="ctr" latinLnBrk="1"/>
+                      <a:r>
+                        <a:rPr lang="en-US" altLang="ko-KR" sz="1100" dirty="0"/>
+                        <a:t>Asrhgy0125</a:t>
+                      </a:r>
+                      <a:endParaRPr lang="ko-KR" altLang="en-US" sz="1100" dirty="0"/>
+                    </a:p>
+                  </a:txBody>
+                  <a:tcPr/>
+                </a:tc>
+                <a:tc>
+                  <a:txBody>
+                    <a:bodyPr/>
+                    <a:lstStyle/>
+                    <a:p>
+                      <a:pPr algn="ctr" latinLnBrk="1"/>
+                      <a:endParaRPr lang="ko-KR" altLang="en-US" sz="1100" dirty="0"/>
+                    </a:p>
+                  </a:txBody>
+                  <a:tcPr/>
+                </a:tc>
+                <a:tc>
+                  <a:txBody>
+                    <a:bodyPr/>
+                    <a:lstStyle/>
+                    <a:p>
+                      <a:pPr algn="ctr" latinLnBrk="1"/>
+                      <a:endParaRPr lang="ko-KR" altLang="en-US" sz="1100" dirty="0"/>
+                    </a:p>
+                  </a:txBody>
+                  <a:tcPr/>
+                </a:tc>
+                <a:tc>
+                  <a:txBody>
+                    <a:bodyPr/>
+                    <a:lstStyle/>
+                    <a:p>
+                      <a:pPr algn="ctr" latinLnBrk="1"/>
+                      <a:endParaRPr lang="ko-KR" altLang="en-US" sz="1100" dirty="0"/>
+                    </a:p>
+                  </a:txBody>
+                  <a:tcPr/>
+                </a:tc>
+                <a:extLst>
+                  <a:ext uri="{0D108BD9-81ED-4DB2-BD59-A6C34878D82A}">
+                    <a16:rowId xmlns:a16="http://schemas.microsoft.com/office/drawing/2014/main" val="219303351"/>
+                  </a:ext>
+                </a:extLst>
+              </a:tr>
+              <a:tr h="280533">
+                <a:tc>
+                  <a:txBody>
+                    <a:bodyPr/>
+                    <a:lstStyle/>
+                    <a:p>
+                      <a:pPr algn="ctr" latinLnBrk="1"/>
+                      <a:r>
+                        <a:rPr lang="en-US" altLang="ko-KR" sz="1100" dirty="0"/>
                         <a:t>12652135</a:t>
                       </a:r>
-                      <a:endParaRPr lang="ko-KR" altLang="en-US" dirty="0"/>
+                      <a:endParaRPr lang="ko-KR" altLang="en-US" sz="1100" dirty="0"/>
                     </a:p>
                   </a:txBody>
                   <a:tcPr/>
@@ -4384,44 +5443,43 @@
                     <a:p>
                       <a:pPr algn="ctr" latinLnBrk="1"/>
                       <a:r>
-                        <a:rPr lang="en-US" altLang="ko-KR" dirty="0"/>
+                        <a:rPr lang="en-US" altLang="ko-KR" sz="1100" dirty="0"/>
                         <a:t>asdf54</a:t>
                       </a:r>
-                      <a:endParaRPr lang="ko-KR" altLang="en-US" dirty="0"/>
-                    </a:p>
-                  </a:txBody>
-                  <a:tcPr/>
-                </a:tc>
-                <a:tc>
-                  <a:txBody>
-                    <a:bodyPr/>
-                    <a:lstStyle/>
-                    <a:p>
-                      <a:pPr algn="ctr" latinLnBrk="1"/>
-                      <a:r>
-                        <a:rPr lang="ko-KR" altLang="en-US" dirty="0"/>
-                        <a:t>당신이 만든 </a:t>
-                      </a:r>
-                      <a:r>
-                        <a:rPr lang="en-US" altLang="ko-KR" dirty="0"/>
-                        <a:t>PW</a:t>
-                      </a:r>
-                      <a:endParaRPr lang="ko-KR" altLang="en-US" dirty="0"/>
-                    </a:p>
-                  </a:txBody>
-                  <a:tcPr/>
-                </a:tc>
-                <a:tc>
-                  <a:txBody>
-                    <a:bodyPr/>
-                    <a:lstStyle/>
-                    <a:p>
-                      <a:pPr algn="ctr" latinLnBrk="1"/>
-                      <a:r>
-                        <a:rPr lang="en-US" altLang="ko-KR" dirty="0"/>
-                        <a:t>@Chead</a:t>
-                      </a:r>
-                      <a:endParaRPr lang="ko-KR" altLang="en-US" dirty="0"/>
+                      <a:endParaRPr lang="ko-KR" altLang="en-US" sz="1100" dirty="0"/>
+                    </a:p>
+                  </a:txBody>
+                  <a:tcPr/>
+                </a:tc>
+                <a:tc>
+                  <a:txBody>
+                    <a:bodyPr/>
+                    <a:lstStyle/>
+                    <a:p>
+                      <a:pPr algn="ctr" latinLnBrk="1"/>
+                      <a:endParaRPr lang="ko-KR" altLang="en-US" sz="1100" dirty="0"/>
+                    </a:p>
+                  </a:txBody>
+                  <a:tcPr/>
+                </a:tc>
+                <a:tc>
+                  <a:txBody>
+                    <a:bodyPr/>
+                    <a:lstStyle/>
+                    <a:p>
+                      <a:pPr algn="ctr" latinLnBrk="1"/>
+                      <a:endParaRPr lang="ko-KR" altLang="en-US" sz="1100" dirty="0"/>
+                    </a:p>
+                  </a:txBody>
+                  <a:tcPr/>
+                </a:tc>
+                <a:tc>
+                  <a:txBody>
+                    <a:bodyPr/>
+                    <a:lstStyle/>
+                    <a:p>
+                      <a:pPr algn="ctr" latinLnBrk="1"/>
+                      <a:endParaRPr lang="ko-KR" altLang="en-US" sz="1100" dirty="0"/>
                     </a:p>
                   </a:txBody>
                   <a:tcPr/>
@@ -4436,1754 +5494,1343 @@
           </a:graphicData>
         </a:graphic>
       </p:graphicFrame>
-      <mc:AlternateContent xmlns:mc="http://schemas.openxmlformats.org/markup-compatibility/2006">
-        <mc:Choice xmlns:a14="http://schemas.microsoft.com/office/drawing/2010/main" Requires="a14">
-          <p:graphicFrame>
-            <p:nvGraphicFramePr>
-              <p:cNvPr id="22" name="표 13">
+      <p:graphicFrame>
+        <p:nvGraphicFramePr>
+          <p:cNvPr id="4" name="표 13">
+            <a:extLst>
+              <a:ext uri="{FF2B5EF4-FFF2-40B4-BE49-F238E27FC236}">
+                <a16:creationId xmlns:a16="http://schemas.microsoft.com/office/drawing/2014/main" id="{6DA08E87-7929-4965-BF7A-6520E349FD96}"/>
+              </a:ext>
+            </a:extLst>
+          </p:cNvPr>
+          <p:cNvGraphicFramePr>
+            <a:graphicFrameLocks noGrp="1"/>
+          </p:cNvGraphicFramePr>
+          <p:nvPr>
+            <p:extLst>
+              <p:ext uri="{D42A27DB-BD31-4B8C-83A1-F6EECF244321}">
+                <p14:modId xmlns:p14="http://schemas.microsoft.com/office/powerpoint/2010/main" val="2297976562"/>
+              </p:ext>
+            </p:extLst>
+          </p:nvPr>
+        </p:nvGraphicFramePr>
+        <p:xfrm>
+          <a:off x="606803" y="3868467"/>
+          <a:ext cx="6179670" cy="5727395"/>
+        </p:xfrm>
+        <a:graphic>
+          <a:graphicData uri="http://schemas.openxmlformats.org/drawingml/2006/table">
+            <a:tbl>
+              <a:tblPr firstRow="1" bandRow="1">
+                <a:tableStyleId>{5C22544A-7EE6-4342-B048-85BDC9FD1C3A}</a:tableStyleId>
+              </a:tblPr>
+              <a:tblGrid>
+                <a:gridCol w="1235934">
+                  <a:extLst>
+                    <a:ext uri="{9D8B030D-6E8A-4147-A177-3AD203B41FA5}">
+                      <a16:colId xmlns:a16="http://schemas.microsoft.com/office/drawing/2014/main" val="4214423747"/>
+                    </a:ext>
+                  </a:extLst>
+                </a:gridCol>
+                <a:gridCol w="1235934">
+                  <a:extLst>
+                    <a:ext uri="{9D8B030D-6E8A-4147-A177-3AD203B41FA5}">
+                      <a16:colId xmlns:a16="http://schemas.microsoft.com/office/drawing/2014/main" val="498503476"/>
+                    </a:ext>
+                  </a:extLst>
+                </a:gridCol>
+                <a:gridCol w="1235934">
+                  <a:extLst>
+                    <a:ext uri="{9D8B030D-6E8A-4147-A177-3AD203B41FA5}">
+                      <a16:colId xmlns:a16="http://schemas.microsoft.com/office/drawing/2014/main" val="3206538024"/>
+                    </a:ext>
+                  </a:extLst>
+                </a:gridCol>
+                <a:gridCol w="1235934">
+                  <a:extLst>
+                    <a:ext uri="{9D8B030D-6E8A-4147-A177-3AD203B41FA5}">
+                      <a16:colId xmlns:a16="http://schemas.microsoft.com/office/drawing/2014/main" val="345139190"/>
+                    </a:ext>
+                  </a:extLst>
+                </a:gridCol>
+                <a:gridCol w="1235934">
+                  <a:extLst>
+                    <a:ext uri="{9D8B030D-6E8A-4147-A177-3AD203B41FA5}">
+                      <a16:colId xmlns:a16="http://schemas.microsoft.com/office/drawing/2014/main" val="1899356460"/>
+                    </a:ext>
+                  </a:extLst>
+                </a:gridCol>
+              </a:tblGrid>
+              <a:tr h="677801">
+                <a:tc>
+                  <a:txBody>
+                    <a:bodyPr/>
+                    <a:lstStyle/>
+                    <a:p>
+                      <a:pPr algn="ctr" latinLnBrk="1"/>
+                      <a:r>
+                        <a:rPr lang="en-US" altLang="ko-KR" dirty="0"/>
+                        <a:t>Primary</a:t>
+                      </a:r>
+                      <a:r>
+                        <a:rPr lang="ko-KR" altLang="en-US" dirty="0"/>
+                        <a:t> </a:t>
+                      </a:r>
+                      <a:r>
+                        <a:rPr lang="en-US" altLang="ko-KR" dirty="0"/>
+                        <a:t>Key</a:t>
+                      </a:r>
+                      <a:endParaRPr lang="ko-KR" altLang="en-US" dirty="0"/>
+                    </a:p>
+                  </a:txBody>
+                  <a:tcPr/>
+                </a:tc>
+                <a:tc>
+                  <a:txBody>
+                    <a:bodyPr/>
+                    <a:lstStyle/>
+                    <a:p>
+                      <a:pPr algn="ctr" latinLnBrk="1"/>
+                      <a:r>
+                        <a:rPr lang="en-US" altLang="ko-KR" dirty="0"/>
+                        <a:t>ID</a:t>
+                      </a:r>
+                      <a:endParaRPr lang="ko-KR" altLang="en-US" dirty="0"/>
+                    </a:p>
+                  </a:txBody>
+                  <a:tcPr/>
+                </a:tc>
+                <a:tc>
+                  <a:txBody>
+                    <a:bodyPr/>
+                    <a:lstStyle/>
+                    <a:p>
+                      <a:pPr algn="ctr" latinLnBrk="1"/>
+                      <a:r>
+                        <a:rPr lang="en-US" altLang="ko-KR" dirty="0" err="1"/>
+                        <a:t>CharacterID</a:t>
+                      </a:r>
+                      <a:endParaRPr lang="ko-KR" altLang="en-US" dirty="0"/>
+                    </a:p>
+                  </a:txBody>
+                  <a:tcPr/>
+                </a:tc>
+                <a:tc>
+                  <a:txBody>
+                    <a:bodyPr/>
+                    <a:lstStyle/>
+                    <a:p>
+                      <a:pPr algn="ctr" latinLnBrk="1"/>
+                      <a:r>
+                        <a:rPr lang="en-US" altLang="ko-KR" dirty="0" err="1"/>
+                        <a:t>CharacterName</a:t>
+                      </a:r>
+                      <a:endParaRPr lang="ko-KR" altLang="en-US" dirty="0"/>
+                    </a:p>
+                  </a:txBody>
+                  <a:tcPr/>
+                </a:tc>
+                <a:tc>
+                  <a:txBody>
+                    <a:bodyPr/>
+                    <a:lstStyle/>
+                    <a:p>
+                      <a:pPr algn="ctr" latinLnBrk="1"/>
+                      <a:r>
+                        <a:rPr lang="en-US" altLang="ko-KR" dirty="0" err="1"/>
+                        <a:t>SkillPointTotal</a:t>
+                      </a:r>
+                      <a:endParaRPr lang="ko-KR" altLang="en-US" dirty="0"/>
+                    </a:p>
+                  </a:txBody>
+                  <a:tcPr/>
+                </a:tc>
                 <a:extLst>
-                  <a:ext uri="{FF2B5EF4-FFF2-40B4-BE49-F238E27FC236}">
-                    <a16:creationId xmlns:a16="http://schemas.microsoft.com/office/drawing/2014/main" id="{F3B7A418-2492-41FE-8164-6447496ABD4B}"/>
+                  <a:ext uri="{0D108BD9-81ED-4DB2-BD59-A6C34878D82A}">
+                    <a16:rowId xmlns:a16="http://schemas.microsoft.com/office/drawing/2014/main" val="93829975"/>
                   </a:ext>
                 </a:extLst>
-              </p:cNvPr>
-              <p:cNvGraphicFramePr>
-                <a:graphicFrameLocks noGrp="1"/>
-              </p:cNvGraphicFramePr>
-              <p:nvPr>
-                <p:extLst>
-                  <p:ext uri="{D42A27DB-BD31-4B8C-83A1-F6EECF244321}">
-                    <p14:modId xmlns:p14="http://schemas.microsoft.com/office/powerpoint/2010/main" val="1904228360"/>
-                  </p:ext>
-                </p:extLst>
-              </p:nvPr>
-            </p:nvGraphicFramePr>
-            <p:xfrm>
-              <a:off x="7187965" y="4135075"/>
-              <a:ext cx="5062758" cy="4892097"/>
-            </p:xfrm>
-            <a:graphic>
-              <a:graphicData uri="http://schemas.openxmlformats.org/drawingml/2006/table">
-                <a:tbl>
-                  <a:tblPr firstRow="1" bandRow="1">
-                    <a:tableStyleId>{5C22544A-7EE6-4342-B048-85BDC9FD1C3A}</a:tableStyleId>
-                  </a:tblPr>
-                  <a:tblGrid>
-                    <a:gridCol w="843793">
-                      <a:extLst>
-                        <a:ext uri="{9D8B030D-6E8A-4147-A177-3AD203B41FA5}">
-                          <a16:colId xmlns:a16="http://schemas.microsoft.com/office/drawing/2014/main" val="4214423747"/>
-                        </a:ext>
-                      </a:extLst>
-                    </a:gridCol>
-                    <a:gridCol w="843793">
-                      <a:extLst>
-                        <a:ext uri="{9D8B030D-6E8A-4147-A177-3AD203B41FA5}">
-                          <a16:colId xmlns:a16="http://schemas.microsoft.com/office/drawing/2014/main" val="498503476"/>
-                        </a:ext>
-                      </a:extLst>
-                    </a:gridCol>
-                    <a:gridCol w="843793">
-                      <a:extLst>
-                        <a:ext uri="{9D8B030D-6E8A-4147-A177-3AD203B41FA5}">
-                          <a16:colId xmlns:a16="http://schemas.microsoft.com/office/drawing/2014/main" val="3718852409"/>
-                        </a:ext>
-                      </a:extLst>
-                    </a:gridCol>
-                    <a:gridCol w="843793">
-                      <a:extLst>
-                        <a:ext uri="{9D8B030D-6E8A-4147-A177-3AD203B41FA5}">
-                          <a16:colId xmlns:a16="http://schemas.microsoft.com/office/drawing/2014/main" val="1068844153"/>
-                        </a:ext>
-                      </a:extLst>
-                    </a:gridCol>
-                    <a:gridCol w="843793">
-                      <a:extLst>
-                        <a:ext uri="{9D8B030D-6E8A-4147-A177-3AD203B41FA5}">
-                          <a16:colId xmlns:a16="http://schemas.microsoft.com/office/drawing/2014/main" val="3951477656"/>
-                        </a:ext>
-                      </a:extLst>
-                    </a:gridCol>
-                    <a:gridCol w="843793">
-                      <a:extLst>
-                        <a:ext uri="{9D8B030D-6E8A-4147-A177-3AD203B41FA5}">
-                          <a16:colId xmlns:a16="http://schemas.microsoft.com/office/drawing/2014/main" val="3650633168"/>
-                        </a:ext>
-                      </a:extLst>
-                    </a:gridCol>
-                  </a:tblGrid>
-                  <a:tr h="594417">
-                    <a:tc>
-                      <a:txBody>
-                        <a:bodyPr/>
-                        <a:lstStyle/>
-                        <a:p>
-                          <a:pPr algn="ctr" latinLnBrk="1"/>
-                          <a:r>
-                            <a:rPr lang="en-US" altLang="ko-KR" dirty="0"/>
-                            <a:t>Key</a:t>
-                          </a:r>
-                          <a:endParaRPr lang="ko-KR" altLang="en-US" dirty="0"/>
-                        </a:p>
-                      </a:txBody>
-                      <a:tcPr/>
-                    </a:tc>
-                    <a:tc>
-                      <a:txBody>
-                        <a:bodyPr/>
-                        <a:lstStyle/>
-                        <a:p>
-                          <a:pPr algn="ctr" latinLnBrk="1"/>
-                          <a:r>
-                            <a:rPr lang="ko-KR" altLang="en-US" dirty="0"/>
-                            <a:t>캐릭터명</a:t>
-                          </a:r>
-                        </a:p>
-                      </a:txBody>
-                      <a:tcPr/>
-                    </a:tc>
-                    <a:tc gridSpan="3">
-                      <a:txBody>
-                        <a:bodyPr/>
-                        <a:lstStyle/>
-                        <a:p>
-                          <a:pPr algn="ctr" latinLnBrk="1"/>
-                          <a:r>
-                            <a:rPr lang="ko-KR" altLang="en-US" dirty="0"/>
-                            <a:t>각종 수치들</a:t>
-                          </a:r>
-                        </a:p>
-                        <a:p>
-                          <a:pPr algn="ctr" latinLnBrk="1"/>
-                          <a:r>
-                            <a:rPr lang="ko-KR" altLang="en-US" dirty="0"/>
-                            <a:t>예를 들어 </a:t>
-                          </a:r>
-                          <a:r>
-                            <a:rPr lang="ko-KR" altLang="en-US" dirty="0" err="1"/>
-                            <a:t>스킬포인트</a:t>
-                          </a:r>
-                          <a:r>
-                            <a:rPr lang="en-US" altLang="ko-KR" dirty="0"/>
-                            <a:t>, </a:t>
-                          </a:r>
-                          <a:r>
-                            <a:rPr lang="ko-KR" altLang="en-US" dirty="0"/>
-                            <a:t>업적 점수</a:t>
-                          </a:r>
-                          <a:endParaRPr lang="en-US" altLang="ko-KR" dirty="0"/>
-                        </a:p>
-                        <a:p>
-                          <a:pPr algn="ctr" latinLnBrk="1"/>
-                          <a:r>
-                            <a:rPr lang="en-US" altLang="ko-KR" dirty="0"/>
-                            <a:t>Null </a:t>
-                          </a:r>
-                          <a:r>
-                            <a:rPr lang="ko-KR" altLang="en-US" dirty="0"/>
-                            <a:t>허용</a:t>
-                          </a:r>
-                        </a:p>
-                      </a:txBody>
-                      <a:tcPr/>
-                    </a:tc>
-                    <a:tc hMerge="1">
-                      <a:txBody>
-                        <a:bodyPr/>
-                        <a:lstStyle/>
-                        <a:p>
-                          <a:pPr algn="ctr" latinLnBrk="1"/>
-                          <a:r>
-                            <a:rPr lang="ko-KR" altLang="en-US" dirty="0"/>
-                            <a:t>예를 들어 </a:t>
-                          </a:r>
-                          <a:r>
-                            <a:rPr lang="ko-KR" altLang="en-US" dirty="0" err="1"/>
-                            <a:t>스킬포인트</a:t>
-                          </a:r>
-                          <a:endParaRPr lang="ko-KR" altLang="en-US" dirty="0"/>
-                        </a:p>
-                      </a:txBody>
-                      <a:tcPr/>
-                    </a:tc>
-                    <a:tc hMerge="1">
-                      <a:txBody>
-                        <a:bodyPr/>
-                        <a:lstStyle/>
-                        <a:p>
-                          <a:pPr algn="ctr" latinLnBrk="1"/>
-                          <a:r>
-                            <a:rPr lang="ko-KR" altLang="en-US" dirty="0"/>
-                            <a:t>여기까지도 수치들</a:t>
-                          </a:r>
-                        </a:p>
-                      </a:txBody>
-                      <a:tcPr/>
-                    </a:tc>
-                    <a:tc>
-                      <a:txBody>
-                        <a:bodyPr/>
-                        <a:lstStyle/>
-                        <a:p>
-                          <a:pPr algn="ctr" latinLnBrk="1"/>
-                          <a:r>
-                            <a:rPr lang="ko-KR" altLang="en-US" dirty="0"/>
-                            <a:t>허가</a:t>
-                          </a:r>
-                        </a:p>
-                      </a:txBody>
-                      <a:tcPr/>
-                    </a:tc>
-                    <a:extLst>
-                      <a:ext uri="{0D108BD9-81ED-4DB2-BD59-A6C34878D82A}">
-                        <a16:rowId xmlns:a16="http://schemas.microsoft.com/office/drawing/2014/main" val="93829975"/>
-                      </a:ext>
-                    </a:extLst>
-                  </a:tr>
-                  <a:tr h="594417">
-                    <a:tc>
-                      <a:txBody>
-                        <a:bodyPr/>
-                        <a:lstStyle/>
-                        <a:p>
-                          <a:pPr algn="ctr" latinLnBrk="1"/>
-                          <a:r>
-                            <a:rPr lang="en-US" altLang="ko-KR" dirty="0"/>
-                            <a:t>13526</a:t>
-                          </a:r>
-                          <a:endParaRPr lang="ko-KR" altLang="en-US" dirty="0"/>
-                        </a:p>
-                      </a:txBody>
-                      <a:tcPr/>
-                    </a:tc>
-                    <a:tc>
-                      <a:txBody>
-                        <a:bodyPr/>
-                        <a:lstStyle/>
-                        <a:p>
-                          <a:pPr algn="ctr" latinLnBrk="1"/>
-                          <a:r>
-                            <a:rPr lang="ko-KR" altLang="en-US" dirty="0"/>
-                            <a:t>세컨드 </a:t>
-                          </a:r>
-                          <a:r>
-                            <a:rPr lang="ko-KR" altLang="en-US" dirty="0" err="1"/>
-                            <a:t>디푼</a:t>
-                          </a:r>
-                          <a:endParaRPr lang="ko-KR" altLang="en-US" dirty="0"/>
-                        </a:p>
-                      </a:txBody>
-                      <a:tcPr/>
-                    </a:tc>
-                    <a:tc>
-                      <a:txBody>
-                        <a:bodyPr/>
-                        <a:lstStyle/>
-                        <a:p>
-                          <a:pPr algn="ctr" latinLnBrk="1"/>
-                          <a:r>
-                            <a:rPr lang="en-US" altLang="ko-KR" dirty="0"/>
-                            <a:t>56</a:t>
-                          </a:r>
-                          <a:endParaRPr lang="ko-KR" altLang="en-US" dirty="0"/>
-                        </a:p>
-                      </a:txBody>
-                      <a:tcPr/>
-                    </a:tc>
-                    <a:tc>
-                      <a:txBody>
-                        <a:bodyPr/>
-                        <a:lstStyle/>
-                        <a:p>
-                          <a:pPr algn="ctr" latinLnBrk="1"/>
-                          <a14:m>
-                            <m:oMathPara xmlns:m="http://schemas.openxmlformats.org/officeDocument/2006/math">
-                              <m:oMathParaPr>
-                                <m:jc m:val="centerGroup"/>
-                              </m:oMathParaPr>
-                              <m:oMath xmlns:m="http://schemas.openxmlformats.org/officeDocument/2006/math">
-                                <m:r>
-                                  <a:rPr lang="ko-KR" altLang="en-US" i="1" smtClean="0">
-                                    <a:latin typeface="Cambria Math" panose="02040503050406030204" pitchFamily="18" charset="0"/>
-                                  </a:rPr>
-                                  <m:t>⋯</m:t>
-                                </m:r>
-                              </m:oMath>
-                            </m:oMathPara>
-                          </a14:m>
-                          <a:endParaRPr lang="ko-KR" altLang="en-US" dirty="0"/>
-                        </a:p>
-                      </a:txBody>
-                      <a:tcPr/>
-                    </a:tc>
-                    <a:tc>
-                      <a:txBody>
-                        <a:bodyPr/>
-                        <a:lstStyle/>
-                        <a:p>
-                          <a:pPr algn="ctr" latinLnBrk="1"/>
-                          <a:r>
-                            <a:rPr lang="en-US" altLang="ko-KR" dirty="0"/>
-                            <a:t>4500</a:t>
-                          </a:r>
-                          <a:endParaRPr lang="ko-KR" altLang="en-US" dirty="0"/>
-                        </a:p>
-                      </a:txBody>
-                      <a:tcPr/>
-                    </a:tc>
-                    <a:tc>
-                      <a:txBody>
-                        <a:bodyPr/>
-                        <a:lstStyle/>
-                        <a:p>
-                          <a:pPr marL="0" marR="0" lvl="0" indent="0" algn="ctr" defTabSz="914400" rtl="0" eaLnBrk="1" fontAlgn="auto" latinLnBrk="1" hangingPunct="1">
-                            <a:lnSpc>
-                              <a:spcPct val="100000"/>
-                            </a:lnSpc>
-                            <a:spcBef>
-                              <a:spcPts val="0"/>
-                            </a:spcBef>
-                            <a:spcAft>
-                              <a:spcPts val="0"/>
-                            </a:spcAft>
-                            <a:buClrTx/>
-                            <a:buSzTx/>
-                            <a:buFontTx/>
-                            <a:buNone/>
-                            <a:tabLst/>
-                            <a:defRPr/>
-                          </a:pPr>
-                          <a:r>
-                            <a:rPr lang="en-US" altLang="ko-KR" dirty="0"/>
-                            <a:t>12416134</a:t>
-                          </a:r>
-                          <a:endParaRPr lang="ko-KR" altLang="en-US" dirty="0"/>
-                        </a:p>
-                        <a:p>
-                          <a:pPr algn="ctr" latinLnBrk="1"/>
-                          <a:endParaRPr lang="ko-KR" altLang="en-US" dirty="0"/>
-                        </a:p>
-                      </a:txBody>
-                      <a:tcPr/>
-                    </a:tc>
-                    <a:extLst>
-                      <a:ext uri="{0D108BD9-81ED-4DB2-BD59-A6C34878D82A}">
-                        <a16:rowId xmlns:a16="http://schemas.microsoft.com/office/drawing/2014/main" val="1251773981"/>
-                      </a:ext>
-                    </a:extLst>
-                  </a:tr>
-                  <a:tr h="594417">
-                    <a:tc>
-                      <a:txBody>
-                        <a:bodyPr/>
-                        <a:lstStyle/>
-                        <a:p>
-                          <a:pPr algn="ctr" latinLnBrk="1"/>
-                          <a:r>
-                            <a:rPr lang="en-US" altLang="ko-KR" dirty="0"/>
-                            <a:t>12352</a:t>
-                          </a:r>
-                          <a:endParaRPr lang="ko-KR" altLang="en-US" dirty="0"/>
-                        </a:p>
-                      </a:txBody>
-                      <a:tcPr/>
-                    </a:tc>
-                    <a:tc>
-                      <a:txBody>
-                        <a:bodyPr/>
-                        <a:lstStyle/>
-                        <a:p>
-                          <a:pPr algn="ctr" latinLnBrk="1"/>
-                          <a:r>
-                            <a:rPr lang="ko-KR" altLang="en-US" dirty="0" err="1"/>
-                            <a:t>그냥디푼</a:t>
-                          </a:r>
-                          <a:endParaRPr lang="ko-KR" altLang="en-US" dirty="0"/>
-                        </a:p>
-                      </a:txBody>
-                      <a:tcPr/>
-                    </a:tc>
-                    <a:tc>
-                      <a:txBody>
-                        <a:bodyPr/>
-                        <a:lstStyle/>
-                        <a:p>
-                          <a:pPr marL="0" marR="0" lvl="0" indent="0" algn="ctr" defTabSz="914400" rtl="0" eaLnBrk="1" fontAlgn="auto" latinLnBrk="1" hangingPunct="1">
-                            <a:lnSpc>
-                              <a:spcPct val="100000"/>
-                            </a:lnSpc>
-                            <a:spcBef>
-                              <a:spcPts val="0"/>
-                            </a:spcBef>
-                            <a:spcAft>
-                              <a:spcPts val="0"/>
-                            </a:spcAft>
-                            <a:buClrTx/>
-                            <a:buSzTx/>
-                            <a:buFontTx/>
-                            <a:buNone/>
-                            <a:tabLst/>
-                            <a:defRPr/>
-                          </a:pPr>
-                          <a14:m>
-                            <m:oMathPara xmlns:m="http://schemas.openxmlformats.org/officeDocument/2006/math">
-                              <m:oMathParaPr>
-                                <m:jc m:val="centerGroup"/>
-                              </m:oMathParaPr>
-                              <m:oMath xmlns:m="http://schemas.openxmlformats.org/officeDocument/2006/math">
-                                <m:r>
-                                  <a:rPr lang="ko-KR" altLang="en-US" i="1" smtClean="0">
-                                    <a:latin typeface="Cambria Math" panose="02040503050406030204" pitchFamily="18" charset="0"/>
-                                  </a:rPr>
-                                  <m:t>⋮</m:t>
-                                </m:r>
-                              </m:oMath>
-                            </m:oMathPara>
-                          </a14:m>
-                          <a:endParaRPr lang="ko-KR" altLang="en-US" dirty="0"/>
-                        </a:p>
-                        <a:p>
-                          <a:pPr algn="ctr" latinLnBrk="1"/>
-                          <a:endParaRPr lang="ko-KR" altLang="en-US" dirty="0"/>
-                        </a:p>
-                      </a:txBody>
-                      <a:tcPr/>
-                    </a:tc>
-                    <a:tc>
-                      <a:txBody>
-                        <a:bodyPr/>
-                        <a:lstStyle/>
-                        <a:p>
-                          <a:pPr algn="ctr" latinLnBrk="1"/>
-                          <a14:m>
-                            <m:oMathPara xmlns:m="http://schemas.openxmlformats.org/officeDocument/2006/math">
-                              <m:oMathParaPr>
-                                <m:jc m:val="centerGroup"/>
-                              </m:oMathParaPr>
-                              <m:oMath xmlns:m="http://schemas.openxmlformats.org/officeDocument/2006/math">
-                                <m:r>
-                                  <a:rPr lang="ko-KR" altLang="en-US" i="1" smtClean="0">
-                                    <a:latin typeface="Cambria Math" panose="02040503050406030204" pitchFamily="18" charset="0"/>
-                                  </a:rPr>
-                                  <m:t>⋯</m:t>
-                                </m:r>
-                              </m:oMath>
-                            </m:oMathPara>
-                          </a14:m>
-                          <a:endParaRPr lang="ko-KR" altLang="en-US" dirty="0"/>
-                        </a:p>
-                      </a:txBody>
-                      <a:tcPr/>
-                    </a:tc>
-                    <a:tc>
-                      <a:txBody>
-                        <a:bodyPr/>
-                        <a:lstStyle/>
-                        <a:p>
-                          <a:pPr algn="ctr" latinLnBrk="1"/>
-                          <a:r>
-                            <a:rPr lang="en-US" altLang="ko-KR" dirty="0"/>
-                            <a:t>3750</a:t>
-                          </a:r>
-                          <a:endParaRPr lang="ko-KR" altLang="en-US" dirty="0"/>
-                        </a:p>
-                      </a:txBody>
-                      <a:tcPr/>
-                    </a:tc>
-                    <a:tc>
-                      <a:txBody>
-                        <a:bodyPr/>
-                        <a:lstStyle/>
-                        <a:p>
-                          <a:pPr marL="0" marR="0" lvl="0" indent="0" algn="ctr" defTabSz="914400" rtl="0" eaLnBrk="1" fontAlgn="auto" latinLnBrk="1" hangingPunct="1">
-                            <a:lnSpc>
-                              <a:spcPct val="100000"/>
-                            </a:lnSpc>
-                            <a:spcBef>
-                              <a:spcPts val="0"/>
-                            </a:spcBef>
-                            <a:spcAft>
-                              <a:spcPts val="0"/>
-                            </a:spcAft>
-                            <a:buClrTx/>
-                            <a:buSzTx/>
-                            <a:buFontTx/>
-                            <a:buNone/>
-                            <a:tabLst/>
-                            <a:defRPr/>
-                          </a:pPr>
-                          <a:r>
-                            <a:rPr lang="en-US" altLang="ko-KR" dirty="0"/>
-                            <a:t>12652135</a:t>
-                          </a:r>
-                          <a:endParaRPr lang="ko-KR" altLang="en-US" dirty="0"/>
-                        </a:p>
-                        <a:p>
-                          <a:pPr algn="ctr" latinLnBrk="1"/>
-                          <a:endParaRPr lang="ko-KR" altLang="en-US" dirty="0"/>
-                        </a:p>
-                      </a:txBody>
-                      <a:tcPr/>
-                    </a:tc>
-                    <a:extLst>
-                      <a:ext uri="{0D108BD9-81ED-4DB2-BD59-A6C34878D82A}">
-                        <a16:rowId xmlns:a16="http://schemas.microsoft.com/office/drawing/2014/main" val="1552784103"/>
-                      </a:ext>
-                    </a:extLst>
-                  </a:tr>
-                  <a:tr h="594417">
-                    <a:tc>
-                      <a:txBody>
-                        <a:bodyPr/>
-                        <a:lstStyle/>
-                        <a:p>
-                          <a:pPr algn="ctr" latinLnBrk="1"/>
-                          <a:r>
-                            <a:rPr lang="en-US" altLang="ko-KR" dirty="0"/>
-                            <a:t>23452</a:t>
-                          </a:r>
-                          <a:endParaRPr lang="ko-KR" altLang="en-US" dirty="0"/>
-                        </a:p>
-                      </a:txBody>
-                      <a:tcPr/>
-                    </a:tc>
-                    <a:tc>
-                      <a:txBody>
-                        <a:bodyPr/>
-                        <a:lstStyle/>
-                        <a:p>
-                          <a:pPr algn="ctr" latinLnBrk="1"/>
-                          <a14:m>
-                            <m:oMathPara xmlns:m="http://schemas.openxmlformats.org/officeDocument/2006/math">
-                              <m:oMathParaPr>
-                                <m:jc m:val="centerGroup"/>
-                              </m:oMathParaPr>
-                              <m:oMath xmlns:m="http://schemas.openxmlformats.org/officeDocument/2006/math">
-                                <m:r>
-                                  <a:rPr lang="ko-KR" altLang="en-US" i="1" smtClean="0">
-                                    <a:latin typeface="Cambria Math" panose="02040503050406030204" pitchFamily="18" charset="0"/>
-                                  </a:rPr>
-                                  <m:t>⋮</m:t>
-                                </m:r>
-                              </m:oMath>
-                            </m:oMathPara>
-                          </a14:m>
-                          <a:endParaRPr lang="ko-KR" altLang="en-US" dirty="0"/>
-                        </a:p>
-                      </a:txBody>
-                      <a:tcPr/>
-                    </a:tc>
-                    <a:tc>
-                      <a:txBody>
-                        <a:bodyPr/>
-                        <a:lstStyle/>
-                        <a:p>
-                          <a:pPr algn="ctr" latinLnBrk="1"/>
-                          <a:endParaRPr lang="ko-KR" altLang="en-US" dirty="0"/>
-                        </a:p>
-                      </a:txBody>
-                      <a:tcPr/>
-                    </a:tc>
-                    <a:tc>
-                      <a:txBody>
-                        <a:bodyPr/>
-                        <a:lstStyle/>
-                        <a:p>
-                          <a:pPr marL="0" marR="0" lvl="0" indent="0" algn="ctr" defTabSz="914400" rtl="0" eaLnBrk="1" fontAlgn="auto" latinLnBrk="1" hangingPunct="1">
-                            <a:lnSpc>
-                              <a:spcPct val="100000"/>
-                            </a:lnSpc>
-                            <a:spcBef>
-                              <a:spcPts val="0"/>
-                            </a:spcBef>
-                            <a:spcAft>
-                              <a:spcPts val="0"/>
-                            </a:spcAft>
-                            <a:buClrTx/>
-                            <a:buSzTx/>
-                            <a:buFontTx/>
-                            <a:buNone/>
-                            <a:tabLst/>
-                            <a:defRPr/>
-                          </a:pPr>
-                          <a14:m>
-                            <m:oMathPara xmlns:m="http://schemas.openxmlformats.org/officeDocument/2006/math">
-                              <m:oMathParaPr>
-                                <m:jc m:val="centerGroup"/>
-                              </m:oMathParaPr>
-                              <m:oMath xmlns:m="http://schemas.openxmlformats.org/officeDocument/2006/math">
-                                <m:r>
-                                  <a:rPr lang="ko-KR" altLang="en-US" i="1" smtClean="0">
-                                    <a:latin typeface="Cambria Math" panose="02040503050406030204" pitchFamily="18" charset="0"/>
-                                  </a:rPr>
-                                  <m:t>⋮</m:t>
-                                </m:r>
-                              </m:oMath>
-                            </m:oMathPara>
-                          </a14:m>
-                          <a:endParaRPr lang="ko-KR" altLang="en-US" dirty="0"/>
-                        </a:p>
-                        <a:p>
-                          <a:pPr algn="ctr" latinLnBrk="1"/>
-                          <a:endParaRPr lang="ko-KR" altLang="en-US" dirty="0"/>
-                        </a:p>
-                      </a:txBody>
-                      <a:tcPr/>
-                    </a:tc>
-                    <a:tc>
-                      <a:txBody>
-                        <a:bodyPr/>
-                        <a:lstStyle/>
-                        <a:p>
-                          <a:pPr marL="0" marR="0" lvl="0" indent="0" algn="ctr" defTabSz="914400" rtl="0" eaLnBrk="1" fontAlgn="auto" latinLnBrk="1" hangingPunct="1">
-                            <a:lnSpc>
-                              <a:spcPct val="100000"/>
-                            </a:lnSpc>
-                            <a:spcBef>
-                              <a:spcPts val="0"/>
-                            </a:spcBef>
-                            <a:spcAft>
-                              <a:spcPts val="0"/>
-                            </a:spcAft>
-                            <a:buClrTx/>
-                            <a:buSzTx/>
-                            <a:buFontTx/>
-                            <a:buNone/>
-                            <a:tabLst/>
-                            <a:defRPr/>
-                          </a:pPr>
-                          <a14:m>
-                            <m:oMathPara xmlns:m="http://schemas.openxmlformats.org/officeDocument/2006/math">
-                              <m:oMathParaPr>
-                                <m:jc m:val="centerGroup"/>
-                              </m:oMathParaPr>
-                              <m:oMath xmlns:m="http://schemas.openxmlformats.org/officeDocument/2006/math">
-                                <m:r>
-                                  <a:rPr lang="ko-KR" altLang="en-US" i="1" smtClean="0">
-                                    <a:latin typeface="Cambria Math" panose="02040503050406030204" pitchFamily="18" charset="0"/>
-                                  </a:rPr>
-                                  <m:t>⋮</m:t>
-                                </m:r>
-                              </m:oMath>
-                            </m:oMathPara>
-                          </a14:m>
-                          <a:endParaRPr lang="ko-KR" altLang="en-US" dirty="0"/>
-                        </a:p>
-                        <a:p>
-                          <a:pPr algn="ctr" latinLnBrk="1"/>
-                          <a:endParaRPr lang="ko-KR" altLang="en-US" dirty="0"/>
-                        </a:p>
-                      </a:txBody>
-                      <a:tcPr/>
-                    </a:tc>
-                    <a:tc>
-                      <a:txBody>
-                        <a:bodyPr/>
-                        <a:lstStyle/>
-                        <a:p>
-                          <a:pPr marL="0" marR="0" lvl="0" indent="0" algn="ctr" defTabSz="914400" rtl="0" eaLnBrk="1" fontAlgn="auto" latinLnBrk="1" hangingPunct="1">
-                            <a:lnSpc>
-                              <a:spcPct val="100000"/>
-                            </a:lnSpc>
-                            <a:spcBef>
-                              <a:spcPts val="0"/>
-                            </a:spcBef>
-                            <a:spcAft>
-                              <a:spcPts val="0"/>
-                            </a:spcAft>
-                            <a:buClrTx/>
-                            <a:buSzTx/>
-                            <a:buFontTx/>
-                            <a:buNone/>
-                            <a:tabLst/>
-                            <a:defRPr/>
-                          </a:pPr>
-                          <a14:m>
-                            <m:oMathPara xmlns:m="http://schemas.openxmlformats.org/officeDocument/2006/math">
-                              <m:oMathParaPr>
-                                <m:jc m:val="centerGroup"/>
-                              </m:oMathParaPr>
-                              <m:oMath xmlns:m="http://schemas.openxmlformats.org/officeDocument/2006/math">
-                                <m:r>
-                                  <a:rPr lang="ko-KR" altLang="en-US" i="1" smtClean="0">
-                                    <a:latin typeface="Cambria Math" panose="02040503050406030204" pitchFamily="18" charset="0"/>
-                                  </a:rPr>
-                                  <m:t>⋮</m:t>
-                                </m:r>
-                              </m:oMath>
-                            </m:oMathPara>
-                          </a14:m>
-                          <a:endParaRPr lang="ko-KR" altLang="en-US" dirty="0"/>
-                        </a:p>
-                        <a:p>
-                          <a:pPr algn="ctr" latinLnBrk="1"/>
-                          <a:endParaRPr lang="ko-KR" altLang="en-US" dirty="0"/>
-                        </a:p>
-                      </a:txBody>
-                      <a:tcPr/>
-                    </a:tc>
-                    <a:extLst>
-                      <a:ext uri="{0D108BD9-81ED-4DB2-BD59-A6C34878D82A}">
-                        <a16:rowId xmlns:a16="http://schemas.microsoft.com/office/drawing/2014/main" val="735765668"/>
-                      </a:ext>
-                    </a:extLst>
-                  </a:tr>
-                  <a:tr h="594417">
-                    <a:tc>
-                      <a:txBody>
-                        <a:bodyPr/>
-                        <a:lstStyle/>
-                        <a:p>
-                          <a:pPr algn="ctr" latinLnBrk="1"/>
-                          <a:r>
-                            <a:rPr lang="en-US" altLang="ko-KR" dirty="0"/>
-                            <a:t>32626</a:t>
-                          </a:r>
-                          <a:endParaRPr lang="ko-KR" altLang="en-US" dirty="0"/>
-                        </a:p>
-                      </a:txBody>
-                      <a:tcPr/>
-                    </a:tc>
-                    <a:tc>
-                      <a:txBody>
-                        <a:bodyPr/>
-                        <a:lstStyle/>
-                        <a:p>
-                          <a:pPr algn="ctr" latinLnBrk="1"/>
-                          <a:endParaRPr lang="ko-KR" altLang="en-US" dirty="0"/>
-                        </a:p>
-                      </a:txBody>
-                      <a:tcPr/>
-                    </a:tc>
-                    <a:tc>
-                      <a:txBody>
-                        <a:bodyPr/>
-                        <a:lstStyle/>
-                        <a:p>
-                          <a:pPr algn="ctr" latinLnBrk="1"/>
-                          <a:endParaRPr lang="ko-KR" altLang="en-US" dirty="0"/>
-                        </a:p>
-                      </a:txBody>
-                      <a:tcPr/>
-                    </a:tc>
-                    <a:tc>
-                      <a:txBody>
-                        <a:bodyPr/>
-                        <a:lstStyle/>
-                        <a:p>
-                          <a:pPr algn="ctr" latinLnBrk="1"/>
-                          <a:endParaRPr lang="ko-KR" altLang="en-US" dirty="0"/>
-                        </a:p>
-                      </a:txBody>
-                      <a:tcPr/>
-                    </a:tc>
-                    <a:tc>
-                      <a:txBody>
-                        <a:bodyPr/>
-                        <a:lstStyle/>
-                        <a:p>
-                          <a:pPr algn="ctr" latinLnBrk="1"/>
-                          <a:endParaRPr lang="ko-KR" altLang="en-US" dirty="0"/>
-                        </a:p>
-                      </a:txBody>
-                      <a:tcPr/>
-                    </a:tc>
-                    <a:tc>
-                      <a:txBody>
-                        <a:bodyPr/>
-                        <a:lstStyle/>
-                        <a:p>
-                          <a:pPr algn="ctr" latinLnBrk="1"/>
-                          <a:endParaRPr lang="ko-KR" altLang="en-US" dirty="0"/>
-                        </a:p>
-                      </a:txBody>
-                      <a:tcPr/>
-                    </a:tc>
-                    <a:extLst>
-                      <a:ext uri="{0D108BD9-81ED-4DB2-BD59-A6C34878D82A}">
-                        <a16:rowId xmlns:a16="http://schemas.microsoft.com/office/drawing/2014/main" val="907714691"/>
-                      </a:ext>
-                    </a:extLst>
-                  </a:tr>
-                  <a:tr h="594417">
-                    <a:tc>
-                      <a:txBody>
-                        <a:bodyPr/>
-                        <a:lstStyle/>
-                        <a:p>
-                          <a:pPr marL="0" marR="0" lvl="0" indent="0" algn="ctr" defTabSz="914400" rtl="0" eaLnBrk="1" fontAlgn="auto" latinLnBrk="1" hangingPunct="1">
-                            <a:lnSpc>
-                              <a:spcPct val="100000"/>
-                            </a:lnSpc>
-                            <a:spcBef>
-                              <a:spcPts val="0"/>
-                            </a:spcBef>
-                            <a:spcAft>
-                              <a:spcPts val="0"/>
-                            </a:spcAft>
-                            <a:buClrTx/>
-                            <a:buSzTx/>
-                            <a:buFontTx/>
-                            <a:buNone/>
-                            <a:tabLst/>
-                            <a:defRPr/>
-                          </a:pPr>
-                          <a14:m>
-                            <m:oMathPara xmlns:m="http://schemas.openxmlformats.org/officeDocument/2006/math">
-                              <m:oMathParaPr>
-                                <m:jc m:val="centerGroup"/>
-                              </m:oMathParaPr>
-                              <m:oMath xmlns:m="http://schemas.openxmlformats.org/officeDocument/2006/math">
-                                <m:r>
-                                  <a:rPr lang="ko-KR" altLang="en-US" i="1" smtClean="0">
-                                    <a:latin typeface="Cambria Math" panose="02040503050406030204" pitchFamily="18" charset="0"/>
-                                  </a:rPr>
-                                  <m:t>⋮</m:t>
-                                </m:r>
-                              </m:oMath>
-                            </m:oMathPara>
-                          </a14:m>
-                          <a:endParaRPr lang="ko-KR" altLang="en-US" dirty="0"/>
-                        </a:p>
-                        <a:p>
-                          <a:pPr algn="ctr" latinLnBrk="1"/>
-                          <a:endParaRPr lang="ko-KR" altLang="en-US" dirty="0"/>
-                        </a:p>
-                      </a:txBody>
-                      <a:tcPr/>
-                    </a:tc>
-                    <a:tc>
-                      <a:txBody>
-                        <a:bodyPr/>
-                        <a:lstStyle/>
-                        <a:p>
-                          <a:pPr algn="ctr" latinLnBrk="1"/>
-                          <a:endParaRPr lang="ko-KR" altLang="en-US" dirty="0"/>
-                        </a:p>
-                      </a:txBody>
-                      <a:tcPr/>
-                    </a:tc>
-                    <a:tc>
-                      <a:txBody>
-                        <a:bodyPr/>
-                        <a:lstStyle/>
-                        <a:p>
-                          <a:pPr algn="ctr" latinLnBrk="1"/>
-                          <a:endParaRPr lang="ko-KR" altLang="en-US" dirty="0"/>
-                        </a:p>
-                      </a:txBody>
-                      <a:tcPr/>
-                    </a:tc>
-                    <a:tc>
-                      <a:txBody>
-                        <a:bodyPr/>
-                        <a:lstStyle/>
-                        <a:p>
-                          <a:pPr algn="ctr" latinLnBrk="1"/>
-                          <a:endParaRPr lang="ko-KR" altLang="en-US" dirty="0"/>
-                        </a:p>
-                      </a:txBody>
-                      <a:tcPr/>
-                    </a:tc>
-                    <a:tc>
-                      <a:txBody>
-                        <a:bodyPr/>
-                        <a:lstStyle/>
-                        <a:p>
-                          <a:pPr algn="ctr" latinLnBrk="1"/>
-                          <a:endParaRPr lang="ko-KR" altLang="en-US" dirty="0"/>
-                        </a:p>
-                      </a:txBody>
-                      <a:tcPr/>
-                    </a:tc>
-                    <a:tc>
-                      <a:txBody>
-                        <a:bodyPr/>
-                        <a:lstStyle/>
-                        <a:p>
-                          <a:pPr algn="ctr" latinLnBrk="1"/>
-                          <a:endParaRPr lang="ko-KR" altLang="en-US" dirty="0"/>
-                        </a:p>
-                      </a:txBody>
-                      <a:tcPr/>
-                    </a:tc>
-                    <a:extLst>
-                      <a:ext uri="{0D108BD9-81ED-4DB2-BD59-A6C34878D82A}">
-                        <a16:rowId xmlns:a16="http://schemas.microsoft.com/office/drawing/2014/main" val="3140478529"/>
-                      </a:ext>
-                    </a:extLst>
-                  </a:tr>
-                </a:tbl>
-              </a:graphicData>
-            </a:graphic>
-          </p:graphicFrame>
-        </mc:Choice>
-        <mc:Fallback>
-          <p:graphicFrame>
-            <p:nvGraphicFramePr>
-              <p:cNvPr id="22" name="표 13">
+              </a:tr>
+              <a:tr h="280533">
+                <a:tc>
+                  <a:txBody>
+                    <a:bodyPr/>
+                    <a:lstStyle/>
+                    <a:p>
+                      <a:pPr algn="ctr" latinLnBrk="1"/>
+                      <a:r>
+                        <a:rPr lang="en-US" altLang="ko-KR" sz="1100" dirty="0"/>
+                        <a:t>12416134</a:t>
+                      </a:r>
+                      <a:endParaRPr lang="ko-KR" altLang="en-US" sz="1100" dirty="0"/>
+                    </a:p>
+                  </a:txBody>
+                  <a:tcPr/>
+                </a:tc>
+                <a:tc>
+                  <a:txBody>
+                    <a:bodyPr/>
+                    <a:lstStyle/>
+                    <a:p>
+                      <a:pPr algn="ctr" latinLnBrk="1"/>
+                      <a:r>
+                        <a:rPr lang="en-US" altLang="ko-KR" sz="1100" dirty="0"/>
+                        <a:t>Asrhgy0125</a:t>
+                      </a:r>
+                      <a:endParaRPr lang="ko-KR" altLang="en-US" sz="1100" dirty="0"/>
+                    </a:p>
+                  </a:txBody>
+                  <a:tcPr/>
+                </a:tc>
+                <a:tc>
+                  <a:txBody>
+                    <a:bodyPr/>
+                    <a:lstStyle/>
+                    <a:p>
+                      <a:pPr algn="ctr" latinLnBrk="1"/>
+                      <a:r>
+                        <a:rPr lang="en-US" altLang="ko-KR" sz="1100" dirty="0"/>
+                        <a:t>4654132165465</a:t>
+                      </a:r>
+                      <a:endParaRPr lang="ko-KR" altLang="en-US" sz="1100" dirty="0"/>
+                    </a:p>
+                  </a:txBody>
+                  <a:tcPr/>
+                </a:tc>
+                <a:tc>
+                  <a:txBody>
+                    <a:bodyPr/>
+                    <a:lstStyle/>
+                    <a:p>
+                      <a:pPr algn="ctr" latinLnBrk="1"/>
+                      <a:r>
+                        <a:rPr lang="en-US" altLang="ko-KR" sz="1100" dirty="0"/>
+                        <a:t>Second </a:t>
+                      </a:r>
+                      <a:r>
+                        <a:rPr lang="en-US" altLang="ko-KR" sz="1100" dirty="0" err="1"/>
+                        <a:t>dipoon</a:t>
+                      </a:r>
+                      <a:endParaRPr lang="ko-KR" altLang="en-US" sz="1100" dirty="0"/>
+                    </a:p>
+                  </a:txBody>
+                  <a:tcPr/>
+                </a:tc>
+                <a:tc>
+                  <a:txBody>
+                    <a:bodyPr/>
+                    <a:lstStyle/>
+                    <a:p>
+                      <a:pPr algn="ctr" latinLnBrk="1"/>
+                      <a:endParaRPr lang="ko-KR" altLang="en-US" sz="1100" dirty="0"/>
+                    </a:p>
+                  </a:txBody>
+                  <a:tcPr/>
+                </a:tc>
                 <a:extLst>
-                  <a:ext uri="{FF2B5EF4-FFF2-40B4-BE49-F238E27FC236}">
-                    <a16:creationId xmlns:a16="http://schemas.microsoft.com/office/drawing/2014/main" id="{F3B7A418-2492-41FE-8164-6447496ABD4B}"/>
+                  <a:ext uri="{0D108BD9-81ED-4DB2-BD59-A6C34878D82A}">
+                    <a16:rowId xmlns:a16="http://schemas.microsoft.com/office/drawing/2014/main" val="1251773981"/>
                   </a:ext>
                 </a:extLst>
-              </p:cNvPr>
-              <p:cNvGraphicFramePr>
-                <a:graphicFrameLocks noGrp="1"/>
-              </p:cNvGraphicFramePr>
-              <p:nvPr>
-                <p:extLst>
-                  <p:ext uri="{D42A27DB-BD31-4B8C-83A1-F6EECF244321}">
-                    <p14:modId xmlns:p14="http://schemas.microsoft.com/office/powerpoint/2010/main" val="1904228360"/>
-                  </p:ext>
-                </p:extLst>
-              </p:nvPr>
-            </p:nvGraphicFramePr>
-            <p:xfrm>
-              <a:off x="7187965" y="4135075"/>
-              <a:ext cx="5062758" cy="4892097"/>
-            </p:xfrm>
-            <a:graphic>
-              <a:graphicData uri="http://schemas.openxmlformats.org/drawingml/2006/table">
-                <a:tbl>
-                  <a:tblPr firstRow="1" bandRow="1">
-                    <a:tableStyleId>{5C22544A-7EE6-4342-B048-85BDC9FD1C3A}</a:tableStyleId>
-                  </a:tblPr>
-                  <a:tblGrid>
-                    <a:gridCol w="843793">
-                      <a:extLst>
-                        <a:ext uri="{9D8B030D-6E8A-4147-A177-3AD203B41FA5}">
-                          <a16:colId xmlns:a16="http://schemas.microsoft.com/office/drawing/2014/main" val="4214423747"/>
-                        </a:ext>
-                      </a:extLst>
-                    </a:gridCol>
-                    <a:gridCol w="843793">
-                      <a:extLst>
-                        <a:ext uri="{9D8B030D-6E8A-4147-A177-3AD203B41FA5}">
-                          <a16:colId xmlns:a16="http://schemas.microsoft.com/office/drawing/2014/main" val="498503476"/>
-                        </a:ext>
-                      </a:extLst>
-                    </a:gridCol>
-                    <a:gridCol w="843793">
-                      <a:extLst>
-                        <a:ext uri="{9D8B030D-6E8A-4147-A177-3AD203B41FA5}">
-                          <a16:colId xmlns:a16="http://schemas.microsoft.com/office/drawing/2014/main" val="3718852409"/>
-                        </a:ext>
-                      </a:extLst>
-                    </a:gridCol>
-                    <a:gridCol w="843793">
-                      <a:extLst>
-                        <a:ext uri="{9D8B030D-6E8A-4147-A177-3AD203B41FA5}">
-                          <a16:colId xmlns:a16="http://schemas.microsoft.com/office/drawing/2014/main" val="1068844153"/>
-                        </a:ext>
-                      </a:extLst>
-                    </a:gridCol>
-                    <a:gridCol w="843793">
-                      <a:extLst>
-                        <a:ext uri="{9D8B030D-6E8A-4147-A177-3AD203B41FA5}">
-                          <a16:colId xmlns:a16="http://schemas.microsoft.com/office/drawing/2014/main" val="3951477656"/>
-                        </a:ext>
-                      </a:extLst>
-                    </a:gridCol>
-                    <a:gridCol w="843793">
-                      <a:extLst>
-                        <a:ext uri="{9D8B030D-6E8A-4147-A177-3AD203B41FA5}">
-                          <a16:colId xmlns:a16="http://schemas.microsoft.com/office/drawing/2014/main" val="3650633168"/>
-                        </a:ext>
-                      </a:extLst>
-                    </a:gridCol>
-                  </a:tblGrid>
-                  <a:tr h="1188720">
-                    <a:tc>
-                      <a:txBody>
-                        <a:bodyPr/>
-                        <a:lstStyle/>
-                        <a:p>
-                          <a:pPr algn="ctr" latinLnBrk="1"/>
-                          <a:r>
-                            <a:rPr lang="en-US" altLang="ko-KR" dirty="0"/>
-                            <a:t>Key</a:t>
-                          </a:r>
-                          <a:endParaRPr lang="ko-KR" altLang="en-US" dirty="0"/>
-                        </a:p>
-                      </a:txBody>
-                      <a:tcPr/>
-                    </a:tc>
-                    <a:tc>
-                      <a:txBody>
-                        <a:bodyPr/>
-                        <a:lstStyle/>
-                        <a:p>
-                          <a:pPr algn="ctr" latinLnBrk="1"/>
-                          <a:r>
-                            <a:rPr lang="ko-KR" altLang="en-US" dirty="0"/>
-                            <a:t>캐릭터명</a:t>
-                          </a:r>
-                        </a:p>
-                      </a:txBody>
-                      <a:tcPr/>
-                    </a:tc>
-                    <a:tc gridSpan="3">
-                      <a:txBody>
-                        <a:bodyPr/>
-                        <a:lstStyle/>
-                        <a:p>
-                          <a:pPr algn="ctr" latinLnBrk="1"/>
-                          <a:r>
-                            <a:rPr lang="ko-KR" altLang="en-US" dirty="0"/>
-                            <a:t>각종 수치들</a:t>
-                          </a:r>
-                        </a:p>
-                        <a:p>
-                          <a:pPr algn="ctr" latinLnBrk="1"/>
-                          <a:r>
-                            <a:rPr lang="ko-KR" altLang="en-US" dirty="0"/>
-                            <a:t>예를 들어 </a:t>
-                          </a:r>
-                          <a:r>
-                            <a:rPr lang="ko-KR" altLang="en-US" dirty="0" err="1"/>
-                            <a:t>스킬포인트</a:t>
-                          </a:r>
-                          <a:r>
-                            <a:rPr lang="en-US" altLang="ko-KR" dirty="0"/>
-                            <a:t>, </a:t>
-                          </a:r>
-                          <a:r>
-                            <a:rPr lang="ko-KR" altLang="en-US" dirty="0"/>
-                            <a:t>업적 점수</a:t>
-                          </a:r>
-                          <a:endParaRPr lang="en-US" altLang="ko-KR" dirty="0"/>
-                        </a:p>
-                        <a:p>
-                          <a:pPr algn="ctr" latinLnBrk="1"/>
-                          <a:r>
-                            <a:rPr lang="en-US" altLang="ko-KR" dirty="0"/>
-                            <a:t>Null </a:t>
-                          </a:r>
-                          <a:r>
-                            <a:rPr lang="ko-KR" altLang="en-US" dirty="0"/>
-                            <a:t>허용</a:t>
-                          </a:r>
-                        </a:p>
-                      </a:txBody>
-                      <a:tcPr/>
-                    </a:tc>
-                    <a:tc hMerge="1">
-                      <a:txBody>
-                        <a:bodyPr/>
-                        <a:lstStyle/>
-                        <a:p>
-                          <a:pPr algn="ctr" latinLnBrk="1"/>
-                          <a:r>
-                            <a:rPr lang="ko-KR" altLang="en-US" dirty="0"/>
-                            <a:t>예를 들어 </a:t>
-                          </a:r>
-                          <a:r>
-                            <a:rPr lang="ko-KR" altLang="en-US" dirty="0" err="1"/>
-                            <a:t>스킬포인트</a:t>
-                          </a:r>
-                          <a:endParaRPr lang="ko-KR" altLang="en-US" dirty="0"/>
-                        </a:p>
-                      </a:txBody>
-                      <a:tcPr/>
-                    </a:tc>
-                    <a:tc hMerge="1">
-                      <a:txBody>
-                        <a:bodyPr/>
-                        <a:lstStyle/>
-                        <a:p>
-                          <a:pPr algn="ctr" latinLnBrk="1"/>
-                          <a:r>
-                            <a:rPr lang="ko-KR" altLang="en-US" dirty="0"/>
-                            <a:t>여기까지도 수치들</a:t>
-                          </a:r>
-                        </a:p>
-                      </a:txBody>
-                      <a:tcPr/>
-                    </a:tc>
-                    <a:tc>
-                      <a:txBody>
-                        <a:bodyPr/>
-                        <a:lstStyle/>
-                        <a:p>
-                          <a:pPr algn="ctr" latinLnBrk="1"/>
-                          <a:r>
-                            <a:rPr lang="ko-KR" altLang="en-US" dirty="0"/>
-                            <a:t>허가</a:t>
-                          </a:r>
-                        </a:p>
-                      </a:txBody>
-                      <a:tcPr/>
-                    </a:tc>
-                    <a:extLst>
-                      <a:ext uri="{0D108BD9-81ED-4DB2-BD59-A6C34878D82A}">
-                        <a16:rowId xmlns:a16="http://schemas.microsoft.com/office/drawing/2014/main" val="93829975"/>
-                      </a:ext>
-                    </a:extLst>
-                  </a:tr>
-                  <a:tr h="914400">
-                    <a:tc>
-                      <a:txBody>
-                        <a:bodyPr/>
-                        <a:lstStyle/>
-                        <a:p>
-                          <a:pPr algn="ctr" latinLnBrk="1"/>
-                          <a:r>
-                            <a:rPr lang="en-US" altLang="ko-KR" dirty="0"/>
-                            <a:t>13526</a:t>
-                          </a:r>
-                          <a:endParaRPr lang="ko-KR" altLang="en-US" dirty="0"/>
-                        </a:p>
-                      </a:txBody>
-                      <a:tcPr/>
-                    </a:tc>
-                    <a:tc>
-                      <a:txBody>
-                        <a:bodyPr/>
-                        <a:lstStyle/>
-                        <a:p>
-                          <a:pPr algn="ctr" latinLnBrk="1"/>
-                          <a:r>
-                            <a:rPr lang="ko-KR" altLang="en-US" dirty="0"/>
-                            <a:t>세컨드 </a:t>
-                          </a:r>
-                          <a:r>
-                            <a:rPr lang="ko-KR" altLang="en-US" dirty="0" err="1"/>
-                            <a:t>디푼</a:t>
-                          </a:r>
-                          <a:endParaRPr lang="ko-KR" altLang="en-US" dirty="0"/>
-                        </a:p>
-                      </a:txBody>
-                      <a:tcPr/>
-                    </a:tc>
-                    <a:tc>
-                      <a:txBody>
-                        <a:bodyPr/>
-                        <a:lstStyle/>
-                        <a:p>
-                          <a:pPr algn="ctr" latinLnBrk="1"/>
-                          <a:r>
-                            <a:rPr lang="en-US" altLang="ko-KR" dirty="0"/>
-                            <a:t>56</a:t>
-                          </a:r>
-                          <a:endParaRPr lang="ko-KR" altLang="en-US" dirty="0"/>
-                        </a:p>
-                      </a:txBody>
-                      <a:tcPr/>
-                    </a:tc>
-                    <a:tc>
-                      <a:txBody>
-                        <a:bodyPr/>
-                        <a:lstStyle/>
-                        <a:p>
-                          <a:endParaRPr lang="ko-KR"/>
-                        </a:p>
-                      </a:txBody>
-                      <a:tcPr>
-                        <a:blipFill>
-                          <a:blip r:embed="rId2"/>
-                          <a:stretch>
-                            <a:fillRect l="-302174" t="-133333" r="-203623" b="-306667"/>
-                          </a:stretch>
-                        </a:blipFill>
-                      </a:tcPr>
-                    </a:tc>
-                    <a:tc>
-                      <a:txBody>
-                        <a:bodyPr/>
-                        <a:lstStyle/>
-                        <a:p>
-                          <a:pPr algn="ctr" latinLnBrk="1"/>
-                          <a:r>
-                            <a:rPr lang="en-US" altLang="ko-KR" dirty="0"/>
-                            <a:t>4500</a:t>
-                          </a:r>
-                          <a:endParaRPr lang="ko-KR" altLang="en-US" dirty="0"/>
-                        </a:p>
-                      </a:txBody>
-                      <a:tcPr/>
-                    </a:tc>
-                    <a:tc>
-                      <a:txBody>
-                        <a:bodyPr/>
-                        <a:lstStyle/>
-                        <a:p>
-                          <a:pPr marL="0" marR="0" lvl="0" indent="0" algn="ctr" defTabSz="914400" rtl="0" eaLnBrk="1" fontAlgn="auto" latinLnBrk="1" hangingPunct="1">
-                            <a:lnSpc>
-                              <a:spcPct val="100000"/>
-                            </a:lnSpc>
-                            <a:spcBef>
-                              <a:spcPts val="0"/>
-                            </a:spcBef>
-                            <a:spcAft>
-                              <a:spcPts val="0"/>
-                            </a:spcAft>
-                            <a:buClrTx/>
-                            <a:buSzTx/>
-                            <a:buFontTx/>
-                            <a:buNone/>
-                            <a:tabLst/>
-                            <a:defRPr/>
-                          </a:pPr>
-                          <a:r>
-                            <a:rPr lang="en-US" altLang="ko-KR" dirty="0"/>
-                            <a:t>12416134</a:t>
-                          </a:r>
-                          <a:endParaRPr lang="ko-KR" altLang="en-US" dirty="0"/>
-                        </a:p>
-                        <a:p>
-                          <a:pPr algn="ctr" latinLnBrk="1"/>
-                          <a:endParaRPr lang="ko-KR" altLang="en-US" dirty="0"/>
-                        </a:p>
-                      </a:txBody>
-                      <a:tcPr/>
-                    </a:tc>
-                    <a:extLst>
-                      <a:ext uri="{0D108BD9-81ED-4DB2-BD59-A6C34878D82A}">
-                        <a16:rowId xmlns:a16="http://schemas.microsoft.com/office/drawing/2014/main" val="1251773981"/>
-                      </a:ext>
-                    </a:extLst>
-                  </a:tr>
-                  <a:tr h="914400">
-                    <a:tc>
-                      <a:txBody>
-                        <a:bodyPr/>
-                        <a:lstStyle/>
-                        <a:p>
-                          <a:pPr algn="ctr" latinLnBrk="1"/>
-                          <a:r>
-                            <a:rPr lang="en-US" altLang="ko-KR" dirty="0"/>
-                            <a:t>12352</a:t>
-                          </a:r>
-                          <a:endParaRPr lang="ko-KR" altLang="en-US" dirty="0"/>
-                        </a:p>
-                      </a:txBody>
-                      <a:tcPr/>
-                    </a:tc>
-                    <a:tc>
-                      <a:txBody>
-                        <a:bodyPr/>
-                        <a:lstStyle/>
-                        <a:p>
-                          <a:pPr algn="ctr" latinLnBrk="1"/>
-                          <a:r>
-                            <a:rPr lang="ko-KR" altLang="en-US" dirty="0" err="1"/>
-                            <a:t>그냥디푼</a:t>
-                          </a:r>
-                          <a:endParaRPr lang="ko-KR" altLang="en-US" dirty="0"/>
-                        </a:p>
-                      </a:txBody>
-                      <a:tcPr/>
-                    </a:tc>
-                    <a:tc>
-                      <a:txBody>
-                        <a:bodyPr/>
-                        <a:lstStyle/>
-                        <a:p>
-                          <a:endParaRPr lang="ko-KR"/>
-                        </a:p>
-                      </a:txBody>
-                      <a:tcPr>
-                        <a:blipFill>
-                          <a:blip r:embed="rId2"/>
-                          <a:stretch>
-                            <a:fillRect l="-200000" t="-233333" r="-301439" b="-206667"/>
-                          </a:stretch>
-                        </a:blipFill>
-                      </a:tcPr>
-                    </a:tc>
-                    <a:tc>
-                      <a:txBody>
-                        <a:bodyPr/>
-                        <a:lstStyle/>
-                        <a:p>
-                          <a:endParaRPr lang="ko-KR"/>
-                        </a:p>
-                      </a:txBody>
-                      <a:tcPr>
-                        <a:blipFill>
-                          <a:blip r:embed="rId2"/>
-                          <a:stretch>
-                            <a:fillRect l="-302174" t="-233333" r="-203623" b="-206667"/>
-                          </a:stretch>
-                        </a:blipFill>
-                      </a:tcPr>
-                    </a:tc>
-                    <a:tc>
-                      <a:txBody>
-                        <a:bodyPr/>
-                        <a:lstStyle/>
-                        <a:p>
-                          <a:pPr algn="ctr" latinLnBrk="1"/>
-                          <a:r>
-                            <a:rPr lang="en-US" altLang="ko-KR" dirty="0"/>
-                            <a:t>3750</a:t>
-                          </a:r>
-                          <a:endParaRPr lang="ko-KR" altLang="en-US" dirty="0"/>
-                        </a:p>
-                      </a:txBody>
-                      <a:tcPr/>
-                    </a:tc>
-                    <a:tc>
-                      <a:txBody>
-                        <a:bodyPr/>
-                        <a:lstStyle/>
-                        <a:p>
-                          <a:pPr marL="0" marR="0" lvl="0" indent="0" algn="ctr" defTabSz="914400" rtl="0" eaLnBrk="1" fontAlgn="auto" latinLnBrk="1" hangingPunct="1">
-                            <a:lnSpc>
-                              <a:spcPct val="100000"/>
-                            </a:lnSpc>
-                            <a:spcBef>
-                              <a:spcPts val="0"/>
-                            </a:spcBef>
-                            <a:spcAft>
-                              <a:spcPts val="0"/>
-                            </a:spcAft>
-                            <a:buClrTx/>
-                            <a:buSzTx/>
-                            <a:buFontTx/>
-                            <a:buNone/>
-                            <a:tabLst/>
-                            <a:defRPr/>
-                          </a:pPr>
-                          <a:r>
-                            <a:rPr lang="en-US" altLang="ko-KR" dirty="0"/>
-                            <a:t>12652135</a:t>
-                          </a:r>
-                          <a:endParaRPr lang="ko-KR" altLang="en-US" dirty="0"/>
-                        </a:p>
-                        <a:p>
-                          <a:pPr algn="ctr" latinLnBrk="1"/>
-                          <a:endParaRPr lang="ko-KR" altLang="en-US" dirty="0"/>
-                        </a:p>
-                      </a:txBody>
-                      <a:tcPr/>
-                    </a:tc>
-                    <a:extLst>
-                      <a:ext uri="{0D108BD9-81ED-4DB2-BD59-A6C34878D82A}">
-                        <a16:rowId xmlns:a16="http://schemas.microsoft.com/office/drawing/2014/main" val="1552784103"/>
-                      </a:ext>
-                    </a:extLst>
-                  </a:tr>
-                  <a:tr h="640080">
-                    <a:tc>
-                      <a:txBody>
-                        <a:bodyPr/>
-                        <a:lstStyle/>
-                        <a:p>
-                          <a:pPr algn="ctr" latinLnBrk="1"/>
-                          <a:r>
-                            <a:rPr lang="en-US" altLang="ko-KR" dirty="0"/>
-                            <a:t>23452</a:t>
-                          </a:r>
-                          <a:endParaRPr lang="ko-KR" altLang="en-US" dirty="0"/>
-                        </a:p>
-                      </a:txBody>
-                      <a:tcPr/>
-                    </a:tc>
-                    <a:tc>
-                      <a:txBody>
-                        <a:bodyPr/>
-                        <a:lstStyle/>
-                        <a:p>
-                          <a:endParaRPr lang="ko-KR"/>
-                        </a:p>
-                      </a:txBody>
-                      <a:tcPr>
-                        <a:blipFill>
-                          <a:blip r:embed="rId2"/>
-                          <a:stretch>
-                            <a:fillRect l="-101449" t="-476190" r="-404348" b="-195238"/>
-                          </a:stretch>
-                        </a:blipFill>
-                      </a:tcPr>
-                    </a:tc>
-                    <a:tc>
-                      <a:txBody>
-                        <a:bodyPr/>
-                        <a:lstStyle/>
-                        <a:p>
-                          <a:pPr algn="ctr" latinLnBrk="1"/>
-                          <a:endParaRPr lang="ko-KR" altLang="en-US" dirty="0"/>
-                        </a:p>
-                      </a:txBody>
-                      <a:tcPr/>
-                    </a:tc>
-                    <a:tc>
-                      <a:txBody>
-                        <a:bodyPr/>
-                        <a:lstStyle/>
-                        <a:p>
-                          <a:endParaRPr lang="ko-KR"/>
-                        </a:p>
-                      </a:txBody>
-                      <a:tcPr>
-                        <a:blipFill>
-                          <a:blip r:embed="rId2"/>
-                          <a:stretch>
-                            <a:fillRect l="-302174" t="-476190" r="-203623" b="-195238"/>
-                          </a:stretch>
-                        </a:blipFill>
-                      </a:tcPr>
-                    </a:tc>
-                    <a:tc>
-                      <a:txBody>
-                        <a:bodyPr/>
-                        <a:lstStyle/>
-                        <a:p>
-                          <a:endParaRPr lang="ko-KR"/>
-                        </a:p>
-                      </a:txBody>
-                      <a:tcPr>
-                        <a:blipFill>
-                          <a:blip r:embed="rId2"/>
-                          <a:stretch>
-                            <a:fillRect l="-399281" t="-476190" r="-102158" b="-195238"/>
-                          </a:stretch>
-                        </a:blipFill>
-                      </a:tcPr>
-                    </a:tc>
-                    <a:tc>
-                      <a:txBody>
-                        <a:bodyPr/>
-                        <a:lstStyle/>
-                        <a:p>
-                          <a:endParaRPr lang="ko-KR"/>
-                        </a:p>
-                      </a:txBody>
-                      <a:tcPr>
-                        <a:blipFill>
-                          <a:blip r:embed="rId2"/>
-                          <a:stretch>
-                            <a:fillRect l="-502899" t="-476190" r="-2899" b="-195238"/>
-                          </a:stretch>
-                        </a:blipFill>
-                      </a:tcPr>
-                    </a:tc>
-                    <a:extLst>
-                      <a:ext uri="{0D108BD9-81ED-4DB2-BD59-A6C34878D82A}">
-                        <a16:rowId xmlns:a16="http://schemas.microsoft.com/office/drawing/2014/main" val="735765668"/>
-                      </a:ext>
-                    </a:extLst>
-                  </a:tr>
-                  <a:tr h="594417">
-                    <a:tc>
-                      <a:txBody>
-                        <a:bodyPr/>
-                        <a:lstStyle/>
-                        <a:p>
-                          <a:pPr algn="ctr" latinLnBrk="1"/>
-                          <a:r>
-                            <a:rPr lang="en-US" altLang="ko-KR" dirty="0"/>
-                            <a:t>32626</a:t>
-                          </a:r>
-                          <a:endParaRPr lang="ko-KR" altLang="en-US" dirty="0"/>
-                        </a:p>
-                      </a:txBody>
-                      <a:tcPr/>
-                    </a:tc>
-                    <a:tc>
-                      <a:txBody>
-                        <a:bodyPr/>
-                        <a:lstStyle/>
-                        <a:p>
-                          <a:pPr algn="ctr" latinLnBrk="1"/>
-                          <a:endParaRPr lang="ko-KR" altLang="en-US" dirty="0"/>
-                        </a:p>
-                      </a:txBody>
-                      <a:tcPr/>
-                    </a:tc>
-                    <a:tc>
-                      <a:txBody>
-                        <a:bodyPr/>
-                        <a:lstStyle/>
-                        <a:p>
-                          <a:pPr algn="ctr" latinLnBrk="1"/>
-                          <a:endParaRPr lang="ko-KR" altLang="en-US" dirty="0"/>
-                        </a:p>
-                      </a:txBody>
-                      <a:tcPr/>
-                    </a:tc>
-                    <a:tc>
-                      <a:txBody>
-                        <a:bodyPr/>
-                        <a:lstStyle/>
-                        <a:p>
-                          <a:pPr algn="ctr" latinLnBrk="1"/>
-                          <a:endParaRPr lang="ko-KR" altLang="en-US" dirty="0"/>
-                        </a:p>
-                      </a:txBody>
-                      <a:tcPr/>
-                    </a:tc>
-                    <a:tc>
-                      <a:txBody>
-                        <a:bodyPr/>
-                        <a:lstStyle/>
-                        <a:p>
-                          <a:pPr algn="ctr" latinLnBrk="1"/>
-                          <a:endParaRPr lang="ko-KR" altLang="en-US" dirty="0"/>
-                        </a:p>
-                      </a:txBody>
-                      <a:tcPr/>
-                    </a:tc>
-                    <a:tc>
-                      <a:txBody>
-                        <a:bodyPr/>
-                        <a:lstStyle/>
-                        <a:p>
-                          <a:pPr algn="ctr" latinLnBrk="1"/>
-                          <a:endParaRPr lang="ko-KR" altLang="en-US" dirty="0"/>
-                        </a:p>
-                      </a:txBody>
-                      <a:tcPr/>
-                    </a:tc>
-                    <a:extLst>
-                      <a:ext uri="{0D108BD9-81ED-4DB2-BD59-A6C34878D82A}">
-                        <a16:rowId xmlns:a16="http://schemas.microsoft.com/office/drawing/2014/main" val="907714691"/>
-                      </a:ext>
-                    </a:extLst>
-                  </a:tr>
-                  <a:tr h="640080">
-                    <a:tc>
-                      <a:txBody>
-                        <a:bodyPr/>
-                        <a:lstStyle/>
-                        <a:p>
-                          <a:endParaRPr lang="ko-KR"/>
-                        </a:p>
-                      </a:txBody>
-                      <a:tcPr>
-                        <a:blipFill>
-                          <a:blip r:embed="rId2"/>
-                          <a:stretch>
-                            <a:fillRect l="-719" t="-669524" r="-500719" b="-1905"/>
-                          </a:stretch>
-                        </a:blipFill>
-                      </a:tcPr>
-                    </a:tc>
-                    <a:tc>
-                      <a:txBody>
-                        <a:bodyPr/>
-                        <a:lstStyle/>
-                        <a:p>
-                          <a:pPr algn="ctr" latinLnBrk="1"/>
-                          <a:endParaRPr lang="ko-KR" altLang="en-US" dirty="0"/>
-                        </a:p>
-                      </a:txBody>
-                      <a:tcPr/>
-                    </a:tc>
-                    <a:tc>
-                      <a:txBody>
-                        <a:bodyPr/>
-                        <a:lstStyle/>
-                        <a:p>
-                          <a:pPr algn="ctr" latinLnBrk="1"/>
-                          <a:endParaRPr lang="ko-KR" altLang="en-US" dirty="0"/>
-                        </a:p>
-                      </a:txBody>
-                      <a:tcPr/>
-                    </a:tc>
-                    <a:tc>
-                      <a:txBody>
-                        <a:bodyPr/>
-                        <a:lstStyle/>
-                        <a:p>
-                          <a:pPr algn="ctr" latinLnBrk="1"/>
-                          <a:endParaRPr lang="ko-KR" altLang="en-US" dirty="0"/>
-                        </a:p>
-                      </a:txBody>
-                      <a:tcPr/>
-                    </a:tc>
-                    <a:tc>
-                      <a:txBody>
-                        <a:bodyPr/>
-                        <a:lstStyle/>
-                        <a:p>
-                          <a:pPr algn="ctr" latinLnBrk="1"/>
-                          <a:endParaRPr lang="ko-KR" altLang="en-US" dirty="0"/>
-                        </a:p>
-                      </a:txBody>
-                      <a:tcPr/>
-                    </a:tc>
-                    <a:tc>
-                      <a:txBody>
-                        <a:bodyPr/>
-                        <a:lstStyle/>
-                        <a:p>
-                          <a:pPr algn="ctr" latinLnBrk="1"/>
-                          <a:endParaRPr lang="ko-KR" altLang="en-US" dirty="0"/>
-                        </a:p>
-                      </a:txBody>
-                      <a:tcPr/>
-                    </a:tc>
-                    <a:extLst>
-                      <a:ext uri="{0D108BD9-81ED-4DB2-BD59-A6C34878D82A}">
-                        <a16:rowId xmlns:a16="http://schemas.microsoft.com/office/drawing/2014/main" val="3140478529"/>
-                      </a:ext>
-                    </a:extLst>
-                  </a:tr>
-                </a:tbl>
-              </a:graphicData>
-            </a:graphic>
-          </p:graphicFrame>
-        </mc:Fallback>
-      </mc:AlternateContent>
-      <p:sp>
-        <p:nvSpPr>
-          <p:cNvPr id="2" name="TextBox 1">
-            <a:extLst>
-              <a:ext uri="{FF2B5EF4-FFF2-40B4-BE49-F238E27FC236}">
-                <a16:creationId xmlns:a16="http://schemas.microsoft.com/office/drawing/2014/main" id="{CCEBFF70-16E9-40A9-9E6C-9B9E9D8D4581}"/>
-              </a:ext>
-            </a:extLst>
-          </p:cNvPr>
-          <p:cNvSpPr txBox="1"/>
-          <p:nvPr/>
-        </p:nvSpPr>
-        <p:spPr>
-          <a:xfrm>
-            <a:off x="1056665" y="3642223"/>
-            <a:ext cx="2919369" cy="646331"/>
-          </a:xfrm>
-          <a:prstGeom prst="rect">
-            <a:avLst/>
-          </a:prstGeom>
-          <a:noFill/>
-        </p:spPr>
-        <p:txBody>
-          <a:bodyPr wrap="square" rtlCol="0">
-            <a:spAutoFit/>
-          </a:bodyPr>
-          <a:lstStyle/>
-          <a:p>
-            <a:r>
-              <a:rPr lang="en-US" altLang="ko-KR" dirty="0"/>
-              <a:t>Import</a:t>
-            </a:r>
-          </a:p>
-          <a:p>
-            <a:r>
-              <a:rPr lang="ko-KR" altLang="en-US" dirty="0"/>
-              <a:t>해서 </a:t>
-            </a:r>
-            <a:r>
-              <a:rPr lang="en-US" altLang="ko-KR" dirty="0" err="1"/>
-              <a:t>lua</a:t>
-            </a:r>
-            <a:r>
-              <a:rPr lang="en-US" altLang="ko-KR" dirty="0"/>
-              <a:t> </a:t>
-            </a:r>
-            <a:r>
-              <a:rPr lang="ko-KR" altLang="en-US" dirty="0"/>
-              <a:t>테이블 정보</a:t>
-            </a:r>
-          </a:p>
-        </p:txBody>
-      </p:sp>
-      <p:sp>
-        <p:nvSpPr>
-          <p:cNvPr id="23" name="TextBox 22">
-            <a:extLst>
-              <a:ext uri="{FF2B5EF4-FFF2-40B4-BE49-F238E27FC236}">
-                <a16:creationId xmlns:a16="http://schemas.microsoft.com/office/drawing/2014/main" id="{CAEF9346-096F-4614-AC29-8164CA07A993}"/>
-              </a:ext>
-            </a:extLst>
-          </p:cNvPr>
-          <p:cNvSpPr txBox="1"/>
-          <p:nvPr/>
-        </p:nvSpPr>
-        <p:spPr>
-          <a:xfrm>
-            <a:off x="3183620" y="2066299"/>
-            <a:ext cx="2919369" cy="646331"/>
-          </a:xfrm>
-          <a:prstGeom prst="rect">
-            <a:avLst/>
-          </a:prstGeom>
-          <a:noFill/>
-        </p:spPr>
-        <p:txBody>
-          <a:bodyPr wrap="square" rtlCol="0">
-            <a:spAutoFit/>
-          </a:bodyPr>
-          <a:lstStyle/>
-          <a:p>
-            <a:r>
-              <a:rPr lang="ko-KR" altLang="en-US" dirty="0" err="1"/>
-              <a:t>뭐뭐뭐</a:t>
-            </a:r>
-            <a:r>
-              <a:rPr lang="ko-KR" altLang="en-US" dirty="0"/>
-              <a:t> 실행해라</a:t>
-            </a:r>
-            <a:endParaRPr lang="en-US" altLang="ko-KR" dirty="0"/>
-          </a:p>
-          <a:p>
-            <a:r>
-              <a:rPr lang="en-US" altLang="ko-KR" dirty="0"/>
-              <a:t>ID PW </a:t>
-            </a:r>
-            <a:r>
-              <a:rPr lang="ko-KR" altLang="en-US" dirty="0" err="1"/>
-              <a:t>뭐다</a:t>
-            </a:r>
-            <a:endParaRPr lang="ko-KR" altLang="en-US" dirty="0"/>
-          </a:p>
-        </p:txBody>
-      </p:sp>
-      <p:sp>
-        <p:nvSpPr>
-          <p:cNvPr id="26" name="TextBox 25">
-            <a:extLst>
-              <a:ext uri="{FF2B5EF4-FFF2-40B4-BE49-F238E27FC236}">
-                <a16:creationId xmlns:a16="http://schemas.microsoft.com/office/drawing/2014/main" id="{131B0B18-3356-4B2F-94D4-9C92F312E6BA}"/>
-              </a:ext>
-            </a:extLst>
-          </p:cNvPr>
-          <p:cNvSpPr txBox="1"/>
-          <p:nvPr/>
-        </p:nvSpPr>
-        <p:spPr>
-          <a:xfrm>
-            <a:off x="4817105" y="2422133"/>
-            <a:ext cx="2919369" cy="646331"/>
-          </a:xfrm>
-          <a:prstGeom prst="rect">
-            <a:avLst/>
-          </a:prstGeom>
-          <a:noFill/>
-        </p:spPr>
-        <p:txBody>
-          <a:bodyPr wrap="square" rtlCol="0">
-            <a:spAutoFit/>
-          </a:bodyPr>
-          <a:lstStyle/>
-          <a:p>
-            <a:r>
-              <a:rPr lang="en-US" altLang="ko-KR" dirty="0" err="1"/>
-              <a:t>USPF.lua</a:t>
-            </a:r>
-            <a:r>
-              <a:rPr lang="en-US" altLang="ko-KR" dirty="0"/>
-              <a:t> </a:t>
-            </a:r>
-            <a:r>
-              <a:rPr lang="ko-KR" altLang="en-US" dirty="0"/>
-              <a:t>저장 변수에서 얻어낸 정보는 </a:t>
-            </a:r>
-            <a:r>
-              <a:rPr lang="ko-KR" altLang="en-US" dirty="0" err="1"/>
-              <a:t>이겁니다유</a:t>
-            </a:r>
-            <a:endParaRPr lang="ko-KR" altLang="en-US" dirty="0"/>
-          </a:p>
-        </p:txBody>
-      </p:sp>
+              </a:tr>
+              <a:tr h="280533">
+                <a:tc>
+                  <a:txBody>
+                    <a:bodyPr/>
+                    <a:lstStyle/>
+                    <a:p>
+                      <a:pPr algn="ctr" latinLnBrk="1"/>
+                      <a:endParaRPr lang="ko-KR" altLang="en-US" sz="1100" dirty="0"/>
+                    </a:p>
+                  </a:txBody>
+                  <a:tcPr/>
+                </a:tc>
+                <a:tc>
+                  <a:txBody>
+                    <a:bodyPr/>
+                    <a:lstStyle/>
+                    <a:p>
+                      <a:pPr algn="ctr" latinLnBrk="1"/>
+                      <a:r>
+                        <a:rPr lang="en-US" altLang="ko-KR" sz="1100" dirty="0"/>
+                        <a:t>Asrhgy0125</a:t>
+                      </a:r>
+                      <a:endParaRPr lang="ko-KR" altLang="en-US" sz="1100" dirty="0"/>
+                    </a:p>
+                  </a:txBody>
+                  <a:tcPr/>
+                </a:tc>
+                <a:tc>
+                  <a:txBody>
+                    <a:bodyPr/>
+                    <a:lstStyle/>
+                    <a:p>
+                      <a:pPr algn="ctr" latinLnBrk="1"/>
+                      <a:r>
+                        <a:rPr lang="en-US" altLang="ko-KR" sz="1100" dirty="0"/>
+                        <a:t>5465416216984</a:t>
+                      </a:r>
+                      <a:endParaRPr lang="ko-KR" altLang="en-US" sz="1100" dirty="0"/>
+                    </a:p>
+                  </a:txBody>
+                  <a:tcPr/>
+                </a:tc>
+                <a:tc>
+                  <a:txBody>
+                    <a:bodyPr/>
+                    <a:lstStyle/>
+                    <a:p>
+                      <a:pPr algn="ctr" latinLnBrk="1"/>
+                      <a:r>
+                        <a:rPr lang="en-US" altLang="ko-KR" sz="1100" dirty="0" err="1"/>
+                        <a:t>dipoon</a:t>
+                      </a:r>
+                      <a:endParaRPr lang="ko-KR" altLang="en-US" sz="1100" dirty="0"/>
+                    </a:p>
+                  </a:txBody>
+                  <a:tcPr/>
+                </a:tc>
+                <a:tc>
+                  <a:txBody>
+                    <a:bodyPr/>
+                    <a:lstStyle/>
+                    <a:p>
+                      <a:pPr algn="ctr" latinLnBrk="1"/>
+                      <a:endParaRPr lang="ko-KR" altLang="en-US" sz="1100" dirty="0"/>
+                    </a:p>
+                  </a:txBody>
+                  <a:tcPr/>
+                </a:tc>
+                <a:extLst>
+                  <a:ext uri="{0D108BD9-81ED-4DB2-BD59-A6C34878D82A}">
+                    <a16:rowId xmlns:a16="http://schemas.microsoft.com/office/drawing/2014/main" val="4057124187"/>
+                  </a:ext>
+                </a:extLst>
+              </a:tr>
+              <a:tr h="280533">
+                <a:tc>
+                  <a:txBody>
+                    <a:bodyPr/>
+                    <a:lstStyle/>
+                    <a:p>
+                      <a:pPr algn="ctr" latinLnBrk="1"/>
+                      <a:endParaRPr lang="ko-KR" altLang="en-US" sz="1100" dirty="0"/>
+                    </a:p>
+                  </a:txBody>
+                  <a:tcPr/>
+                </a:tc>
+                <a:tc>
+                  <a:txBody>
+                    <a:bodyPr/>
+                    <a:lstStyle/>
+                    <a:p>
+                      <a:pPr algn="ctr" latinLnBrk="1"/>
+                      <a:r>
+                        <a:rPr lang="en-US" altLang="ko-KR" sz="1100" dirty="0"/>
+                        <a:t>Asrhgy0125</a:t>
+                      </a:r>
+                      <a:endParaRPr lang="ko-KR" altLang="en-US" sz="1100" dirty="0"/>
+                    </a:p>
+                  </a:txBody>
+                  <a:tcPr/>
+                </a:tc>
+                <a:tc>
+                  <a:txBody>
+                    <a:bodyPr/>
+                    <a:lstStyle/>
+                    <a:p>
+                      <a:pPr algn="ctr" latinLnBrk="1"/>
+                      <a:endParaRPr lang="ko-KR" altLang="en-US" sz="1100" dirty="0"/>
+                    </a:p>
+                  </a:txBody>
+                  <a:tcPr/>
+                </a:tc>
+                <a:tc>
+                  <a:txBody>
+                    <a:bodyPr/>
+                    <a:lstStyle/>
+                    <a:p>
+                      <a:pPr algn="ctr" latinLnBrk="1"/>
+                      <a:endParaRPr lang="ko-KR" altLang="en-US" sz="1100" dirty="0"/>
+                    </a:p>
+                  </a:txBody>
+                  <a:tcPr/>
+                </a:tc>
+                <a:tc>
+                  <a:txBody>
+                    <a:bodyPr/>
+                    <a:lstStyle/>
+                    <a:p>
+                      <a:pPr algn="ctr" latinLnBrk="1"/>
+                      <a:endParaRPr lang="ko-KR" altLang="en-US" sz="1100" dirty="0"/>
+                    </a:p>
+                  </a:txBody>
+                  <a:tcPr/>
+                </a:tc>
+                <a:extLst>
+                  <a:ext uri="{0D108BD9-81ED-4DB2-BD59-A6C34878D82A}">
+                    <a16:rowId xmlns:a16="http://schemas.microsoft.com/office/drawing/2014/main" val="2928266608"/>
+                  </a:ext>
+                </a:extLst>
+              </a:tr>
+              <a:tr h="280533">
+                <a:tc>
+                  <a:txBody>
+                    <a:bodyPr/>
+                    <a:lstStyle/>
+                    <a:p>
+                      <a:pPr algn="ctr" latinLnBrk="1"/>
+                      <a:endParaRPr lang="ko-KR" altLang="en-US" sz="1100" dirty="0"/>
+                    </a:p>
+                  </a:txBody>
+                  <a:tcPr/>
+                </a:tc>
+                <a:tc>
+                  <a:txBody>
+                    <a:bodyPr/>
+                    <a:lstStyle/>
+                    <a:p>
+                      <a:pPr algn="ctr" latinLnBrk="1"/>
+                      <a:r>
+                        <a:rPr lang="en-US" altLang="ko-KR" sz="1100" dirty="0"/>
+                        <a:t>Asrhgy0125</a:t>
+                      </a:r>
+                      <a:endParaRPr lang="ko-KR" altLang="en-US" sz="1100" dirty="0"/>
+                    </a:p>
+                  </a:txBody>
+                  <a:tcPr/>
+                </a:tc>
+                <a:tc>
+                  <a:txBody>
+                    <a:bodyPr/>
+                    <a:lstStyle/>
+                    <a:p>
+                      <a:pPr algn="ctr" latinLnBrk="1"/>
+                      <a:endParaRPr lang="ko-KR" altLang="en-US" sz="1100" dirty="0"/>
+                    </a:p>
+                  </a:txBody>
+                  <a:tcPr/>
+                </a:tc>
+                <a:tc>
+                  <a:txBody>
+                    <a:bodyPr/>
+                    <a:lstStyle/>
+                    <a:p>
+                      <a:pPr algn="ctr" latinLnBrk="1"/>
+                      <a:endParaRPr lang="ko-KR" altLang="en-US" sz="1100" dirty="0"/>
+                    </a:p>
+                  </a:txBody>
+                  <a:tcPr/>
+                </a:tc>
+                <a:tc>
+                  <a:txBody>
+                    <a:bodyPr/>
+                    <a:lstStyle/>
+                    <a:p>
+                      <a:pPr algn="ctr" latinLnBrk="1"/>
+                      <a:endParaRPr lang="ko-KR" altLang="en-US" sz="1100" dirty="0"/>
+                    </a:p>
+                  </a:txBody>
+                  <a:tcPr/>
+                </a:tc>
+                <a:extLst>
+                  <a:ext uri="{0D108BD9-81ED-4DB2-BD59-A6C34878D82A}">
+                    <a16:rowId xmlns:a16="http://schemas.microsoft.com/office/drawing/2014/main" val="1510154849"/>
+                  </a:ext>
+                </a:extLst>
+              </a:tr>
+              <a:tr h="280533">
+                <a:tc>
+                  <a:txBody>
+                    <a:bodyPr/>
+                    <a:lstStyle/>
+                    <a:p>
+                      <a:pPr algn="ctr" latinLnBrk="1"/>
+                      <a:endParaRPr lang="ko-KR" altLang="en-US" sz="1100" dirty="0"/>
+                    </a:p>
+                  </a:txBody>
+                  <a:tcPr/>
+                </a:tc>
+                <a:tc>
+                  <a:txBody>
+                    <a:bodyPr/>
+                    <a:lstStyle/>
+                    <a:p>
+                      <a:pPr algn="ctr" latinLnBrk="1"/>
+                      <a:r>
+                        <a:rPr lang="en-US" altLang="ko-KR" sz="1100" dirty="0"/>
+                        <a:t>Asrhgy0125</a:t>
+                      </a:r>
+                      <a:endParaRPr lang="ko-KR" altLang="en-US" sz="1100" dirty="0"/>
+                    </a:p>
+                  </a:txBody>
+                  <a:tcPr/>
+                </a:tc>
+                <a:tc>
+                  <a:txBody>
+                    <a:bodyPr/>
+                    <a:lstStyle/>
+                    <a:p>
+                      <a:pPr algn="ctr" latinLnBrk="1"/>
+                      <a:endParaRPr lang="ko-KR" altLang="en-US" sz="1100" dirty="0"/>
+                    </a:p>
+                  </a:txBody>
+                  <a:tcPr/>
+                </a:tc>
+                <a:tc>
+                  <a:txBody>
+                    <a:bodyPr/>
+                    <a:lstStyle/>
+                    <a:p>
+                      <a:pPr algn="ctr" latinLnBrk="1"/>
+                      <a:endParaRPr lang="ko-KR" altLang="en-US" sz="1100" dirty="0"/>
+                    </a:p>
+                  </a:txBody>
+                  <a:tcPr/>
+                </a:tc>
+                <a:tc>
+                  <a:txBody>
+                    <a:bodyPr/>
+                    <a:lstStyle/>
+                    <a:p>
+                      <a:pPr algn="ctr" latinLnBrk="1"/>
+                      <a:endParaRPr lang="ko-KR" altLang="en-US" sz="1100" dirty="0"/>
+                    </a:p>
+                  </a:txBody>
+                  <a:tcPr/>
+                </a:tc>
+                <a:extLst>
+                  <a:ext uri="{0D108BD9-81ED-4DB2-BD59-A6C34878D82A}">
+                    <a16:rowId xmlns:a16="http://schemas.microsoft.com/office/drawing/2014/main" val="386608902"/>
+                  </a:ext>
+                </a:extLst>
+              </a:tr>
+              <a:tr h="280533">
+                <a:tc>
+                  <a:txBody>
+                    <a:bodyPr/>
+                    <a:lstStyle/>
+                    <a:p>
+                      <a:pPr algn="ctr" latinLnBrk="1"/>
+                      <a:endParaRPr lang="ko-KR" altLang="en-US" sz="1100" dirty="0"/>
+                    </a:p>
+                  </a:txBody>
+                  <a:tcPr/>
+                </a:tc>
+                <a:tc>
+                  <a:txBody>
+                    <a:bodyPr/>
+                    <a:lstStyle/>
+                    <a:p>
+                      <a:pPr algn="ctr" latinLnBrk="1"/>
+                      <a:r>
+                        <a:rPr lang="en-US" altLang="ko-KR" sz="1100" dirty="0"/>
+                        <a:t>Asrhgy0125</a:t>
+                      </a:r>
+                      <a:endParaRPr lang="ko-KR" altLang="en-US" sz="1100" dirty="0"/>
+                    </a:p>
+                  </a:txBody>
+                  <a:tcPr/>
+                </a:tc>
+                <a:tc>
+                  <a:txBody>
+                    <a:bodyPr/>
+                    <a:lstStyle/>
+                    <a:p>
+                      <a:pPr algn="ctr" latinLnBrk="1"/>
+                      <a:endParaRPr lang="ko-KR" altLang="en-US" sz="1100" dirty="0"/>
+                    </a:p>
+                  </a:txBody>
+                  <a:tcPr/>
+                </a:tc>
+                <a:tc>
+                  <a:txBody>
+                    <a:bodyPr/>
+                    <a:lstStyle/>
+                    <a:p>
+                      <a:pPr algn="ctr" latinLnBrk="1"/>
+                      <a:endParaRPr lang="ko-KR" altLang="en-US" sz="1100" dirty="0"/>
+                    </a:p>
+                  </a:txBody>
+                  <a:tcPr/>
+                </a:tc>
+                <a:tc>
+                  <a:txBody>
+                    <a:bodyPr/>
+                    <a:lstStyle/>
+                    <a:p>
+                      <a:pPr algn="ctr" latinLnBrk="1"/>
+                      <a:endParaRPr lang="ko-KR" altLang="en-US" sz="1100" dirty="0"/>
+                    </a:p>
+                  </a:txBody>
+                  <a:tcPr/>
+                </a:tc>
+                <a:extLst>
+                  <a:ext uri="{0D108BD9-81ED-4DB2-BD59-A6C34878D82A}">
+                    <a16:rowId xmlns:a16="http://schemas.microsoft.com/office/drawing/2014/main" val="219303351"/>
+                  </a:ext>
+                </a:extLst>
+              </a:tr>
+              <a:tr h="280533">
+                <a:tc>
+                  <a:txBody>
+                    <a:bodyPr/>
+                    <a:lstStyle/>
+                    <a:p>
+                      <a:pPr algn="ctr" latinLnBrk="1"/>
+                      <a:r>
+                        <a:rPr lang="en-US" altLang="ko-KR" sz="1100" dirty="0"/>
+                        <a:t>12652135</a:t>
+                      </a:r>
+                      <a:endParaRPr lang="ko-KR" altLang="en-US" sz="1100" dirty="0"/>
+                    </a:p>
+                  </a:txBody>
+                  <a:tcPr/>
+                </a:tc>
+                <a:tc>
+                  <a:txBody>
+                    <a:bodyPr/>
+                    <a:lstStyle/>
+                    <a:p>
+                      <a:pPr algn="ctr" latinLnBrk="1"/>
+                      <a:r>
+                        <a:rPr lang="en-US" altLang="ko-KR" sz="1100" dirty="0"/>
+                        <a:t>asdf54</a:t>
+                      </a:r>
+                      <a:endParaRPr lang="ko-KR" altLang="en-US" sz="1100" dirty="0"/>
+                    </a:p>
+                  </a:txBody>
+                  <a:tcPr/>
+                </a:tc>
+                <a:tc>
+                  <a:txBody>
+                    <a:bodyPr/>
+                    <a:lstStyle/>
+                    <a:p>
+                      <a:pPr algn="ctr" latinLnBrk="1"/>
+                      <a:endParaRPr lang="ko-KR" altLang="en-US" sz="1100" dirty="0"/>
+                    </a:p>
+                  </a:txBody>
+                  <a:tcPr/>
+                </a:tc>
+                <a:tc>
+                  <a:txBody>
+                    <a:bodyPr/>
+                    <a:lstStyle/>
+                    <a:p>
+                      <a:pPr algn="ctr" latinLnBrk="1"/>
+                      <a:endParaRPr lang="ko-KR" altLang="en-US" sz="1100" dirty="0"/>
+                    </a:p>
+                  </a:txBody>
+                  <a:tcPr/>
+                </a:tc>
+                <a:tc>
+                  <a:txBody>
+                    <a:bodyPr/>
+                    <a:lstStyle/>
+                    <a:p>
+                      <a:pPr algn="ctr" latinLnBrk="1"/>
+                      <a:endParaRPr lang="ko-KR" altLang="en-US" sz="1100" dirty="0"/>
+                    </a:p>
+                  </a:txBody>
+                  <a:tcPr/>
+                </a:tc>
+                <a:extLst>
+                  <a:ext uri="{0D108BD9-81ED-4DB2-BD59-A6C34878D82A}">
+                    <a16:rowId xmlns:a16="http://schemas.microsoft.com/office/drawing/2014/main" val="1552784103"/>
+                  </a:ext>
+                </a:extLst>
+              </a:tr>
+              <a:tr h="280533">
+                <a:tc>
+                  <a:txBody>
+                    <a:bodyPr/>
+                    <a:lstStyle/>
+                    <a:p>
+                      <a:pPr algn="ctr" latinLnBrk="1"/>
+                      <a:endParaRPr lang="ko-KR" altLang="en-US" sz="1100" dirty="0"/>
+                    </a:p>
+                  </a:txBody>
+                  <a:tcPr/>
+                </a:tc>
+                <a:tc>
+                  <a:txBody>
+                    <a:bodyPr/>
+                    <a:lstStyle/>
+                    <a:p>
+                      <a:pPr algn="ctr" latinLnBrk="1"/>
+                      <a:endParaRPr lang="ko-KR" altLang="en-US" sz="1100" dirty="0"/>
+                    </a:p>
+                  </a:txBody>
+                  <a:tcPr/>
+                </a:tc>
+                <a:tc>
+                  <a:txBody>
+                    <a:bodyPr/>
+                    <a:lstStyle/>
+                    <a:p>
+                      <a:pPr algn="ctr" latinLnBrk="1"/>
+                      <a:endParaRPr lang="ko-KR" altLang="en-US" sz="1100" dirty="0"/>
+                    </a:p>
+                  </a:txBody>
+                  <a:tcPr/>
+                </a:tc>
+                <a:tc>
+                  <a:txBody>
+                    <a:bodyPr/>
+                    <a:lstStyle/>
+                    <a:p>
+                      <a:pPr algn="ctr" latinLnBrk="1"/>
+                      <a:endParaRPr lang="ko-KR" altLang="en-US" sz="1100" dirty="0"/>
+                    </a:p>
+                  </a:txBody>
+                  <a:tcPr/>
+                </a:tc>
+                <a:tc>
+                  <a:txBody>
+                    <a:bodyPr/>
+                    <a:lstStyle/>
+                    <a:p>
+                      <a:pPr algn="ctr" latinLnBrk="1"/>
+                      <a:endParaRPr lang="ko-KR" altLang="en-US" sz="1100" dirty="0"/>
+                    </a:p>
+                  </a:txBody>
+                  <a:tcPr/>
+                </a:tc>
+                <a:extLst>
+                  <a:ext uri="{0D108BD9-81ED-4DB2-BD59-A6C34878D82A}">
+                    <a16:rowId xmlns:a16="http://schemas.microsoft.com/office/drawing/2014/main" val="1074883107"/>
+                  </a:ext>
+                </a:extLst>
+              </a:tr>
+              <a:tr h="280533">
+                <a:tc>
+                  <a:txBody>
+                    <a:bodyPr/>
+                    <a:lstStyle/>
+                    <a:p>
+                      <a:pPr algn="ctr" latinLnBrk="1"/>
+                      <a:endParaRPr lang="ko-KR" altLang="en-US" sz="1100" dirty="0"/>
+                    </a:p>
+                  </a:txBody>
+                  <a:tcPr/>
+                </a:tc>
+                <a:tc>
+                  <a:txBody>
+                    <a:bodyPr/>
+                    <a:lstStyle/>
+                    <a:p>
+                      <a:pPr algn="ctr" latinLnBrk="1"/>
+                      <a:endParaRPr lang="ko-KR" altLang="en-US" sz="1100" dirty="0"/>
+                    </a:p>
+                  </a:txBody>
+                  <a:tcPr/>
+                </a:tc>
+                <a:tc>
+                  <a:txBody>
+                    <a:bodyPr/>
+                    <a:lstStyle/>
+                    <a:p>
+                      <a:pPr algn="ctr" latinLnBrk="1"/>
+                      <a:endParaRPr lang="ko-KR" altLang="en-US" sz="1100" dirty="0"/>
+                    </a:p>
+                  </a:txBody>
+                  <a:tcPr/>
+                </a:tc>
+                <a:tc>
+                  <a:txBody>
+                    <a:bodyPr/>
+                    <a:lstStyle/>
+                    <a:p>
+                      <a:pPr algn="ctr" latinLnBrk="1"/>
+                      <a:endParaRPr lang="ko-KR" altLang="en-US" sz="1100" dirty="0"/>
+                    </a:p>
+                  </a:txBody>
+                  <a:tcPr/>
+                </a:tc>
+                <a:tc>
+                  <a:txBody>
+                    <a:bodyPr/>
+                    <a:lstStyle/>
+                    <a:p>
+                      <a:pPr algn="ctr" latinLnBrk="1"/>
+                      <a:endParaRPr lang="ko-KR" altLang="en-US" sz="1100" dirty="0"/>
+                    </a:p>
+                  </a:txBody>
+                  <a:tcPr/>
+                </a:tc>
+                <a:extLst>
+                  <a:ext uri="{0D108BD9-81ED-4DB2-BD59-A6C34878D82A}">
+                    <a16:rowId xmlns:a16="http://schemas.microsoft.com/office/drawing/2014/main" val="1200414252"/>
+                  </a:ext>
+                </a:extLst>
+              </a:tr>
+              <a:tr h="280533">
+                <a:tc>
+                  <a:txBody>
+                    <a:bodyPr/>
+                    <a:lstStyle/>
+                    <a:p>
+                      <a:pPr algn="ctr" latinLnBrk="1"/>
+                      <a:endParaRPr lang="ko-KR" altLang="en-US" sz="1100" dirty="0"/>
+                    </a:p>
+                  </a:txBody>
+                  <a:tcPr/>
+                </a:tc>
+                <a:tc>
+                  <a:txBody>
+                    <a:bodyPr/>
+                    <a:lstStyle/>
+                    <a:p>
+                      <a:pPr algn="ctr" latinLnBrk="1"/>
+                      <a:endParaRPr lang="ko-KR" altLang="en-US" sz="1100" dirty="0"/>
+                    </a:p>
+                  </a:txBody>
+                  <a:tcPr/>
+                </a:tc>
+                <a:tc>
+                  <a:txBody>
+                    <a:bodyPr/>
+                    <a:lstStyle/>
+                    <a:p>
+                      <a:pPr algn="ctr" latinLnBrk="1"/>
+                      <a:endParaRPr lang="ko-KR" altLang="en-US" sz="1100" dirty="0"/>
+                    </a:p>
+                  </a:txBody>
+                  <a:tcPr/>
+                </a:tc>
+                <a:tc>
+                  <a:txBody>
+                    <a:bodyPr/>
+                    <a:lstStyle/>
+                    <a:p>
+                      <a:pPr algn="ctr" latinLnBrk="1"/>
+                      <a:endParaRPr lang="ko-KR" altLang="en-US" sz="1100" dirty="0"/>
+                    </a:p>
+                  </a:txBody>
+                  <a:tcPr/>
+                </a:tc>
+                <a:tc>
+                  <a:txBody>
+                    <a:bodyPr/>
+                    <a:lstStyle/>
+                    <a:p>
+                      <a:pPr algn="ctr" latinLnBrk="1"/>
+                      <a:endParaRPr lang="ko-KR" altLang="en-US" sz="1100" dirty="0"/>
+                    </a:p>
+                  </a:txBody>
+                  <a:tcPr/>
+                </a:tc>
+                <a:extLst>
+                  <a:ext uri="{0D108BD9-81ED-4DB2-BD59-A6C34878D82A}">
+                    <a16:rowId xmlns:a16="http://schemas.microsoft.com/office/drawing/2014/main" val="2189808741"/>
+                  </a:ext>
+                </a:extLst>
+              </a:tr>
+              <a:tr h="280533">
+                <a:tc>
+                  <a:txBody>
+                    <a:bodyPr/>
+                    <a:lstStyle/>
+                    <a:p>
+                      <a:pPr algn="ctr" latinLnBrk="1"/>
+                      <a:endParaRPr lang="ko-KR" altLang="en-US" sz="1100" dirty="0"/>
+                    </a:p>
+                  </a:txBody>
+                  <a:tcPr/>
+                </a:tc>
+                <a:tc>
+                  <a:txBody>
+                    <a:bodyPr/>
+                    <a:lstStyle/>
+                    <a:p>
+                      <a:pPr algn="ctr" latinLnBrk="1"/>
+                      <a:endParaRPr lang="ko-KR" altLang="en-US" sz="1100" dirty="0"/>
+                    </a:p>
+                  </a:txBody>
+                  <a:tcPr/>
+                </a:tc>
+                <a:tc>
+                  <a:txBody>
+                    <a:bodyPr/>
+                    <a:lstStyle/>
+                    <a:p>
+                      <a:pPr algn="ctr" latinLnBrk="1"/>
+                      <a:endParaRPr lang="ko-KR" altLang="en-US" sz="1100" dirty="0"/>
+                    </a:p>
+                  </a:txBody>
+                  <a:tcPr/>
+                </a:tc>
+                <a:tc>
+                  <a:txBody>
+                    <a:bodyPr/>
+                    <a:lstStyle/>
+                    <a:p>
+                      <a:pPr algn="ctr" latinLnBrk="1"/>
+                      <a:endParaRPr lang="ko-KR" altLang="en-US" sz="1100" dirty="0"/>
+                    </a:p>
+                  </a:txBody>
+                  <a:tcPr/>
+                </a:tc>
+                <a:tc>
+                  <a:txBody>
+                    <a:bodyPr/>
+                    <a:lstStyle/>
+                    <a:p>
+                      <a:pPr algn="ctr" latinLnBrk="1"/>
+                      <a:endParaRPr lang="ko-KR" altLang="en-US" sz="1100" dirty="0"/>
+                    </a:p>
+                  </a:txBody>
+                  <a:tcPr/>
+                </a:tc>
+                <a:extLst>
+                  <a:ext uri="{0D108BD9-81ED-4DB2-BD59-A6C34878D82A}">
+                    <a16:rowId xmlns:a16="http://schemas.microsoft.com/office/drawing/2014/main" val="2235239604"/>
+                  </a:ext>
+                </a:extLst>
+              </a:tr>
+              <a:tr h="280533">
+                <a:tc>
+                  <a:txBody>
+                    <a:bodyPr/>
+                    <a:lstStyle/>
+                    <a:p>
+                      <a:pPr algn="ctr" latinLnBrk="1"/>
+                      <a:endParaRPr lang="ko-KR" altLang="en-US" sz="1100" dirty="0"/>
+                    </a:p>
+                  </a:txBody>
+                  <a:tcPr/>
+                </a:tc>
+                <a:tc>
+                  <a:txBody>
+                    <a:bodyPr/>
+                    <a:lstStyle/>
+                    <a:p>
+                      <a:pPr algn="ctr" latinLnBrk="1"/>
+                      <a:endParaRPr lang="ko-KR" altLang="en-US" sz="1100" dirty="0"/>
+                    </a:p>
+                  </a:txBody>
+                  <a:tcPr/>
+                </a:tc>
+                <a:tc>
+                  <a:txBody>
+                    <a:bodyPr/>
+                    <a:lstStyle/>
+                    <a:p>
+                      <a:pPr algn="ctr" latinLnBrk="1"/>
+                      <a:endParaRPr lang="ko-KR" altLang="en-US" sz="1100" dirty="0"/>
+                    </a:p>
+                  </a:txBody>
+                  <a:tcPr/>
+                </a:tc>
+                <a:tc>
+                  <a:txBody>
+                    <a:bodyPr/>
+                    <a:lstStyle/>
+                    <a:p>
+                      <a:pPr algn="ctr" latinLnBrk="1"/>
+                      <a:endParaRPr lang="ko-KR" altLang="en-US" sz="1100" dirty="0"/>
+                    </a:p>
+                  </a:txBody>
+                  <a:tcPr/>
+                </a:tc>
+                <a:tc>
+                  <a:txBody>
+                    <a:bodyPr/>
+                    <a:lstStyle/>
+                    <a:p>
+                      <a:pPr algn="ctr" latinLnBrk="1"/>
+                      <a:endParaRPr lang="ko-KR" altLang="en-US" sz="1100" dirty="0"/>
+                    </a:p>
+                  </a:txBody>
+                  <a:tcPr/>
+                </a:tc>
+                <a:extLst>
+                  <a:ext uri="{0D108BD9-81ED-4DB2-BD59-A6C34878D82A}">
+                    <a16:rowId xmlns:a16="http://schemas.microsoft.com/office/drawing/2014/main" val="637166270"/>
+                  </a:ext>
+                </a:extLst>
+              </a:tr>
+              <a:tr h="280533">
+                <a:tc>
+                  <a:txBody>
+                    <a:bodyPr/>
+                    <a:lstStyle/>
+                    <a:p>
+                      <a:pPr algn="ctr" latinLnBrk="1"/>
+                      <a:endParaRPr lang="ko-KR" altLang="en-US" sz="1100" dirty="0"/>
+                    </a:p>
+                  </a:txBody>
+                  <a:tcPr/>
+                </a:tc>
+                <a:tc>
+                  <a:txBody>
+                    <a:bodyPr/>
+                    <a:lstStyle/>
+                    <a:p>
+                      <a:pPr algn="ctr" latinLnBrk="1"/>
+                      <a:endParaRPr lang="ko-KR" altLang="en-US" sz="1100" dirty="0"/>
+                    </a:p>
+                  </a:txBody>
+                  <a:tcPr/>
+                </a:tc>
+                <a:tc>
+                  <a:txBody>
+                    <a:bodyPr/>
+                    <a:lstStyle/>
+                    <a:p>
+                      <a:pPr algn="ctr" latinLnBrk="1"/>
+                      <a:endParaRPr lang="ko-KR" altLang="en-US" sz="1100" dirty="0"/>
+                    </a:p>
+                  </a:txBody>
+                  <a:tcPr/>
+                </a:tc>
+                <a:tc>
+                  <a:txBody>
+                    <a:bodyPr/>
+                    <a:lstStyle/>
+                    <a:p>
+                      <a:pPr algn="ctr" latinLnBrk="1"/>
+                      <a:endParaRPr lang="ko-KR" altLang="en-US" sz="1100" dirty="0"/>
+                    </a:p>
+                  </a:txBody>
+                  <a:tcPr/>
+                </a:tc>
+                <a:tc>
+                  <a:txBody>
+                    <a:bodyPr/>
+                    <a:lstStyle/>
+                    <a:p>
+                      <a:pPr algn="ctr" latinLnBrk="1"/>
+                      <a:endParaRPr lang="ko-KR" altLang="en-US" sz="1100" dirty="0"/>
+                    </a:p>
+                  </a:txBody>
+                  <a:tcPr/>
+                </a:tc>
+                <a:extLst>
+                  <a:ext uri="{0D108BD9-81ED-4DB2-BD59-A6C34878D82A}">
+                    <a16:rowId xmlns:a16="http://schemas.microsoft.com/office/drawing/2014/main" val="1267261724"/>
+                  </a:ext>
+                </a:extLst>
+              </a:tr>
+              <a:tr h="280533">
+                <a:tc>
+                  <a:txBody>
+                    <a:bodyPr/>
+                    <a:lstStyle/>
+                    <a:p>
+                      <a:pPr algn="ctr" latinLnBrk="1"/>
+                      <a:endParaRPr lang="ko-KR" altLang="en-US" sz="1100" dirty="0"/>
+                    </a:p>
+                  </a:txBody>
+                  <a:tcPr/>
+                </a:tc>
+                <a:tc>
+                  <a:txBody>
+                    <a:bodyPr/>
+                    <a:lstStyle/>
+                    <a:p>
+                      <a:pPr algn="ctr" latinLnBrk="1"/>
+                      <a:endParaRPr lang="ko-KR" altLang="en-US" sz="1100" dirty="0"/>
+                    </a:p>
+                  </a:txBody>
+                  <a:tcPr/>
+                </a:tc>
+                <a:tc>
+                  <a:txBody>
+                    <a:bodyPr/>
+                    <a:lstStyle/>
+                    <a:p>
+                      <a:pPr algn="ctr" latinLnBrk="1"/>
+                      <a:endParaRPr lang="ko-KR" altLang="en-US" sz="1100" dirty="0"/>
+                    </a:p>
+                  </a:txBody>
+                  <a:tcPr/>
+                </a:tc>
+                <a:tc>
+                  <a:txBody>
+                    <a:bodyPr/>
+                    <a:lstStyle/>
+                    <a:p>
+                      <a:pPr algn="ctr" latinLnBrk="1"/>
+                      <a:endParaRPr lang="ko-KR" altLang="en-US" sz="1100" dirty="0"/>
+                    </a:p>
+                  </a:txBody>
+                  <a:tcPr/>
+                </a:tc>
+                <a:tc>
+                  <a:txBody>
+                    <a:bodyPr/>
+                    <a:lstStyle/>
+                    <a:p>
+                      <a:pPr algn="ctr" latinLnBrk="1"/>
+                      <a:endParaRPr lang="ko-KR" altLang="en-US" sz="1100" dirty="0"/>
+                    </a:p>
+                  </a:txBody>
+                  <a:tcPr/>
+                </a:tc>
+                <a:extLst>
+                  <a:ext uri="{0D108BD9-81ED-4DB2-BD59-A6C34878D82A}">
+                    <a16:rowId xmlns:a16="http://schemas.microsoft.com/office/drawing/2014/main" val="855759879"/>
+                  </a:ext>
+                </a:extLst>
+              </a:tr>
+              <a:tr h="280533">
+                <a:tc>
+                  <a:txBody>
+                    <a:bodyPr/>
+                    <a:lstStyle/>
+                    <a:p>
+                      <a:pPr algn="ctr" latinLnBrk="1"/>
+                      <a:endParaRPr lang="ko-KR" altLang="en-US" sz="1100" dirty="0"/>
+                    </a:p>
+                  </a:txBody>
+                  <a:tcPr/>
+                </a:tc>
+                <a:tc>
+                  <a:txBody>
+                    <a:bodyPr/>
+                    <a:lstStyle/>
+                    <a:p>
+                      <a:pPr algn="ctr" latinLnBrk="1"/>
+                      <a:endParaRPr lang="ko-KR" altLang="en-US" sz="1100" dirty="0"/>
+                    </a:p>
+                  </a:txBody>
+                  <a:tcPr/>
+                </a:tc>
+                <a:tc>
+                  <a:txBody>
+                    <a:bodyPr/>
+                    <a:lstStyle/>
+                    <a:p>
+                      <a:pPr algn="ctr" latinLnBrk="1"/>
+                      <a:endParaRPr lang="ko-KR" altLang="en-US" sz="1100" dirty="0"/>
+                    </a:p>
+                  </a:txBody>
+                  <a:tcPr/>
+                </a:tc>
+                <a:tc>
+                  <a:txBody>
+                    <a:bodyPr/>
+                    <a:lstStyle/>
+                    <a:p>
+                      <a:pPr algn="ctr" latinLnBrk="1"/>
+                      <a:endParaRPr lang="ko-KR" altLang="en-US" sz="1100" dirty="0"/>
+                    </a:p>
+                  </a:txBody>
+                  <a:tcPr/>
+                </a:tc>
+                <a:tc>
+                  <a:txBody>
+                    <a:bodyPr/>
+                    <a:lstStyle/>
+                    <a:p>
+                      <a:pPr algn="ctr" latinLnBrk="1"/>
+                      <a:endParaRPr lang="ko-KR" altLang="en-US" sz="1100" dirty="0"/>
+                    </a:p>
+                  </a:txBody>
+                  <a:tcPr/>
+                </a:tc>
+                <a:extLst>
+                  <a:ext uri="{0D108BD9-81ED-4DB2-BD59-A6C34878D82A}">
+                    <a16:rowId xmlns:a16="http://schemas.microsoft.com/office/drawing/2014/main" val="1866776"/>
+                  </a:ext>
+                </a:extLst>
+              </a:tr>
+              <a:tr h="280533">
+                <a:tc>
+                  <a:txBody>
+                    <a:bodyPr/>
+                    <a:lstStyle/>
+                    <a:p>
+                      <a:pPr algn="ctr" latinLnBrk="1"/>
+                      <a:endParaRPr lang="ko-KR" altLang="en-US" sz="1100" dirty="0"/>
+                    </a:p>
+                  </a:txBody>
+                  <a:tcPr/>
+                </a:tc>
+                <a:tc>
+                  <a:txBody>
+                    <a:bodyPr/>
+                    <a:lstStyle/>
+                    <a:p>
+                      <a:pPr algn="ctr" latinLnBrk="1"/>
+                      <a:endParaRPr lang="ko-KR" altLang="en-US" sz="1100" dirty="0"/>
+                    </a:p>
+                  </a:txBody>
+                  <a:tcPr/>
+                </a:tc>
+                <a:tc>
+                  <a:txBody>
+                    <a:bodyPr/>
+                    <a:lstStyle/>
+                    <a:p>
+                      <a:pPr algn="ctr" latinLnBrk="1"/>
+                      <a:endParaRPr lang="ko-KR" altLang="en-US" sz="1100" dirty="0"/>
+                    </a:p>
+                  </a:txBody>
+                  <a:tcPr/>
+                </a:tc>
+                <a:tc>
+                  <a:txBody>
+                    <a:bodyPr/>
+                    <a:lstStyle/>
+                    <a:p>
+                      <a:pPr algn="ctr" latinLnBrk="1"/>
+                      <a:endParaRPr lang="ko-KR" altLang="en-US" sz="1100" dirty="0"/>
+                    </a:p>
+                  </a:txBody>
+                  <a:tcPr/>
+                </a:tc>
+                <a:tc>
+                  <a:txBody>
+                    <a:bodyPr/>
+                    <a:lstStyle/>
+                    <a:p>
+                      <a:pPr algn="ctr" latinLnBrk="1"/>
+                      <a:endParaRPr lang="ko-KR" altLang="en-US" sz="1100" dirty="0"/>
+                    </a:p>
+                  </a:txBody>
+                  <a:tcPr/>
+                </a:tc>
+                <a:extLst>
+                  <a:ext uri="{0D108BD9-81ED-4DB2-BD59-A6C34878D82A}">
+                    <a16:rowId xmlns:a16="http://schemas.microsoft.com/office/drawing/2014/main" val="3504416586"/>
+                  </a:ext>
+                </a:extLst>
+              </a:tr>
+              <a:tr h="280533">
+                <a:tc>
+                  <a:txBody>
+                    <a:bodyPr/>
+                    <a:lstStyle/>
+                    <a:p>
+                      <a:pPr algn="ctr" latinLnBrk="1"/>
+                      <a:endParaRPr lang="ko-KR" altLang="en-US" sz="1100" dirty="0"/>
+                    </a:p>
+                  </a:txBody>
+                  <a:tcPr/>
+                </a:tc>
+                <a:tc>
+                  <a:txBody>
+                    <a:bodyPr/>
+                    <a:lstStyle/>
+                    <a:p>
+                      <a:pPr algn="ctr" latinLnBrk="1"/>
+                      <a:endParaRPr lang="ko-KR" altLang="en-US" sz="1100" dirty="0"/>
+                    </a:p>
+                  </a:txBody>
+                  <a:tcPr/>
+                </a:tc>
+                <a:tc>
+                  <a:txBody>
+                    <a:bodyPr/>
+                    <a:lstStyle/>
+                    <a:p>
+                      <a:pPr algn="ctr" latinLnBrk="1"/>
+                      <a:endParaRPr lang="ko-KR" altLang="en-US" sz="1100" dirty="0"/>
+                    </a:p>
+                  </a:txBody>
+                  <a:tcPr/>
+                </a:tc>
+                <a:tc>
+                  <a:txBody>
+                    <a:bodyPr/>
+                    <a:lstStyle/>
+                    <a:p>
+                      <a:pPr algn="ctr" latinLnBrk="1"/>
+                      <a:endParaRPr lang="ko-KR" altLang="en-US" sz="1100" dirty="0"/>
+                    </a:p>
+                  </a:txBody>
+                  <a:tcPr/>
+                </a:tc>
+                <a:tc>
+                  <a:txBody>
+                    <a:bodyPr/>
+                    <a:lstStyle/>
+                    <a:p>
+                      <a:pPr algn="ctr" latinLnBrk="1"/>
+                      <a:endParaRPr lang="ko-KR" altLang="en-US" sz="1100" dirty="0"/>
+                    </a:p>
+                  </a:txBody>
+                  <a:tcPr/>
+                </a:tc>
+                <a:extLst>
+                  <a:ext uri="{0D108BD9-81ED-4DB2-BD59-A6C34878D82A}">
+                    <a16:rowId xmlns:a16="http://schemas.microsoft.com/office/drawing/2014/main" val="3571991854"/>
+                  </a:ext>
+                </a:extLst>
+              </a:tr>
+              <a:tr h="280533">
+                <a:tc>
+                  <a:txBody>
+                    <a:bodyPr/>
+                    <a:lstStyle/>
+                    <a:p>
+                      <a:pPr algn="ctr" latinLnBrk="1"/>
+                      <a:endParaRPr lang="ko-KR" altLang="en-US" sz="1100" dirty="0"/>
+                    </a:p>
+                  </a:txBody>
+                  <a:tcPr/>
+                </a:tc>
+                <a:tc>
+                  <a:txBody>
+                    <a:bodyPr/>
+                    <a:lstStyle/>
+                    <a:p>
+                      <a:pPr algn="ctr" latinLnBrk="1"/>
+                      <a:endParaRPr lang="ko-KR" altLang="en-US" sz="1100" dirty="0"/>
+                    </a:p>
+                  </a:txBody>
+                  <a:tcPr/>
+                </a:tc>
+                <a:tc>
+                  <a:txBody>
+                    <a:bodyPr/>
+                    <a:lstStyle/>
+                    <a:p>
+                      <a:pPr algn="ctr" latinLnBrk="1"/>
+                      <a:endParaRPr lang="ko-KR" altLang="en-US" sz="1100" dirty="0"/>
+                    </a:p>
+                  </a:txBody>
+                  <a:tcPr/>
+                </a:tc>
+                <a:tc>
+                  <a:txBody>
+                    <a:bodyPr/>
+                    <a:lstStyle/>
+                    <a:p>
+                      <a:pPr algn="ctr" latinLnBrk="1"/>
+                      <a:endParaRPr lang="ko-KR" altLang="en-US" sz="1100" dirty="0"/>
+                    </a:p>
+                  </a:txBody>
+                  <a:tcPr/>
+                </a:tc>
+                <a:tc>
+                  <a:txBody>
+                    <a:bodyPr/>
+                    <a:lstStyle/>
+                    <a:p>
+                      <a:pPr algn="ctr" latinLnBrk="1"/>
+                      <a:endParaRPr lang="ko-KR" altLang="en-US" sz="1100" dirty="0"/>
+                    </a:p>
+                  </a:txBody>
+                  <a:tcPr/>
+                </a:tc>
+                <a:extLst>
+                  <a:ext uri="{0D108BD9-81ED-4DB2-BD59-A6C34878D82A}">
+                    <a16:rowId xmlns:a16="http://schemas.microsoft.com/office/drawing/2014/main" val="3271815947"/>
+                  </a:ext>
+                </a:extLst>
+              </a:tr>
+            </a:tbl>
+          </a:graphicData>
+        </a:graphic>
+      </p:graphicFrame>
     </p:spTree>
     <p:extLst>
       <p:ext uri="{BB962C8B-B14F-4D97-AF65-F5344CB8AC3E}">
-        <p14:creationId xmlns:p14="http://schemas.microsoft.com/office/powerpoint/2010/main" val="3300344118"/>
+        <p14:creationId xmlns:p14="http://schemas.microsoft.com/office/powerpoint/2010/main" val="2649124970"/>
       </p:ext>
     </p:extLst>
   </p:cSld>

</xml_diff>

<commit_message>
Add Client directory and update 개념도
서버 코드도 깃허브로 공유하고 발전시키기로 함에 따라 클라이언트와의 구분을 위해 디렉토리를 만들었습니다. 그리고 웹페이지의 기본적인 계획과 예상 화면을 만들어 추가했습니다.
</commit_message>
<xml_diff>
--- a/개념도.pptx
+++ b/개념도.pptx
@@ -5,8 +5,10 @@
     <p:sldMasterId id="2147483648" r:id="rId1"/>
   </p:sldMasterIdLst>
   <p:sldIdLst>
-    <p:sldId id="256" r:id="rId2"/>
-    <p:sldId id="257" r:id="rId3"/>
+    <p:sldId id="258" r:id="rId2"/>
+    <p:sldId id="259" r:id="rId3"/>
+    <p:sldId id="256" r:id="rId4"/>
+    <p:sldId id="257" r:id="rId5"/>
   </p:sldIdLst>
   <p:sldSz cx="12192000" cy="6858000"/>
   <p:notesSz cx="6858000" cy="9144000"/>
@@ -260,7 +262,7 @@
           <a:p>
             <a:fld id="{6DC8BE78-1FFE-42AC-A0CC-C275443512B9}" type="datetimeFigureOut">
               <a:rPr lang="ko-KR" altLang="en-US" smtClean="0"/>
-              <a:t>2022-02-24</a:t>
+              <a:t>2022-03-04</a:t>
             </a:fld>
             <a:endParaRPr lang="ko-KR" altLang="en-US"/>
           </a:p>
@@ -458,7 +460,7 @@
           <a:p>
             <a:fld id="{6DC8BE78-1FFE-42AC-A0CC-C275443512B9}" type="datetimeFigureOut">
               <a:rPr lang="ko-KR" altLang="en-US" smtClean="0"/>
-              <a:t>2022-02-24</a:t>
+              <a:t>2022-03-04</a:t>
             </a:fld>
             <a:endParaRPr lang="ko-KR" altLang="en-US"/>
           </a:p>
@@ -666,7 +668,7 @@
           <a:p>
             <a:fld id="{6DC8BE78-1FFE-42AC-A0CC-C275443512B9}" type="datetimeFigureOut">
               <a:rPr lang="ko-KR" altLang="en-US" smtClean="0"/>
-              <a:t>2022-02-24</a:t>
+              <a:t>2022-03-04</a:t>
             </a:fld>
             <a:endParaRPr lang="ko-KR" altLang="en-US"/>
           </a:p>
@@ -864,7 +866,7 @@
           <a:p>
             <a:fld id="{6DC8BE78-1FFE-42AC-A0CC-C275443512B9}" type="datetimeFigureOut">
               <a:rPr lang="ko-KR" altLang="en-US" smtClean="0"/>
-              <a:t>2022-02-24</a:t>
+              <a:t>2022-03-04</a:t>
             </a:fld>
             <a:endParaRPr lang="ko-KR" altLang="en-US"/>
           </a:p>
@@ -1139,7 +1141,7 @@
           <a:p>
             <a:fld id="{6DC8BE78-1FFE-42AC-A0CC-C275443512B9}" type="datetimeFigureOut">
               <a:rPr lang="ko-KR" altLang="en-US" smtClean="0"/>
-              <a:t>2022-02-24</a:t>
+              <a:t>2022-03-04</a:t>
             </a:fld>
             <a:endParaRPr lang="ko-KR" altLang="en-US"/>
           </a:p>
@@ -1404,7 +1406,7 @@
           <a:p>
             <a:fld id="{6DC8BE78-1FFE-42AC-A0CC-C275443512B9}" type="datetimeFigureOut">
               <a:rPr lang="ko-KR" altLang="en-US" smtClean="0"/>
-              <a:t>2022-02-24</a:t>
+              <a:t>2022-03-04</a:t>
             </a:fld>
             <a:endParaRPr lang="ko-KR" altLang="en-US"/>
           </a:p>
@@ -1816,7 +1818,7 @@
           <a:p>
             <a:fld id="{6DC8BE78-1FFE-42AC-A0CC-C275443512B9}" type="datetimeFigureOut">
               <a:rPr lang="ko-KR" altLang="en-US" smtClean="0"/>
-              <a:t>2022-02-24</a:t>
+              <a:t>2022-03-04</a:t>
             </a:fld>
             <a:endParaRPr lang="ko-KR" altLang="en-US"/>
           </a:p>
@@ -1957,7 +1959,7 @@
           <a:p>
             <a:fld id="{6DC8BE78-1FFE-42AC-A0CC-C275443512B9}" type="datetimeFigureOut">
               <a:rPr lang="ko-KR" altLang="en-US" smtClean="0"/>
-              <a:t>2022-02-24</a:t>
+              <a:t>2022-03-04</a:t>
             </a:fld>
             <a:endParaRPr lang="ko-KR" altLang="en-US"/>
           </a:p>
@@ -2070,7 +2072,7 @@
           <a:p>
             <a:fld id="{6DC8BE78-1FFE-42AC-A0CC-C275443512B9}" type="datetimeFigureOut">
               <a:rPr lang="ko-KR" altLang="en-US" smtClean="0"/>
-              <a:t>2022-02-24</a:t>
+              <a:t>2022-03-04</a:t>
             </a:fld>
             <a:endParaRPr lang="ko-KR" altLang="en-US"/>
           </a:p>
@@ -2381,7 +2383,7 @@
           <a:p>
             <a:fld id="{6DC8BE78-1FFE-42AC-A0CC-C275443512B9}" type="datetimeFigureOut">
               <a:rPr lang="ko-KR" altLang="en-US" smtClean="0"/>
-              <a:t>2022-02-24</a:t>
+              <a:t>2022-03-04</a:t>
             </a:fld>
             <a:endParaRPr lang="ko-KR" altLang="en-US"/>
           </a:p>
@@ -2669,7 +2671,7 @@
           <a:p>
             <a:fld id="{6DC8BE78-1FFE-42AC-A0CC-C275443512B9}" type="datetimeFigureOut">
               <a:rPr lang="ko-KR" altLang="en-US" smtClean="0"/>
-              <a:t>2022-02-24</a:t>
+              <a:t>2022-03-04</a:t>
             </a:fld>
             <a:endParaRPr lang="ko-KR" altLang="en-US"/>
           </a:p>
@@ -2910,7 +2912,7 @@
           <a:p>
             <a:fld id="{6DC8BE78-1FFE-42AC-A0CC-C275443512B9}" type="datetimeFigureOut">
               <a:rPr lang="ko-KR" altLang="en-US" smtClean="0"/>
-              <a:t>2022-02-24</a:t>
+              <a:t>2022-03-04</a:t>
             </a:fld>
             <a:endParaRPr lang="ko-KR" altLang="en-US"/>
           </a:p>
@@ -3329,6 +3331,1510 @@
       </p:grpSpPr>
       <p:sp>
         <p:nvSpPr>
+          <p:cNvPr id="2" name="제목 1">
+            <a:extLst>
+              <a:ext uri="{FF2B5EF4-FFF2-40B4-BE49-F238E27FC236}">
+                <a16:creationId xmlns:a16="http://schemas.microsoft.com/office/drawing/2014/main" id="{548DBD96-2383-4C25-9EBD-6056DF8D44CD}"/>
+              </a:ext>
+            </a:extLst>
+          </p:cNvPr>
+          <p:cNvSpPr>
+            <a:spLocks noGrp="1"/>
+          </p:cNvSpPr>
+          <p:nvPr>
+            <p:ph type="ctrTitle"/>
+          </p:nvPr>
+        </p:nvSpPr>
+        <p:spPr/>
+        <p:txBody>
+          <a:bodyPr>
+            <a:normAutofit fontScale="90000"/>
+          </a:bodyPr>
+          <a:lstStyle/>
+          <a:p>
+            <a:r>
+              <a:rPr lang="en-US" altLang="ko-KR" dirty="0"/>
+              <a:t>Elder Scrolls Online Personal Information Service</a:t>
+            </a:r>
+            <a:endParaRPr lang="ko-KR" altLang="en-US" dirty="0"/>
+          </a:p>
+        </p:txBody>
+      </p:sp>
+      <p:sp>
+        <p:nvSpPr>
+          <p:cNvPr id="3" name="부제목 2">
+            <a:extLst>
+              <a:ext uri="{FF2B5EF4-FFF2-40B4-BE49-F238E27FC236}">
+                <a16:creationId xmlns:a16="http://schemas.microsoft.com/office/drawing/2014/main" id="{7EEDEE47-F3D1-4592-8BEE-DDDB6E87D62A}"/>
+              </a:ext>
+            </a:extLst>
+          </p:cNvPr>
+          <p:cNvSpPr>
+            <a:spLocks noGrp="1"/>
+          </p:cNvSpPr>
+          <p:nvPr>
+            <p:ph type="subTitle" idx="1"/>
+          </p:nvPr>
+        </p:nvSpPr>
+        <p:spPr/>
+        <p:txBody>
+          <a:bodyPr/>
+          <a:lstStyle/>
+          <a:p>
+            <a:r>
+              <a:rPr lang="ko-KR" altLang="en-US" dirty="0" err="1"/>
+              <a:t>디푼</a:t>
+            </a:r>
+            <a:r>
+              <a:rPr lang="ko-KR" altLang="en-US" dirty="0"/>
+              <a:t> </a:t>
+            </a:r>
+            <a:r>
+              <a:rPr lang="en-US" altLang="ko-KR" dirty="0"/>
+              <a:t>(</a:t>
+            </a:r>
+            <a:r>
+              <a:rPr lang="en-US" altLang="ko-KR" dirty="0" err="1"/>
+              <a:t>DiPoon</a:t>
+            </a:r>
+            <a:r>
+              <a:rPr lang="en-US" altLang="ko-KR" dirty="0"/>
+              <a:t>)</a:t>
+            </a:r>
+          </a:p>
+          <a:p>
+            <a:r>
+              <a:rPr lang="en-US" altLang="ko-KR" dirty="0"/>
+              <a:t>6129876j@naver.com</a:t>
+            </a:r>
+          </a:p>
+        </p:txBody>
+      </p:sp>
+    </p:spTree>
+    <p:extLst>
+      <p:ext uri="{BB962C8B-B14F-4D97-AF65-F5344CB8AC3E}">
+        <p14:creationId xmlns:p14="http://schemas.microsoft.com/office/powerpoint/2010/main" val="4094956035"/>
+      </p:ext>
+    </p:extLst>
+  </p:cSld>
+  <p:clrMapOvr>
+    <a:masterClrMapping/>
+  </p:clrMapOvr>
+</p:sld>
+</file>
+
+<file path=ppt/slides/slide2.xml><?xml version="1.0" encoding="utf-8"?>
+<p:sld xmlns:a="http://schemas.openxmlformats.org/drawingml/2006/main" xmlns:r="http://schemas.openxmlformats.org/officeDocument/2006/relationships" xmlns:p="http://schemas.openxmlformats.org/presentationml/2006/main">
+  <p:cSld>
+    <p:spTree>
+      <p:nvGrpSpPr>
+        <p:cNvPr id="1" name=""/>
+        <p:cNvGrpSpPr/>
+        <p:nvPr/>
+      </p:nvGrpSpPr>
+      <p:grpSpPr>
+        <a:xfrm>
+          <a:off x="0" y="0"/>
+          <a:ext cx="0" cy="0"/>
+          <a:chOff x="0" y="0"/>
+          <a:chExt cx="0" cy="0"/>
+        </a:xfrm>
+      </p:grpSpPr>
+      <p:sp>
+        <p:nvSpPr>
+          <p:cNvPr id="4" name="직사각형 3">
+            <a:extLst>
+              <a:ext uri="{FF2B5EF4-FFF2-40B4-BE49-F238E27FC236}">
+                <a16:creationId xmlns:a16="http://schemas.microsoft.com/office/drawing/2014/main" id="{DC116ED2-79CA-400C-B612-BB0BAC77F701}"/>
+              </a:ext>
+            </a:extLst>
+          </p:cNvPr>
+          <p:cNvSpPr/>
+          <p:nvPr/>
+        </p:nvSpPr>
+        <p:spPr>
+          <a:xfrm>
+            <a:off x="335560" y="1979598"/>
+            <a:ext cx="3615655" cy="4513277"/>
+          </a:xfrm>
+          <a:prstGeom prst="rect">
+            <a:avLst/>
+          </a:prstGeom>
+          <a:noFill/>
+          <a:ln>
+            <a:solidFill>
+              <a:schemeClr val="tx1"/>
+            </a:solidFill>
+          </a:ln>
+        </p:spPr>
+        <p:style>
+          <a:lnRef idx="2">
+            <a:schemeClr val="accent1">
+              <a:shade val="50000"/>
+            </a:schemeClr>
+          </a:lnRef>
+          <a:fillRef idx="1">
+            <a:schemeClr val="accent1"/>
+          </a:fillRef>
+          <a:effectRef idx="0">
+            <a:schemeClr val="accent1"/>
+          </a:effectRef>
+          <a:fontRef idx="minor">
+            <a:schemeClr val="lt1"/>
+          </a:fontRef>
+        </p:style>
+        <p:txBody>
+          <a:bodyPr rtlCol="0" anchor="ctr"/>
+          <a:lstStyle/>
+          <a:p>
+            <a:pPr algn="ctr"/>
+            <a:endParaRPr lang="en-US" altLang="ko-KR" dirty="0">
+              <a:solidFill>
+                <a:schemeClr val="tx1"/>
+              </a:solidFill>
+            </a:endParaRPr>
+          </a:p>
+        </p:txBody>
+      </p:sp>
+      <p:sp>
+        <p:nvSpPr>
+          <p:cNvPr id="5" name="제목 1">
+            <a:extLst>
+              <a:ext uri="{FF2B5EF4-FFF2-40B4-BE49-F238E27FC236}">
+                <a16:creationId xmlns:a16="http://schemas.microsoft.com/office/drawing/2014/main" id="{B27FAC5A-A8D7-44CF-941C-F84FC1C59ACC}"/>
+              </a:ext>
+            </a:extLst>
+          </p:cNvPr>
+          <p:cNvSpPr>
+            <a:spLocks noGrp="1"/>
+          </p:cNvSpPr>
+          <p:nvPr>
+            <p:ph type="title"/>
+          </p:nvPr>
+        </p:nvSpPr>
+        <p:spPr>
+          <a:xfrm>
+            <a:off x="838200" y="365125"/>
+            <a:ext cx="10515600" cy="1325563"/>
+          </a:xfrm>
+        </p:spPr>
+        <p:txBody>
+          <a:bodyPr/>
+          <a:lstStyle/>
+          <a:p>
+            <a:r>
+              <a:rPr lang="ko-KR" altLang="en-US" dirty="0"/>
+              <a:t>웹페이지 구상</a:t>
+            </a:r>
+          </a:p>
+        </p:txBody>
+      </p:sp>
+      <p:sp>
+        <p:nvSpPr>
+          <p:cNvPr id="7" name="직사각형 6">
+            <a:extLst>
+              <a:ext uri="{FF2B5EF4-FFF2-40B4-BE49-F238E27FC236}">
+                <a16:creationId xmlns:a16="http://schemas.microsoft.com/office/drawing/2014/main" id="{E53E017B-5778-4C4E-8D3F-3525A1F33BB3}"/>
+              </a:ext>
+            </a:extLst>
+          </p:cNvPr>
+          <p:cNvSpPr/>
+          <p:nvPr/>
+        </p:nvSpPr>
+        <p:spPr>
+          <a:xfrm>
+            <a:off x="4409813" y="1979596"/>
+            <a:ext cx="3615655" cy="4513277"/>
+          </a:xfrm>
+          <a:prstGeom prst="rect">
+            <a:avLst/>
+          </a:prstGeom>
+          <a:noFill/>
+          <a:ln>
+            <a:solidFill>
+              <a:schemeClr val="tx1"/>
+            </a:solidFill>
+          </a:ln>
+        </p:spPr>
+        <p:style>
+          <a:lnRef idx="2">
+            <a:schemeClr val="accent1">
+              <a:shade val="50000"/>
+            </a:schemeClr>
+          </a:lnRef>
+          <a:fillRef idx="1">
+            <a:schemeClr val="accent1"/>
+          </a:fillRef>
+          <a:effectRef idx="0">
+            <a:schemeClr val="accent1"/>
+          </a:effectRef>
+          <a:fontRef idx="minor">
+            <a:schemeClr val="lt1"/>
+          </a:fontRef>
+        </p:style>
+        <p:txBody>
+          <a:bodyPr rtlCol="0" anchor="ctr"/>
+          <a:lstStyle/>
+          <a:p>
+            <a:pPr algn="ctr"/>
+            <a:endParaRPr lang="ko-KR" altLang="en-US"/>
+          </a:p>
+        </p:txBody>
+      </p:sp>
+      <p:sp>
+        <p:nvSpPr>
+          <p:cNvPr id="8" name="직사각형 7">
+            <a:extLst>
+              <a:ext uri="{FF2B5EF4-FFF2-40B4-BE49-F238E27FC236}">
+                <a16:creationId xmlns:a16="http://schemas.microsoft.com/office/drawing/2014/main" id="{5F0DE5E9-EB23-4280-AF31-9FEED85A03BF}"/>
+              </a:ext>
+            </a:extLst>
+          </p:cNvPr>
+          <p:cNvSpPr/>
+          <p:nvPr/>
+        </p:nvSpPr>
+        <p:spPr>
+          <a:xfrm>
+            <a:off x="8484067" y="1979597"/>
+            <a:ext cx="3615655" cy="4513277"/>
+          </a:xfrm>
+          <a:prstGeom prst="rect">
+            <a:avLst/>
+          </a:prstGeom>
+          <a:noFill/>
+          <a:ln>
+            <a:solidFill>
+              <a:schemeClr val="tx1"/>
+            </a:solidFill>
+          </a:ln>
+        </p:spPr>
+        <p:style>
+          <a:lnRef idx="2">
+            <a:schemeClr val="accent1">
+              <a:shade val="50000"/>
+            </a:schemeClr>
+          </a:lnRef>
+          <a:fillRef idx="1">
+            <a:schemeClr val="accent1"/>
+          </a:fillRef>
+          <a:effectRef idx="0">
+            <a:schemeClr val="accent1"/>
+          </a:effectRef>
+          <a:fontRef idx="minor">
+            <a:schemeClr val="lt1"/>
+          </a:fontRef>
+        </p:style>
+        <p:txBody>
+          <a:bodyPr rtlCol="0" anchor="ctr"/>
+          <a:lstStyle/>
+          <a:p>
+            <a:pPr algn="ctr"/>
+            <a:endParaRPr lang="ko-KR" altLang="en-US"/>
+          </a:p>
+        </p:txBody>
+      </p:sp>
+      <p:sp>
+        <p:nvSpPr>
+          <p:cNvPr id="10" name="직사각형 9">
+            <a:extLst>
+              <a:ext uri="{FF2B5EF4-FFF2-40B4-BE49-F238E27FC236}">
+                <a16:creationId xmlns:a16="http://schemas.microsoft.com/office/drawing/2014/main" id="{8AD19085-181B-4840-80C6-2879B400773E}"/>
+              </a:ext>
+            </a:extLst>
+          </p:cNvPr>
+          <p:cNvSpPr/>
+          <p:nvPr/>
+        </p:nvSpPr>
+        <p:spPr>
+          <a:xfrm>
+            <a:off x="727745" y="4575479"/>
+            <a:ext cx="1891717" cy="323691"/>
+          </a:xfrm>
+          <a:prstGeom prst="rect">
+            <a:avLst/>
+          </a:prstGeom>
+          <a:noFill/>
+          <a:ln>
+            <a:solidFill>
+              <a:schemeClr val="tx1"/>
+            </a:solidFill>
+          </a:ln>
+        </p:spPr>
+        <p:style>
+          <a:lnRef idx="2">
+            <a:schemeClr val="accent1">
+              <a:shade val="50000"/>
+            </a:schemeClr>
+          </a:lnRef>
+          <a:fillRef idx="1">
+            <a:schemeClr val="accent1"/>
+          </a:fillRef>
+          <a:effectRef idx="0">
+            <a:schemeClr val="accent1"/>
+          </a:effectRef>
+          <a:fontRef idx="minor">
+            <a:schemeClr val="lt1"/>
+          </a:fontRef>
+        </p:style>
+        <p:txBody>
+          <a:bodyPr rtlCol="0" anchor="ctr"/>
+          <a:lstStyle/>
+          <a:p>
+            <a:pPr algn="ctr"/>
+            <a:r>
+              <a:rPr lang="en-US" altLang="ko-KR" dirty="0">
+                <a:solidFill>
+                  <a:schemeClr val="tx1"/>
+                </a:solidFill>
+              </a:rPr>
+              <a:t>ID</a:t>
+            </a:r>
+            <a:endParaRPr lang="ko-KR" altLang="en-US" dirty="0">
+              <a:solidFill>
+                <a:schemeClr val="tx1"/>
+              </a:solidFill>
+            </a:endParaRPr>
+          </a:p>
+        </p:txBody>
+      </p:sp>
+      <p:sp>
+        <p:nvSpPr>
+          <p:cNvPr id="11" name="직사각형 10">
+            <a:extLst>
+              <a:ext uri="{FF2B5EF4-FFF2-40B4-BE49-F238E27FC236}">
+                <a16:creationId xmlns:a16="http://schemas.microsoft.com/office/drawing/2014/main" id="{0623CF31-953D-40E0-B079-B3BB2F2B6B13}"/>
+              </a:ext>
+            </a:extLst>
+          </p:cNvPr>
+          <p:cNvSpPr/>
+          <p:nvPr/>
+        </p:nvSpPr>
+        <p:spPr>
+          <a:xfrm>
+            <a:off x="727744" y="5026234"/>
+            <a:ext cx="1891717" cy="323691"/>
+          </a:xfrm>
+          <a:prstGeom prst="rect">
+            <a:avLst/>
+          </a:prstGeom>
+          <a:noFill/>
+          <a:ln>
+            <a:solidFill>
+              <a:schemeClr val="tx1"/>
+            </a:solidFill>
+          </a:ln>
+        </p:spPr>
+        <p:style>
+          <a:lnRef idx="2">
+            <a:schemeClr val="accent1">
+              <a:shade val="50000"/>
+            </a:schemeClr>
+          </a:lnRef>
+          <a:fillRef idx="1">
+            <a:schemeClr val="accent1"/>
+          </a:fillRef>
+          <a:effectRef idx="0">
+            <a:schemeClr val="accent1"/>
+          </a:effectRef>
+          <a:fontRef idx="minor">
+            <a:schemeClr val="lt1"/>
+          </a:fontRef>
+        </p:style>
+        <p:txBody>
+          <a:bodyPr rtlCol="0" anchor="ctr"/>
+          <a:lstStyle/>
+          <a:p>
+            <a:pPr algn="ctr"/>
+            <a:r>
+              <a:rPr lang="en-US" altLang="ko-KR" dirty="0">
+                <a:solidFill>
+                  <a:schemeClr val="tx1"/>
+                </a:solidFill>
+              </a:rPr>
+              <a:t>PW</a:t>
+            </a:r>
+            <a:endParaRPr lang="ko-KR" altLang="en-US" dirty="0">
+              <a:solidFill>
+                <a:schemeClr val="tx1"/>
+              </a:solidFill>
+            </a:endParaRPr>
+          </a:p>
+        </p:txBody>
+      </p:sp>
+      <p:sp>
+        <p:nvSpPr>
+          <p:cNvPr id="12" name="직사각형 11">
+            <a:extLst>
+              <a:ext uri="{FF2B5EF4-FFF2-40B4-BE49-F238E27FC236}">
+                <a16:creationId xmlns:a16="http://schemas.microsoft.com/office/drawing/2014/main" id="{909A884E-8A44-4D02-BAB1-0A5B9977CF98}"/>
+              </a:ext>
+            </a:extLst>
+          </p:cNvPr>
+          <p:cNvSpPr/>
+          <p:nvPr/>
+        </p:nvSpPr>
+        <p:spPr>
+          <a:xfrm>
+            <a:off x="2725374" y="4575480"/>
+            <a:ext cx="915448" cy="774446"/>
+          </a:xfrm>
+          <a:prstGeom prst="rect">
+            <a:avLst/>
+          </a:prstGeom>
+          <a:solidFill>
+            <a:schemeClr val="tx1"/>
+          </a:solidFill>
+          <a:ln>
+            <a:solidFill>
+              <a:schemeClr val="tx1"/>
+            </a:solidFill>
+          </a:ln>
+        </p:spPr>
+        <p:style>
+          <a:lnRef idx="2">
+            <a:schemeClr val="accent1">
+              <a:shade val="50000"/>
+            </a:schemeClr>
+          </a:lnRef>
+          <a:fillRef idx="1">
+            <a:schemeClr val="accent1"/>
+          </a:fillRef>
+          <a:effectRef idx="0">
+            <a:schemeClr val="accent1"/>
+          </a:effectRef>
+          <a:fontRef idx="minor">
+            <a:schemeClr val="lt1"/>
+          </a:fontRef>
+        </p:style>
+        <p:txBody>
+          <a:bodyPr rtlCol="0" anchor="ctr"/>
+          <a:lstStyle/>
+          <a:p>
+            <a:pPr algn="ctr"/>
+            <a:r>
+              <a:rPr lang="ko-KR" altLang="en-US">
+                <a:solidFill>
+                  <a:schemeClr val="bg1"/>
+                </a:solidFill>
+              </a:rPr>
+              <a:t>로그인</a:t>
+            </a:r>
+            <a:endParaRPr lang="en-US" altLang="ko-KR" dirty="0">
+              <a:solidFill>
+                <a:schemeClr val="bg1"/>
+              </a:solidFill>
+            </a:endParaRPr>
+          </a:p>
+        </p:txBody>
+      </p:sp>
+      <p:sp>
+        <p:nvSpPr>
+          <p:cNvPr id="13" name="TextBox 12">
+            <a:extLst>
+              <a:ext uri="{FF2B5EF4-FFF2-40B4-BE49-F238E27FC236}">
+                <a16:creationId xmlns:a16="http://schemas.microsoft.com/office/drawing/2014/main" id="{A23D00AE-BE87-4276-9212-F6CCC775CADF}"/>
+              </a:ext>
+            </a:extLst>
+          </p:cNvPr>
+          <p:cNvSpPr txBox="1"/>
+          <p:nvPr/>
+        </p:nvSpPr>
+        <p:spPr>
+          <a:xfrm>
+            <a:off x="607678" y="3110594"/>
+            <a:ext cx="2655639" cy="369332"/>
+          </a:xfrm>
+          <a:prstGeom prst="rect">
+            <a:avLst/>
+          </a:prstGeom>
+          <a:noFill/>
+        </p:spPr>
+        <p:txBody>
+          <a:bodyPr wrap="square" rtlCol="0">
+            <a:spAutoFit/>
+          </a:bodyPr>
+          <a:lstStyle/>
+          <a:p>
+            <a:r>
+              <a:rPr lang="ko-KR" altLang="en-US" dirty="0"/>
+              <a:t>페이지 및 서비스 소개</a:t>
+            </a:r>
+          </a:p>
+        </p:txBody>
+      </p:sp>
+      <p:sp>
+        <p:nvSpPr>
+          <p:cNvPr id="14" name="TextBox 13">
+            <a:extLst>
+              <a:ext uri="{FF2B5EF4-FFF2-40B4-BE49-F238E27FC236}">
+                <a16:creationId xmlns:a16="http://schemas.microsoft.com/office/drawing/2014/main" id="{FDAAD156-83E7-4F0C-B88E-FD4E9FD607C6}"/>
+              </a:ext>
+            </a:extLst>
+          </p:cNvPr>
+          <p:cNvSpPr txBox="1"/>
+          <p:nvPr/>
+        </p:nvSpPr>
+        <p:spPr>
+          <a:xfrm>
+            <a:off x="543887" y="2043742"/>
+            <a:ext cx="2424418" cy="923330"/>
+          </a:xfrm>
+          <a:prstGeom prst="rect">
+            <a:avLst/>
+          </a:prstGeom>
+          <a:noFill/>
+        </p:spPr>
+        <p:txBody>
+          <a:bodyPr wrap="square" rtlCol="0">
+            <a:spAutoFit/>
+          </a:bodyPr>
+          <a:lstStyle/>
+          <a:p>
+            <a:r>
+              <a:rPr lang="en-US" altLang="ko-KR" dirty="0"/>
+              <a:t>Elder Scrolls Online Personal Information Service</a:t>
+            </a:r>
+            <a:endParaRPr lang="ko-KR" altLang="en-US" dirty="0"/>
+          </a:p>
+        </p:txBody>
+      </p:sp>
+      <p:sp>
+        <p:nvSpPr>
+          <p:cNvPr id="15" name="TextBox 14">
+            <a:extLst>
+              <a:ext uri="{FF2B5EF4-FFF2-40B4-BE49-F238E27FC236}">
+                <a16:creationId xmlns:a16="http://schemas.microsoft.com/office/drawing/2014/main" id="{E09DB2E6-E729-4339-90E9-E3700A1AC940}"/>
+              </a:ext>
+            </a:extLst>
+          </p:cNvPr>
+          <p:cNvSpPr txBox="1"/>
+          <p:nvPr/>
+        </p:nvSpPr>
+        <p:spPr>
+          <a:xfrm>
+            <a:off x="921391" y="5924878"/>
+            <a:ext cx="2424418" cy="369332"/>
+          </a:xfrm>
+          <a:prstGeom prst="rect">
+            <a:avLst/>
+          </a:prstGeom>
+          <a:noFill/>
+        </p:spPr>
+        <p:txBody>
+          <a:bodyPr wrap="square" rtlCol="0">
+            <a:spAutoFit/>
+          </a:bodyPr>
+          <a:lstStyle/>
+          <a:p>
+            <a:r>
+              <a:rPr lang="ko-KR" altLang="en-US"/>
+              <a:t>제니맥스</a:t>
+            </a:r>
+            <a:r>
+              <a:rPr lang="ko-KR" altLang="en-US" dirty="0"/>
+              <a:t> 무관</a:t>
+            </a:r>
+          </a:p>
+        </p:txBody>
+      </p:sp>
+      <p:sp>
+        <p:nvSpPr>
+          <p:cNvPr id="16" name="TextBox 15">
+            <a:extLst>
+              <a:ext uri="{FF2B5EF4-FFF2-40B4-BE49-F238E27FC236}">
+                <a16:creationId xmlns:a16="http://schemas.microsoft.com/office/drawing/2014/main" id="{894CF2A4-ED6E-4857-BA49-2908E95028EA}"/>
+              </a:ext>
+            </a:extLst>
+          </p:cNvPr>
+          <p:cNvSpPr txBox="1"/>
+          <p:nvPr/>
+        </p:nvSpPr>
+        <p:spPr>
+          <a:xfrm>
+            <a:off x="602086" y="3549771"/>
+            <a:ext cx="2655639" cy="369332"/>
+          </a:xfrm>
+          <a:prstGeom prst="rect">
+            <a:avLst/>
+          </a:prstGeom>
+          <a:noFill/>
+        </p:spPr>
+        <p:txBody>
+          <a:bodyPr wrap="square" rtlCol="0">
+            <a:spAutoFit/>
+          </a:bodyPr>
+          <a:lstStyle/>
+          <a:p>
+            <a:r>
+              <a:rPr lang="ko-KR" altLang="en-US" dirty="0"/>
+              <a:t>사용 방법</a:t>
+            </a:r>
+          </a:p>
+        </p:txBody>
+      </p:sp>
+      <p:sp>
+        <p:nvSpPr>
+          <p:cNvPr id="17" name="TextBox 16">
+            <a:extLst>
+              <a:ext uri="{FF2B5EF4-FFF2-40B4-BE49-F238E27FC236}">
+                <a16:creationId xmlns:a16="http://schemas.microsoft.com/office/drawing/2014/main" id="{927CD873-3458-4C53-832B-359D19CBE858}"/>
+              </a:ext>
+            </a:extLst>
+          </p:cNvPr>
+          <p:cNvSpPr txBox="1"/>
+          <p:nvPr/>
+        </p:nvSpPr>
+        <p:spPr>
+          <a:xfrm>
+            <a:off x="1178128" y="5474122"/>
+            <a:ext cx="2655639" cy="369332"/>
+          </a:xfrm>
+          <a:prstGeom prst="rect">
+            <a:avLst/>
+          </a:prstGeom>
+          <a:noFill/>
+        </p:spPr>
+        <p:txBody>
+          <a:bodyPr wrap="square" rtlCol="0">
+            <a:spAutoFit/>
+          </a:bodyPr>
+          <a:lstStyle/>
+          <a:p>
+            <a:r>
+              <a:rPr lang="ko-KR" altLang="en-US" dirty="0"/>
+              <a:t>내 연락처</a:t>
+            </a:r>
+          </a:p>
+        </p:txBody>
+      </p:sp>
+      <p:sp>
+        <p:nvSpPr>
+          <p:cNvPr id="18" name="TextBox 17">
+            <a:extLst>
+              <a:ext uri="{FF2B5EF4-FFF2-40B4-BE49-F238E27FC236}">
+                <a16:creationId xmlns:a16="http://schemas.microsoft.com/office/drawing/2014/main" id="{F217C93E-0DC6-43DF-9994-B291EAFECCB9}"/>
+              </a:ext>
+            </a:extLst>
+          </p:cNvPr>
+          <p:cNvSpPr txBox="1"/>
+          <p:nvPr/>
+        </p:nvSpPr>
+        <p:spPr>
+          <a:xfrm>
+            <a:off x="527459" y="1578194"/>
+            <a:ext cx="2655639" cy="369332"/>
+          </a:xfrm>
+          <a:prstGeom prst="rect">
+            <a:avLst/>
+          </a:prstGeom>
+          <a:noFill/>
+        </p:spPr>
+        <p:txBody>
+          <a:bodyPr wrap="square" rtlCol="0">
+            <a:spAutoFit/>
+          </a:bodyPr>
+          <a:lstStyle/>
+          <a:p>
+            <a:r>
+              <a:rPr lang="ko-KR" altLang="en-US" dirty="0"/>
+              <a:t>기본 페이지</a:t>
+            </a:r>
+            <a:r>
+              <a:rPr lang="en-US" altLang="ko-KR" dirty="0"/>
+              <a:t>, </a:t>
+            </a:r>
+            <a:r>
+              <a:rPr lang="ko-KR" altLang="en-US" dirty="0"/>
+              <a:t>홈페이지</a:t>
+            </a:r>
+          </a:p>
+        </p:txBody>
+      </p:sp>
+      <p:sp>
+        <p:nvSpPr>
+          <p:cNvPr id="19" name="TextBox 18">
+            <a:extLst>
+              <a:ext uri="{FF2B5EF4-FFF2-40B4-BE49-F238E27FC236}">
+                <a16:creationId xmlns:a16="http://schemas.microsoft.com/office/drawing/2014/main" id="{43DA6646-07F8-454D-B80D-E552CEE0D087}"/>
+              </a:ext>
+            </a:extLst>
+          </p:cNvPr>
+          <p:cNvSpPr txBox="1"/>
+          <p:nvPr/>
+        </p:nvSpPr>
+        <p:spPr>
+          <a:xfrm>
+            <a:off x="4522017" y="1551738"/>
+            <a:ext cx="2655639" cy="369332"/>
+          </a:xfrm>
+          <a:prstGeom prst="rect">
+            <a:avLst/>
+          </a:prstGeom>
+          <a:noFill/>
+        </p:spPr>
+        <p:txBody>
+          <a:bodyPr wrap="square" rtlCol="0">
+            <a:spAutoFit/>
+          </a:bodyPr>
+          <a:lstStyle/>
+          <a:p>
+            <a:r>
+              <a:rPr lang="ko-KR" altLang="en-US" dirty="0" err="1"/>
+              <a:t>로그인시</a:t>
+            </a:r>
+            <a:endParaRPr lang="ko-KR" altLang="en-US" dirty="0"/>
+          </a:p>
+        </p:txBody>
+      </p:sp>
+      <p:sp>
+        <p:nvSpPr>
+          <p:cNvPr id="20" name="TextBox 19">
+            <a:extLst>
+              <a:ext uri="{FF2B5EF4-FFF2-40B4-BE49-F238E27FC236}">
+                <a16:creationId xmlns:a16="http://schemas.microsoft.com/office/drawing/2014/main" id="{29F81F49-CD6B-4AD4-81A4-74246D7CBF05}"/>
+              </a:ext>
+            </a:extLst>
+          </p:cNvPr>
+          <p:cNvSpPr txBox="1"/>
+          <p:nvPr/>
+        </p:nvSpPr>
+        <p:spPr>
+          <a:xfrm>
+            <a:off x="4522017" y="2209978"/>
+            <a:ext cx="2935359" cy="369332"/>
+          </a:xfrm>
+          <a:prstGeom prst="rect">
+            <a:avLst/>
+          </a:prstGeom>
+          <a:noFill/>
+        </p:spPr>
+        <p:txBody>
+          <a:bodyPr wrap="square" rtlCol="0">
+            <a:spAutoFit/>
+          </a:bodyPr>
+          <a:lstStyle/>
+          <a:p>
+            <a:r>
+              <a:rPr lang="ko-KR" altLang="en-US" dirty="0" err="1"/>
+              <a:t>누구로</a:t>
+            </a:r>
+            <a:r>
+              <a:rPr lang="ko-KR" altLang="en-US" dirty="0"/>
+              <a:t> 로그인 했는지 </a:t>
+            </a:r>
+            <a:r>
+              <a:rPr lang="en-US" altLang="ko-KR" dirty="0"/>
+              <a:t>ID</a:t>
+            </a:r>
+            <a:endParaRPr lang="ko-KR" altLang="en-US" dirty="0"/>
+          </a:p>
+        </p:txBody>
+      </p:sp>
+      <p:sp>
+        <p:nvSpPr>
+          <p:cNvPr id="21" name="TextBox 20">
+            <a:extLst>
+              <a:ext uri="{FF2B5EF4-FFF2-40B4-BE49-F238E27FC236}">
+                <a16:creationId xmlns:a16="http://schemas.microsoft.com/office/drawing/2014/main" id="{A6826E02-D283-4838-8870-D9E1382F10EB}"/>
+              </a:ext>
+            </a:extLst>
+          </p:cNvPr>
+          <p:cNvSpPr txBox="1"/>
+          <p:nvPr/>
+        </p:nvSpPr>
+        <p:spPr>
+          <a:xfrm>
+            <a:off x="4628320" y="3104187"/>
+            <a:ext cx="2935359" cy="369332"/>
+          </a:xfrm>
+          <a:prstGeom prst="rect">
+            <a:avLst/>
+          </a:prstGeom>
+          <a:noFill/>
+        </p:spPr>
+        <p:txBody>
+          <a:bodyPr wrap="square" rtlCol="0">
+            <a:spAutoFit/>
+          </a:bodyPr>
+          <a:lstStyle/>
+          <a:p>
+            <a:r>
+              <a:rPr lang="ko-KR" altLang="en-US" dirty="0"/>
+              <a:t>계정 보기</a:t>
+            </a:r>
+          </a:p>
+        </p:txBody>
+      </p:sp>
+      <p:sp>
+        <p:nvSpPr>
+          <p:cNvPr id="22" name="TextBox 21">
+            <a:extLst>
+              <a:ext uri="{FF2B5EF4-FFF2-40B4-BE49-F238E27FC236}">
+                <a16:creationId xmlns:a16="http://schemas.microsoft.com/office/drawing/2014/main" id="{EA0CBC64-AC52-4AC9-B7DD-3B3FE715E6B4}"/>
+              </a:ext>
+            </a:extLst>
+          </p:cNvPr>
+          <p:cNvSpPr txBox="1"/>
+          <p:nvPr/>
+        </p:nvSpPr>
+        <p:spPr>
+          <a:xfrm>
+            <a:off x="4628320" y="3549771"/>
+            <a:ext cx="2935359" cy="369332"/>
+          </a:xfrm>
+          <a:prstGeom prst="rect">
+            <a:avLst/>
+          </a:prstGeom>
+          <a:noFill/>
+        </p:spPr>
+        <p:txBody>
+          <a:bodyPr wrap="square" rtlCol="0">
+            <a:spAutoFit/>
+          </a:bodyPr>
+          <a:lstStyle/>
+          <a:p>
+            <a:r>
+              <a:rPr lang="ko-KR" altLang="en-US" dirty="0"/>
+              <a:t>캐릭터 보기</a:t>
+            </a:r>
+          </a:p>
+        </p:txBody>
+      </p:sp>
+      <p:sp>
+        <p:nvSpPr>
+          <p:cNvPr id="23" name="TextBox 22">
+            <a:extLst>
+              <a:ext uri="{FF2B5EF4-FFF2-40B4-BE49-F238E27FC236}">
+                <a16:creationId xmlns:a16="http://schemas.microsoft.com/office/drawing/2014/main" id="{8D31D4B7-11DA-4767-AE6E-82D1144DC46D}"/>
+              </a:ext>
+            </a:extLst>
+          </p:cNvPr>
+          <p:cNvSpPr txBox="1"/>
+          <p:nvPr/>
+        </p:nvSpPr>
+        <p:spPr>
+          <a:xfrm>
+            <a:off x="8516575" y="1551738"/>
+            <a:ext cx="2655639" cy="369332"/>
+          </a:xfrm>
+          <a:prstGeom prst="rect">
+            <a:avLst/>
+          </a:prstGeom>
+          <a:noFill/>
+        </p:spPr>
+        <p:txBody>
+          <a:bodyPr wrap="square" rtlCol="0">
+            <a:spAutoFit/>
+          </a:bodyPr>
+          <a:lstStyle/>
+          <a:p>
+            <a:r>
+              <a:rPr lang="ko-KR" altLang="en-US" dirty="0" err="1"/>
+              <a:t>로그인시</a:t>
+            </a:r>
+            <a:endParaRPr lang="ko-KR" altLang="en-US" dirty="0"/>
+          </a:p>
+        </p:txBody>
+      </p:sp>
+      <p:graphicFrame>
+        <p:nvGraphicFramePr>
+          <p:cNvPr id="24" name="표 24">
+            <a:extLst>
+              <a:ext uri="{FF2B5EF4-FFF2-40B4-BE49-F238E27FC236}">
+                <a16:creationId xmlns:a16="http://schemas.microsoft.com/office/drawing/2014/main" id="{5F99C985-77A3-429A-BD85-5E4A565DE49B}"/>
+              </a:ext>
+            </a:extLst>
+          </p:cNvPr>
+          <p:cNvGraphicFramePr>
+            <a:graphicFrameLocks noGrp="1"/>
+          </p:cNvGraphicFramePr>
+          <p:nvPr>
+            <p:extLst>
+              <p:ext uri="{D42A27DB-BD31-4B8C-83A1-F6EECF244321}">
+                <p14:modId xmlns:p14="http://schemas.microsoft.com/office/powerpoint/2010/main" val="1702022589"/>
+              </p:ext>
+            </p:extLst>
+          </p:nvPr>
+        </p:nvGraphicFramePr>
+        <p:xfrm>
+          <a:off x="8529598" y="2619972"/>
+          <a:ext cx="3441492" cy="3764052"/>
+        </p:xfrm>
+        <a:graphic>
+          <a:graphicData uri="http://schemas.openxmlformats.org/drawingml/2006/table">
+            <a:tbl>
+              <a:tblPr firstRow="1" bandRow="1">
+                <a:tableStyleId>{073A0DAA-6AF3-43AB-8588-CEC1D06C72B9}</a:tableStyleId>
+              </a:tblPr>
+              <a:tblGrid>
+                <a:gridCol w="573582">
+                  <a:extLst>
+                    <a:ext uri="{9D8B030D-6E8A-4147-A177-3AD203B41FA5}">
+                      <a16:colId xmlns:a16="http://schemas.microsoft.com/office/drawing/2014/main" val="2071472945"/>
+                    </a:ext>
+                  </a:extLst>
+                </a:gridCol>
+                <a:gridCol w="573582">
+                  <a:extLst>
+                    <a:ext uri="{9D8B030D-6E8A-4147-A177-3AD203B41FA5}">
+                      <a16:colId xmlns:a16="http://schemas.microsoft.com/office/drawing/2014/main" val="1147666774"/>
+                    </a:ext>
+                  </a:extLst>
+                </a:gridCol>
+                <a:gridCol w="573582">
+                  <a:extLst>
+                    <a:ext uri="{9D8B030D-6E8A-4147-A177-3AD203B41FA5}">
+                      <a16:colId xmlns:a16="http://schemas.microsoft.com/office/drawing/2014/main" val="540030022"/>
+                    </a:ext>
+                  </a:extLst>
+                </a:gridCol>
+                <a:gridCol w="573582">
+                  <a:extLst>
+                    <a:ext uri="{9D8B030D-6E8A-4147-A177-3AD203B41FA5}">
+                      <a16:colId xmlns:a16="http://schemas.microsoft.com/office/drawing/2014/main" val="2488420512"/>
+                    </a:ext>
+                  </a:extLst>
+                </a:gridCol>
+                <a:gridCol w="573582">
+                  <a:extLst>
+                    <a:ext uri="{9D8B030D-6E8A-4147-A177-3AD203B41FA5}">
+                      <a16:colId xmlns:a16="http://schemas.microsoft.com/office/drawing/2014/main" val="3204372036"/>
+                    </a:ext>
+                  </a:extLst>
+                </a:gridCol>
+                <a:gridCol w="573582">
+                  <a:extLst>
+                    <a:ext uri="{9D8B030D-6E8A-4147-A177-3AD203B41FA5}">
+                      <a16:colId xmlns:a16="http://schemas.microsoft.com/office/drawing/2014/main" val="2497195911"/>
+                    </a:ext>
+                  </a:extLst>
+                </a:gridCol>
+              </a:tblGrid>
+              <a:tr h="627342">
+                <a:tc>
+                  <a:txBody>
+                    <a:bodyPr/>
+                    <a:lstStyle/>
+                    <a:p>
+                      <a:pPr latinLnBrk="1"/>
+                      <a:endParaRPr lang="ko-KR" altLang="en-US"/>
+                    </a:p>
+                  </a:txBody>
+                  <a:tcPr/>
+                </a:tc>
+                <a:tc>
+                  <a:txBody>
+                    <a:bodyPr/>
+                    <a:lstStyle/>
+                    <a:p>
+                      <a:pPr latinLnBrk="1"/>
+                      <a:endParaRPr lang="ko-KR" altLang="en-US"/>
+                    </a:p>
+                  </a:txBody>
+                  <a:tcPr/>
+                </a:tc>
+                <a:tc>
+                  <a:txBody>
+                    <a:bodyPr/>
+                    <a:lstStyle/>
+                    <a:p>
+                      <a:pPr latinLnBrk="1"/>
+                      <a:endParaRPr lang="ko-KR" altLang="en-US"/>
+                    </a:p>
+                  </a:txBody>
+                  <a:tcPr/>
+                </a:tc>
+                <a:tc>
+                  <a:txBody>
+                    <a:bodyPr/>
+                    <a:lstStyle/>
+                    <a:p>
+                      <a:pPr latinLnBrk="1"/>
+                      <a:endParaRPr lang="ko-KR" altLang="en-US"/>
+                    </a:p>
+                  </a:txBody>
+                  <a:tcPr/>
+                </a:tc>
+                <a:tc>
+                  <a:txBody>
+                    <a:bodyPr/>
+                    <a:lstStyle/>
+                    <a:p>
+                      <a:pPr latinLnBrk="1"/>
+                      <a:endParaRPr lang="ko-KR" altLang="en-US"/>
+                    </a:p>
+                  </a:txBody>
+                  <a:tcPr/>
+                </a:tc>
+                <a:tc>
+                  <a:txBody>
+                    <a:bodyPr/>
+                    <a:lstStyle/>
+                    <a:p>
+                      <a:pPr latinLnBrk="1"/>
+                      <a:endParaRPr lang="ko-KR" altLang="en-US"/>
+                    </a:p>
+                  </a:txBody>
+                  <a:tcPr/>
+                </a:tc>
+                <a:extLst>
+                  <a:ext uri="{0D108BD9-81ED-4DB2-BD59-A6C34878D82A}">
+                    <a16:rowId xmlns:a16="http://schemas.microsoft.com/office/drawing/2014/main" val="1295770584"/>
+                  </a:ext>
+                </a:extLst>
+              </a:tr>
+              <a:tr h="627342">
+                <a:tc>
+                  <a:txBody>
+                    <a:bodyPr/>
+                    <a:lstStyle/>
+                    <a:p>
+                      <a:pPr latinLnBrk="1"/>
+                      <a:endParaRPr lang="ko-KR" altLang="en-US"/>
+                    </a:p>
+                  </a:txBody>
+                  <a:tcPr/>
+                </a:tc>
+                <a:tc>
+                  <a:txBody>
+                    <a:bodyPr/>
+                    <a:lstStyle/>
+                    <a:p>
+                      <a:pPr latinLnBrk="1"/>
+                      <a:endParaRPr lang="ko-KR" altLang="en-US"/>
+                    </a:p>
+                  </a:txBody>
+                  <a:tcPr/>
+                </a:tc>
+                <a:tc>
+                  <a:txBody>
+                    <a:bodyPr/>
+                    <a:lstStyle/>
+                    <a:p>
+                      <a:pPr latinLnBrk="1"/>
+                      <a:endParaRPr lang="ko-KR" altLang="en-US"/>
+                    </a:p>
+                  </a:txBody>
+                  <a:tcPr/>
+                </a:tc>
+                <a:tc>
+                  <a:txBody>
+                    <a:bodyPr/>
+                    <a:lstStyle/>
+                    <a:p>
+                      <a:pPr latinLnBrk="1"/>
+                      <a:endParaRPr lang="ko-KR" altLang="en-US"/>
+                    </a:p>
+                  </a:txBody>
+                  <a:tcPr/>
+                </a:tc>
+                <a:tc>
+                  <a:txBody>
+                    <a:bodyPr/>
+                    <a:lstStyle/>
+                    <a:p>
+                      <a:pPr latinLnBrk="1"/>
+                      <a:endParaRPr lang="ko-KR" altLang="en-US"/>
+                    </a:p>
+                  </a:txBody>
+                  <a:tcPr/>
+                </a:tc>
+                <a:tc>
+                  <a:txBody>
+                    <a:bodyPr/>
+                    <a:lstStyle/>
+                    <a:p>
+                      <a:pPr latinLnBrk="1"/>
+                      <a:endParaRPr lang="ko-KR" altLang="en-US"/>
+                    </a:p>
+                  </a:txBody>
+                  <a:tcPr/>
+                </a:tc>
+                <a:extLst>
+                  <a:ext uri="{0D108BD9-81ED-4DB2-BD59-A6C34878D82A}">
+                    <a16:rowId xmlns:a16="http://schemas.microsoft.com/office/drawing/2014/main" val="1918460222"/>
+                  </a:ext>
+                </a:extLst>
+              </a:tr>
+              <a:tr h="627342">
+                <a:tc>
+                  <a:txBody>
+                    <a:bodyPr/>
+                    <a:lstStyle/>
+                    <a:p>
+                      <a:pPr latinLnBrk="1"/>
+                      <a:endParaRPr lang="ko-KR" altLang="en-US"/>
+                    </a:p>
+                  </a:txBody>
+                  <a:tcPr/>
+                </a:tc>
+                <a:tc>
+                  <a:txBody>
+                    <a:bodyPr/>
+                    <a:lstStyle/>
+                    <a:p>
+                      <a:pPr latinLnBrk="1"/>
+                      <a:endParaRPr lang="ko-KR" altLang="en-US"/>
+                    </a:p>
+                  </a:txBody>
+                  <a:tcPr/>
+                </a:tc>
+                <a:tc>
+                  <a:txBody>
+                    <a:bodyPr/>
+                    <a:lstStyle/>
+                    <a:p>
+                      <a:pPr latinLnBrk="1"/>
+                      <a:endParaRPr lang="ko-KR" altLang="en-US"/>
+                    </a:p>
+                  </a:txBody>
+                  <a:tcPr/>
+                </a:tc>
+                <a:tc>
+                  <a:txBody>
+                    <a:bodyPr/>
+                    <a:lstStyle/>
+                    <a:p>
+                      <a:pPr latinLnBrk="1"/>
+                      <a:endParaRPr lang="ko-KR" altLang="en-US"/>
+                    </a:p>
+                  </a:txBody>
+                  <a:tcPr/>
+                </a:tc>
+                <a:tc>
+                  <a:txBody>
+                    <a:bodyPr/>
+                    <a:lstStyle/>
+                    <a:p>
+                      <a:pPr latinLnBrk="1"/>
+                      <a:endParaRPr lang="ko-KR" altLang="en-US"/>
+                    </a:p>
+                  </a:txBody>
+                  <a:tcPr/>
+                </a:tc>
+                <a:tc>
+                  <a:txBody>
+                    <a:bodyPr/>
+                    <a:lstStyle/>
+                    <a:p>
+                      <a:pPr latinLnBrk="1"/>
+                      <a:endParaRPr lang="ko-KR" altLang="en-US"/>
+                    </a:p>
+                  </a:txBody>
+                  <a:tcPr/>
+                </a:tc>
+                <a:extLst>
+                  <a:ext uri="{0D108BD9-81ED-4DB2-BD59-A6C34878D82A}">
+                    <a16:rowId xmlns:a16="http://schemas.microsoft.com/office/drawing/2014/main" val="4153270444"/>
+                  </a:ext>
+                </a:extLst>
+              </a:tr>
+              <a:tr h="627342">
+                <a:tc>
+                  <a:txBody>
+                    <a:bodyPr/>
+                    <a:lstStyle/>
+                    <a:p>
+                      <a:pPr latinLnBrk="1"/>
+                      <a:endParaRPr lang="ko-KR" altLang="en-US"/>
+                    </a:p>
+                  </a:txBody>
+                  <a:tcPr/>
+                </a:tc>
+                <a:tc>
+                  <a:txBody>
+                    <a:bodyPr/>
+                    <a:lstStyle/>
+                    <a:p>
+                      <a:pPr latinLnBrk="1"/>
+                      <a:endParaRPr lang="ko-KR" altLang="en-US"/>
+                    </a:p>
+                  </a:txBody>
+                  <a:tcPr/>
+                </a:tc>
+                <a:tc>
+                  <a:txBody>
+                    <a:bodyPr/>
+                    <a:lstStyle/>
+                    <a:p>
+                      <a:pPr latinLnBrk="1"/>
+                      <a:endParaRPr lang="ko-KR" altLang="en-US"/>
+                    </a:p>
+                  </a:txBody>
+                  <a:tcPr/>
+                </a:tc>
+                <a:tc>
+                  <a:txBody>
+                    <a:bodyPr/>
+                    <a:lstStyle/>
+                    <a:p>
+                      <a:pPr latinLnBrk="1"/>
+                      <a:endParaRPr lang="ko-KR" altLang="en-US"/>
+                    </a:p>
+                  </a:txBody>
+                  <a:tcPr/>
+                </a:tc>
+                <a:tc>
+                  <a:txBody>
+                    <a:bodyPr/>
+                    <a:lstStyle/>
+                    <a:p>
+                      <a:pPr latinLnBrk="1"/>
+                      <a:endParaRPr lang="ko-KR" altLang="en-US"/>
+                    </a:p>
+                  </a:txBody>
+                  <a:tcPr/>
+                </a:tc>
+                <a:tc>
+                  <a:txBody>
+                    <a:bodyPr/>
+                    <a:lstStyle/>
+                    <a:p>
+                      <a:pPr latinLnBrk="1"/>
+                      <a:endParaRPr lang="ko-KR" altLang="en-US"/>
+                    </a:p>
+                  </a:txBody>
+                  <a:tcPr/>
+                </a:tc>
+                <a:extLst>
+                  <a:ext uri="{0D108BD9-81ED-4DB2-BD59-A6C34878D82A}">
+                    <a16:rowId xmlns:a16="http://schemas.microsoft.com/office/drawing/2014/main" val="4041484492"/>
+                  </a:ext>
+                </a:extLst>
+              </a:tr>
+              <a:tr h="627342">
+                <a:tc>
+                  <a:txBody>
+                    <a:bodyPr/>
+                    <a:lstStyle/>
+                    <a:p>
+                      <a:pPr latinLnBrk="1"/>
+                      <a:endParaRPr lang="ko-KR" altLang="en-US"/>
+                    </a:p>
+                  </a:txBody>
+                  <a:tcPr/>
+                </a:tc>
+                <a:tc>
+                  <a:txBody>
+                    <a:bodyPr/>
+                    <a:lstStyle/>
+                    <a:p>
+                      <a:pPr latinLnBrk="1"/>
+                      <a:endParaRPr lang="ko-KR" altLang="en-US"/>
+                    </a:p>
+                  </a:txBody>
+                  <a:tcPr/>
+                </a:tc>
+                <a:tc>
+                  <a:txBody>
+                    <a:bodyPr/>
+                    <a:lstStyle/>
+                    <a:p>
+                      <a:pPr latinLnBrk="1"/>
+                      <a:endParaRPr lang="ko-KR" altLang="en-US"/>
+                    </a:p>
+                  </a:txBody>
+                  <a:tcPr/>
+                </a:tc>
+                <a:tc>
+                  <a:txBody>
+                    <a:bodyPr/>
+                    <a:lstStyle/>
+                    <a:p>
+                      <a:pPr latinLnBrk="1"/>
+                      <a:endParaRPr lang="ko-KR" altLang="en-US"/>
+                    </a:p>
+                  </a:txBody>
+                  <a:tcPr/>
+                </a:tc>
+                <a:tc>
+                  <a:txBody>
+                    <a:bodyPr/>
+                    <a:lstStyle/>
+                    <a:p>
+                      <a:pPr latinLnBrk="1"/>
+                      <a:endParaRPr lang="ko-KR" altLang="en-US"/>
+                    </a:p>
+                  </a:txBody>
+                  <a:tcPr/>
+                </a:tc>
+                <a:tc>
+                  <a:txBody>
+                    <a:bodyPr/>
+                    <a:lstStyle/>
+                    <a:p>
+                      <a:pPr latinLnBrk="1"/>
+                      <a:endParaRPr lang="ko-KR" altLang="en-US"/>
+                    </a:p>
+                  </a:txBody>
+                  <a:tcPr/>
+                </a:tc>
+                <a:extLst>
+                  <a:ext uri="{0D108BD9-81ED-4DB2-BD59-A6C34878D82A}">
+                    <a16:rowId xmlns:a16="http://schemas.microsoft.com/office/drawing/2014/main" val="3928779991"/>
+                  </a:ext>
+                </a:extLst>
+              </a:tr>
+              <a:tr h="627342">
+                <a:tc>
+                  <a:txBody>
+                    <a:bodyPr/>
+                    <a:lstStyle/>
+                    <a:p>
+                      <a:pPr latinLnBrk="1"/>
+                      <a:endParaRPr lang="ko-KR" altLang="en-US"/>
+                    </a:p>
+                  </a:txBody>
+                  <a:tcPr/>
+                </a:tc>
+                <a:tc>
+                  <a:txBody>
+                    <a:bodyPr/>
+                    <a:lstStyle/>
+                    <a:p>
+                      <a:pPr latinLnBrk="1"/>
+                      <a:endParaRPr lang="ko-KR" altLang="en-US"/>
+                    </a:p>
+                  </a:txBody>
+                  <a:tcPr/>
+                </a:tc>
+                <a:tc>
+                  <a:txBody>
+                    <a:bodyPr/>
+                    <a:lstStyle/>
+                    <a:p>
+                      <a:pPr latinLnBrk="1"/>
+                      <a:endParaRPr lang="ko-KR" altLang="en-US"/>
+                    </a:p>
+                  </a:txBody>
+                  <a:tcPr/>
+                </a:tc>
+                <a:tc>
+                  <a:txBody>
+                    <a:bodyPr/>
+                    <a:lstStyle/>
+                    <a:p>
+                      <a:pPr latinLnBrk="1"/>
+                      <a:endParaRPr lang="ko-KR" altLang="en-US"/>
+                    </a:p>
+                  </a:txBody>
+                  <a:tcPr/>
+                </a:tc>
+                <a:tc>
+                  <a:txBody>
+                    <a:bodyPr/>
+                    <a:lstStyle/>
+                    <a:p>
+                      <a:pPr latinLnBrk="1"/>
+                      <a:endParaRPr lang="ko-KR" altLang="en-US"/>
+                    </a:p>
+                  </a:txBody>
+                  <a:tcPr/>
+                </a:tc>
+                <a:tc>
+                  <a:txBody>
+                    <a:bodyPr/>
+                    <a:lstStyle/>
+                    <a:p>
+                      <a:pPr latinLnBrk="1"/>
+                      <a:endParaRPr lang="ko-KR" altLang="en-US" dirty="0"/>
+                    </a:p>
+                  </a:txBody>
+                  <a:tcPr/>
+                </a:tc>
+                <a:extLst>
+                  <a:ext uri="{0D108BD9-81ED-4DB2-BD59-A6C34878D82A}">
+                    <a16:rowId xmlns:a16="http://schemas.microsoft.com/office/drawing/2014/main" val="2875098620"/>
+                  </a:ext>
+                </a:extLst>
+              </a:tr>
+            </a:tbl>
+          </a:graphicData>
+        </a:graphic>
+      </p:graphicFrame>
+      <p:sp>
+        <p:nvSpPr>
+          <p:cNvPr id="25" name="TextBox 24">
+            <a:extLst>
+              <a:ext uri="{FF2B5EF4-FFF2-40B4-BE49-F238E27FC236}">
+                <a16:creationId xmlns:a16="http://schemas.microsoft.com/office/drawing/2014/main" id="{3915AD4B-462E-425E-BFD8-EBC496F4E558}"/>
+              </a:ext>
+            </a:extLst>
+          </p:cNvPr>
+          <p:cNvSpPr txBox="1"/>
+          <p:nvPr/>
+        </p:nvSpPr>
+        <p:spPr>
+          <a:xfrm>
+            <a:off x="8600464" y="2146397"/>
+            <a:ext cx="2935359" cy="369332"/>
+          </a:xfrm>
+          <a:prstGeom prst="rect">
+            <a:avLst/>
+          </a:prstGeom>
+          <a:noFill/>
+        </p:spPr>
+        <p:txBody>
+          <a:bodyPr wrap="square" rtlCol="0">
+            <a:spAutoFit/>
+          </a:bodyPr>
+          <a:lstStyle/>
+          <a:p>
+            <a:r>
+              <a:rPr lang="ko-KR" altLang="en-US" dirty="0"/>
+              <a:t>계정</a:t>
+            </a:r>
+            <a:r>
+              <a:rPr lang="en-US" altLang="ko-KR" dirty="0"/>
+              <a:t>(</a:t>
+            </a:r>
+            <a:r>
+              <a:rPr lang="ko-KR" altLang="en-US" dirty="0"/>
+              <a:t>캐릭터</a:t>
+            </a:r>
+            <a:r>
+              <a:rPr lang="en-US" altLang="ko-KR" dirty="0"/>
+              <a:t>)</a:t>
+            </a:r>
+            <a:r>
+              <a:rPr lang="ko-KR" altLang="en-US" dirty="0"/>
+              <a:t> 정보</a:t>
+            </a:r>
+          </a:p>
+        </p:txBody>
+      </p:sp>
+    </p:spTree>
+    <p:extLst>
+      <p:ext uri="{BB962C8B-B14F-4D97-AF65-F5344CB8AC3E}">
+        <p14:creationId xmlns:p14="http://schemas.microsoft.com/office/powerpoint/2010/main" val="4215200031"/>
+      </p:ext>
+    </p:extLst>
+  </p:cSld>
+  <p:clrMapOvr>
+    <a:masterClrMapping/>
+  </p:clrMapOvr>
+</p:sld>
+</file>
+
+<file path=ppt/slides/slide3.xml><?xml version="1.0" encoding="utf-8"?>
+<p:sld xmlns:a="http://schemas.openxmlformats.org/drawingml/2006/main" xmlns:r="http://schemas.openxmlformats.org/officeDocument/2006/relationships" xmlns:p="http://schemas.openxmlformats.org/presentationml/2006/main">
+  <p:cSld>
+    <p:spTree>
+      <p:nvGrpSpPr>
+        <p:cNvPr id="1" name=""/>
+        <p:cNvGrpSpPr/>
+        <p:nvPr/>
+      </p:nvGrpSpPr>
+      <p:grpSpPr>
+        <a:xfrm>
+          <a:off x="0" y="0"/>
+          <a:ext cx="0" cy="0"/>
+          <a:chOff x="0" y="0"/>
+          <a:chExt cx="0" cy="0"/>
+        </a:xfrm>
+      </p:grpSpPr>
+      <p:sp>
+        <p:nvSpPr>
           <p:cNvPr id="4" name="직사각형 3">
             <a:extLst>
               <a:ext uri="{FF2B5EF4-FFF2-40B4-BE49-F238E27FC236}">
@@ -4376,7 +5882,7 @@
 </p:sld>
 </file>
 
-<file path=ppt/slides/slide2.xml><?xml version="1.0" encoding="utf-8"?>
+<file path=ppt/slides/slide4.xml><?xml version="1.0" encoding="utf-8"?>
 <p:sld xmlns:a="http://schemas.openxmlformats.org/drawingml/2006/main" xmlns:r="http://schemas.openxmlformats.org/officeDocument/2006/relationships" xmlns:p="http://schemas.openxmlformats.org/presentationml/2006/main">
   <p:cSld>
     <p:spTree>
@@ -4447,14 +5953,14 @@
           <p:nvPr>
             <p:extLst>
               <p:ext uri="{D42A27DB-BD31-4B8C-83A1-F6EECF244321}">
-                <p14:modId xmlns:p14="http://schemas.microsoft.com/office/powerpoint/2010/main" val="3984066495"/>
+                <p14:modId xmlns:p14="http://schemas.microsoft.com/office/powerpoint/2010/main" val="183009663"/>
               </p:ext>
             </p:extLst>
           </p:nvPr>
         </p:nvGraphicFramePr>
         <p:xfrm>
           <a:off x="427139" y="1087394"/>
-          <a:ext cx="3707802" cy="1519400"/>
+          <a:ext cx="5185095" cy="1665587"/>
         </p:xfrm>
         <a:graphic>
           <a:graphicData uri="http://schemas.openxmlformats.org/drawingml/2006/table">
@@ -4463,24 +5969,38 @@
                 <a:tableStyleId>{5C22544A-7EE6-4342-B048-85BDC9FD1C3A}</a:tableStyleId>
               </a:tblPr>
               <a:tblGrid>
-                <a:gridCol w="1235934">
+                <a:gridCol w="1037019">
                   <a:extLst>
                     <a:ext uri="{9D8B030D-6E8A-4147-A177-3AD203B41FA5}">
                       <a16:colId xmlns:a16="http://schemas.microsoft.com/office/drawing/2014/main" val="857292873"/>
                     </a:ext>
                   </a:extLst>
                 </a:gridCol>
-                <a:gridCol w="1235934">
+                <a:gridCol w="1037019">
                   <a:extLst>
                     <a:ext uri="{9D8B030D-6E8A-4147-A177-3AD203B41FA5}">
                       <a16:colId xmlns:a16="http://schemas.microsoft.com/office/drawing/2014/main" val="201994473"/>
                     </a:ext>
                   </a:extLst>
                 </a:gridCol>
-                <a:gridCol w="1235934">
+                <a:gridCol w="1037019">
                   <a:extLst>
                     <a:ext uri="{9D8B030D-6E8A-4147-A177-3AD203B41FA5}">
                       <a16:colId xmlns:a16="http://schemas.microsoft.com/office/drawing/2014/main" val="767223019"/>
+                    </a:ext>
+                  </a:extLst>
+                </a:gridCol>
+                <a:gridCol w="1037019">
+                  <a:extLst>
+                    <a:ext uri="{9D8B030D-6E8A-4147-A177-3AD203B41FA5}">
+                      <a16:colId xmlns:a16="http://schemas.microsoft.com/office/drawing/2014/main" val="423693622"/>
+                    </a:ext>
+                  </a:extLst>
+                </a:gridCol>
+                <a:gridCol w="1037019">
+                  <a:extLst>
+                    <a:ext uri="{9D8B030D-6E8A-4147-A177-3AD203B41FA5}">
+                      <a16:colId xmlns:a16="http://schemas.microsoft.com/office/drawing/2014/main" val="4022306994"/>
                     </a:ext>
                   </a:extLst>
                 </a:gridCol>
@@ -4539,6 +6059,36 @@
                   </a:txBody>
                   <a:tcPr/>
                 </a:tc>
+                <a:tc>
+                  <a:txBody>
+                    <a:bodyPr/>
+                    <a:lstStyle/>
+                    <a:p>
+                      <a:pPr algn="ctr" latinLnBrk="1"/>
+                      <a:r>
+                        <a:rPr lang="en-US" altLang="ko-KR" dirty="0" err="1"/>
+                        <a:t>CreadtedDate</a:t>
+                      </a:r>
+                      <a:endParaRPr lang="ko-KR" altLang="en-US" dirty="0"/>
+                    </a:p>
+                  </a:txBody>
+                  <a:tcPr/>
+                </a:tc>
+                <a:tc>
+                  <a:txBody>
+                    <a:bodyPr/>
+                    <a:lstStyle/>
+                    <a:p>
+                      <a:pPr algn="ctr" latinLnBrk="1"/>
+                      <a:r>
+                        <a:rPr lang="en-US" altLang="ko-KR" dirty="0" err="1"/>
+                        <a:t>LastLoginDate</a:t>
+                      </a:r>
+                      <a:endParaRPr lang="ko-KR" altLang="en-US" dirty="0"/>
+                    </a:p>
+                  </a:txBody>
+                  <a:tcPr/>
+                </a:tc>
                 <a:extLst>
                   <a:ext uri="{0D108BD9-81ED-4DB2-BD59-A6C34878D82A}">
                     <a16:rowId xmlns:a16="http://schemas.microsoft.com/office/drawing/2014/main" val="922794740"/>
@@ -4591,6 +6141,32 @@
                   </a:txBody>
                   <a:tcPr/>
                 </a:tc>
+                <a:tc>
+                  <a:txBody>
+                    <a:bodyPr/>
+                    <a:lstStyle/>
+                    <a:p>
+                      <a:pPr algn="ctr" latinLnBrk="1"/>
+                      <a:r>
+                        <a:rPr lang="en-US" altLang="ko-KR" sz="1100" dirty="0"/>
+                        <a:t>2022:02:24:37</a:t>
+                      </a:r>
+                      <a:endParaRPr lang="ko-KR" altLang="en-US" sz="1100" dirty="0"/>
+                    </a:p>
+                  </a:txBody>
+                  <a:tcPr/>
+                </a:tc>
+                <a:tc>
+                  <a:txBody>
+                    <a:bodyPr/>
+                    <a:lstStyle/>
+                    <a:p>
+                      <a:pPr algn="ctr" latinLnBrk="1"/>
+                      <a:endParaRPr lang="ko-KR" altLang="en-US" sz="1100" dirty="0"/>
+                    </a:p>
+                  </a:txBody>
+                  <a:tcPr/>
+                </a:tc>
                 <a:extLst>
                   <a:ext uri="{0D108BD9-81ED-4DB2-BD59-A6C34878D82A}">
                     <a16:rowId xmlns:a16="http://schemas.microsoft.com/office/drawing/2014/main" val="4233234213"/>
@@ -4604,20 +6180,24 @@
                     <a:lstStyle/>
                     <a:p>
                       <a:pPr algn="ctr" latinLnBrk="1"/>
-                      <a:endParaRPr lang="ko-KR" altLang="en-US" sz="1100" dirty="0"/>
-                    </a:p>
-                  </a:txBody>
-                  <a:tcPr/>
-                </a:tc>
-                <a:tc>
-                  <a:txBody>
-                    <a:bodyPr/>
-                    <a:lstStyle/>
-                    <a:p>
-                      <a:pPr algn="ctr" latinLnBrk="1"/>
                       <a:r>
                         <a:rPr lang="en-US" altLang="ko-KR" sz="1100" dirty="0"/>
-                        <a:t>Asrhgy0125</a:t>
+                        <a:t>15678948</a:t>
+                      </a:r>
+                      <a:endParaRPr lang="ko-KR" altLang="en-US" sz="1100" dirty="0"/>
+                    </a:p>
+                  </a:txBody>
+                  <a:tcPr/>
+                </a:tc>
+                <a:tc>
+                  <a:txBody>
+                    <a:bodyPr/>
+                    <a:lstStyle/>
+                    <a:p>
+                      <a:pPr algn="ctr" latinLnBrk="1"/>
+                      <a:r>
+                        <a:rPr lang="en-US" altLang="ko-KR" sz="1100" dirty="0"/>
+                        <a:t>Asrhgy0326</a:t>
                       </a:r>
                       <a:endParaRPr lang="ko-KR" altLang="en-US" sz="1100" dirty="0"/>
                     </a:p>
@@ -4634,6 +6214,28 @@
                         <a:rPr lang="ko-KR" altLang="en-US" sz="1100" dirty="0" err="1"/>
                         <a:t>디푼디푼</a:t>
                       </a:r>
+                      <a:endParaRPr lang="ko-KR" altLang="en-US" sz="1100" dirty="0"/>
+                    </a:p>
+                  </a:txBody>
+                  <a:tcPr/>
+                </a:tc>
+                <a:tc>
+                  <a:txBody>
+                    <a:bodyPr/>
+                    <a:lstStyle/>
+                    <a:p>
+                      <a:pPr algn="ctr" latinLnBrk="1"/>
+                      <a:endParaRPr lang="ko-KR" altLang="en-US" sz="1100" dirty="0"/>
+                    </a:p>
+                  </a:txBody>
+                  <a:tcPr/>
+                </a:tc>
+                <a:tc>
+                  <a:txBody>
+                    <a:bodyPr/>
+                    <a:lstStyle/>
+                    <a:p>
+                      <a:pPr algn="ctr" latinLnBrk="1"/>
                       <a:endParaRPr lang="ko-KR" altLang="en-US" sz="1100" dirty="0"/>
                     </a:p>
                   </a:txBody>
@@ -4690,6 +6292,28 @@
                         <a:rPr lang="en-US" altLang="ko-KR" sz="1100" dirty="0"/>
                         <a:t>PW</a:t>
                       </a:r>
+                      <a:endParaRPr lang="ko-KR" altLang="en-US" sz="1100" dirty="0"/>
+                    </a:p>
+                  </a:txBody>
+                  <a:tcPr/>
+                </a:tc>
+                <a:tc>
+                  <a:txBody>
+                    <a:bodyPr/>
+                    <a:lstStyle/>
+                    <a:p>
+                      <a:pPr algn="ctr" latinLnBrk="1"/>
+                      <a:endParaRPr lang="ko-KR" altLang="en-US" sz="1100" dirty="0"/>
+                    </a:p>
+                  </a:txBody>
+                  <a:tcPr/>
+                </a:tc>
+                <a:tc>
+                  <a:txBody>
+                    <a:bodyPr/>
+                    <a:lstStyle/>
+                    <a:p>
+                      <a:pPr algn="ctr" latinLnBrk="1"/>
                       <a:endParaRPr lang="ko-KR" altLang="en-US" sz="1100" dirty="0"/>
                     </a:p>
                   </a:txBody>

</xml_diff>